<commit_message>
updates Elodie 9/18/21 9:58am
</commit_message>
<xml_diff>
--- a/OpenWeather_AQI_Presentation_Draft.pptx
+++ b/OpenWeather_AQI_Presentation_Draft.pptx
@@ -5,21 +5,25 @@
     <p:sldMasterId id="2147483648" r:id="rId1"/>
   </p:sldMasterIdLst>
   <p:notesMasterIdLst>
-    <p:notesMasterId r:id="rId11"/>
+    <p:notesMasterId r:id="rId15"/>
   </p:notesMasterIdLst>
   <p:handoutMasterIdLst>
-    <p:handoutMasterId r:id="rId12"/>
+    <p:handoutMasterId r:id="rId16"/>
   </p:handoutMasterIdLst>
   <p:sldIdLst>
     <p:sldId id="2524" r:id="rId2"/>
     <p:sldId id="2542" r:id="rId3"/>
-    <p:sldId id="2544" r:id="rId4"/>
-    <p:sldId id="2545" r:id="rId5"/>
-    <p:sldId id="2582" r:id="rId6"/>
-    <p:sldId id="2552" r:id="rId7"/>
-    <p:sldId id="2554" r:id="rId8"/>
-    <p:sldId id="2574" r:id="rId9"/>
-    <p:sldId id="2576" r:id="rId10"/>
+    <p:sldId id="2552" r:id="rId4"/>
+    <p:sldId id="2544" r:id="rId5"/>
+    <p:sldId id="2545" r:id="rId6"/>
+    <p:sldId id="2583" r:id="rId7"/>
+    <p:sldId id="2582" r:id="rId8"/>
+    <p:sldId id="2589" r:id="rId9"/>
+    <p:sldId id="2584" r:id="rId10"/>
+    <p:sldId id="2588" r:id="rId11"/>
+    <p:sldId id="2554" r:id="rId12"/>
+    <p:sldId id="2574" r:id="rId13"/>
+    <p:sldId id="2576" r:id="rId14"/>
   </p:sldIdLst>
   <p:sldSz cx="12192000" cy="6858000"/>
   <p:notesSz cx="6858000" cy="9144000"/>
@@ -149,13 +153,369 @@
 <file path=ppt/revisionInfo.xml><?xml version="1.0" encoding="utf-8"?>
 <p1510:revInfo xmlns:a="http://schemas.openxmlformats.org/drawingml/2006/main" xmlns:r="http://schemas.openxmlformats.org/officeDocument/2006/relationships" xmlns:p1510="http://schemas.microsoft.com/office/powerpoint/2015/10/main">
   <p1510:revLst>
-    <p1510:client id="{E1157C04-EE16-41FB-AB49-4671B015ECC6}" v="52" dt="2021-09-08T20:39:16.836"/>
+    <p1510:client id="{B99B3CDB-533B-4AF0-93E0-8041D68B3A02}" v="8" dt="2021-09-18T13:54:48.396"/>
   </p1510:revLst>
 </p1510:revInfo>
 </file>
 
 <file path=ppt/changesInfos/changesInfo1.xml><?xml version="1.0" encoding="utf-8"?>
 <pc:chgInfo xmlns:a="http://schemas.openxmlformats.org/drawingml/2006/main" xmlns:r="http://schemas.openxmlformats.org/officeDocument/2006/relationships" xmlns:ac="http://schemas.microsoft.com/office/drawing/2013/main/command" xmlns:pc="http://schemas.microsoft.com/office/powerpoint/2013/main/command">
+  <pc:docChgLst>
+    <pc:chgData name="elodiecslawinski@gmail.com" userId="2d9956b1ce3ed99c" providerId="LiveId" clId="{B99B3CDB-533B-4AF0-93E0-8041D68B3A02}"/>
+    <pc:docChg chg="custSel addSld delSld modSld sldOrd">
+      <pc:chgData name="elodiecslawinski@gmail.com" userId="2d9956b1ce3ed99c" providerId="LiveId" clId="{B99B3CDB-533B-4AF0-93E0-8041D68B3A02}" dt="2021-09-18T13:56:02.582" v="2057" actId="20577"/>
+      <pc:docMkLst>
+        <pc:docMk/>
+      </pc:docMkLst>
+      <pc:sldChg chg="addSp modSp mod">
+        <pc:chgData name="elodiecslawinski@gmail.com" userId="2d9956b1ce3ed99c" providerId="LiveId" clId="{B99B3CDB-533B-4AF0-93E0-8041D68B3A02}" dt="2021-09-18T13:29:02.805" v="147" actId="20577"/>
+        <pc:sldMkLst>
+          <pc:docMk/>
+          <pc:sldMk cId="2439656135" sldId="2524"/>
+        </pc:sldMkLst>
+        <pc:spChg chg="mod">
+          <ac:chgData name="elodiecslawinski@gmail.com" userId="2d9956b1ce3ed99c" providerId="LiveId" clId="{B99B3CDB-533B-4AF0-93E0-8041D68B3A02}" dt="2021-09-18T13:28:16.615" v="37" actId="20577"/>
+          <ac:spMkLst>
+            <pc:docMk/>
+            <pc:sldMk cId="2439656135" sldId="2524"/>
+            <ac:spMk id="2" creationId="{14801ABD-7339-4C70-82A3-696BE8EF14DF}"/>
+          </ac:spMkLst>
+        </pc:spChg>
+        <pc:spChg chg="add mod">
+          <ac:chgData name="elodiecslawinski@gmail.com" userId="2d9956b1ce3ed99c" providerId="LiveId" clId="{B99B3CDB-533B-4AF0-93E0-8041D68B3A02}" dt="2021-09-18T13:29:02.805" v="147" actId="20577"/>
+          <ac:spMkLst>
+            <pc:docMk/>
+            <pc:sldMk cId="2439656135" sldId="2524"/>
+            <ac:spMk id="5" creationId="{81B04E09-F326-4675-97CD-9748AD7BBE9D}"/>
+          </ac:spMkLst>
+        </pc:spChg>
+        <pc:spChg chg="mod">
+          <ac:chgData name="elodiecslawinski@gmail.com" userId="2d9956b1ce3ed99c" providerId="LiveId" clId="{B99B3CDB-533B-4AF0-93E0-8041D68B3A02}" dt="2021-09-18T13:28:42.378" v="104" actId="20577"/>
+          <ac:spMkLst>
+            <pc:docMk/>
+            <pc:sldMk cId="2439656135" sldId="2524"/>
+            <ac:spMk id="6" creationId="{849EBC96-F2B6-43D3-A761-898E1D269BC3}"/>
+          </ac:spMkLst>
+        </pc:spChg>
+        <pc:picChg chg="mod">
+          <ac:chgData name="elodiecslawinski@gmail.com" userId="2d9956b1ce3ed99c" providerId="LiveId" clId="{B99B3CDB-533B-4AF0-93E0-8041D68B3A02}" dt="2021-09-18T13:28:51.477" v="110" actId="1036"/>
+          <ac:picMkLst>
+            <pc:docMk/>
+            <pc:sldMk cId="2439656135" sldId="2524"/>
+            <ac:picMk id="10" creationId="{C9766DE0-956D-438F-83AF-E048758BF665}"/>
+          </ac:picMkLst>
+        </pc:picChg>
+      </pc:sldChg>
+      <pc:sldChg chg="modSp mod">
+        <pc:chgData name="elodiecslawinski@gmail.com" userId="2d9956b1ce3ed99c" providerId="LiveId" clId="{B99B3CDB-533B-4AF0-93E0-8041D68B3A02}" dt="2021-09-18T13:32:08.923" v="332" actId="20577"/>
+        <pc:sldMkLst>
+          <pc:docMk/>
+          <pc:sldMk cId="3073952723" sldId="2542"/>
+        </pc:sldMkLst>
+        <pc:spChg chg="mod">
+          <ac:chgData name="elodiecslawinski@gmail.com" userId="2d9956b1ce3ed99c" providerId="LiveId" clId="{B99B3CDB-533B-4AF0-93E0-8041D68B3A02}" dt="2021-09-18T13:32:08.923" v="332" actId="20577"/>
+          <ac:spMkLst>
+            <pc:docMk/>
+            <pc:sldMk cId="3073952723" sldId="2542"/>
+            <ac:spMk id="10" creationId="{1A50CE80-CA72-48E8-BA6A-98B4A0501A5B}"/>
+          </ac:spMkLst>
+        </pc:spChg>
+        <pc:spChg chg="mod">
+          <ac:chgData name="elodiecslawinski@gmail.com" userId="2d9956b1ce3ed99c" providerId="LiveId" clId="{B99B3CDB-533B-4AF0-93E0-8041D68B3A02}" dt="2021-09-18T13:31:36.453" v="289" actId="20577"/>
+          <ac:spMkLst>
+            <pc:docMk/>
+            <pc:sldMk cId="3073952723" sldId="2542"/>
+            <ac:spMk id="12" creationId="{75BAF650-FD43-47DB-AB10-61E4F4A72162}"/>
+          </ac:spMkLst>
+        </pc:spChg>
+        <pc:spChg chg="mod">
+          <ac:chgData name="elodiecslawinski@gmail.com" userId="2d9956b1ce3ed99c" providerId="LiveId" clId="{B99B3CDB-533B-4AF0-93E0-8041D68B3A02}" dt="2021-09-18T13:31:49.446" v="315" actId="20577"/>
+          <ac:spMkLst>
+            <pc:docMk/>
+            <pc:sldMk cId="3073952723" sldId="2542"/>
+            <ac:spMk id="13" creationId="{FF16BB79-5932-44CF-9C3A-407F4849693A}"/>
+          </ac:spMkLst>
+        </pc:spChg>
+        <pc:spChg chg="mod">
+          <ac:chgData name="elodiecslawinski@gmail.com" userId="2d9956b1ce3ed99c" providerId="LiveId" clId="{B99B3CDB-533B-4AF0-93E0-8041D68B3A02}" dt="2021-09-18T13:31:40.261" v="296" actId="20577"/>
+          <ac:spMkLst>
+            <pc:docMk/>
+            <pc:sldMk cId="3073952723" sldId="2542"/>
+            <ac:spMk id="14" creationId="{9C7D62EB-2597-47CE-BB7C-6A6EAB5BC0B7}"/>
+          </ac:spMkLst>
+        </pc:spChg>
+        <pc:spChg chg="mod">
+          <ac:chgData name="elodiecslawinski@gmail.com" userId="2d9956b1ce3ed99c" providerId="LiveId" clId="{B99B3CDB-533B-4AF0-93E0-8041D68B3A02}" dt="2021-09-18T13:31:57.373" v="331" actId="20577"/>
+          <ac:spMkLst>
+            <pc:docMk/>
+            <pc:sldMk cId="3073952723" sldId="2542"/>
+            <ac:spMk id="15" creationId="{82271CFC-BF42-4890-8441-5320497A37EE}"/>
+          </ac:spMkLst>
+        </pc:spChg>
+      </pc:sldChg>
+      <pc:sldChg chg="modSp mod">
+        <pc:chgData name="elodiecslawinski@gmail.com" userId="2d9956b1ce3ed99c" providerId="LiveId" clId="{B99B3CDB-533B-4AF0-93E0-8041D68B3A02}" dt="2021-09-18T13:38:29.521" v="887" actId="122"/>
+        <pc:sldMkLst>
+          <pc:docMk/>
+          <pc:sldMk cId="605044435" sldId="2544"/>
+        </pc:sldMkLst>
+        <pc:spChg chg="mod">
+          <ac:chgData name="elodiecslawinski@gmail.com" userId="2d9956b1ce3ed99c" providerId="LiveId" clId="{B99B3CDB-533B-4AF0-93E0-8041D68B3A02}" dt="2021-09-18T13:38:29.521" v="887" actId="122"/>
+          <ac:spMkLst>
+            <pc:docMk/>
+            <pc:sldMk cId="605044435" sldId="2544"/>
+            <ac:spMk id="9" creationId="{5249062A-D4B8-4980-B15D-2F0CF58BB5B7}"/>
+          </ac:spMkLst>
+        </pc:spChg>
+        <pc:spChg chg="mod">
+          <ac:chgData name="elodiecslawinski@gmail.com" userId="2d9956b1ce3ed99c" providerId="LiveId" clId="{B99B3CDB-533B-4AF0-93E0-8041D68B3A02}" dt="2021-09-18T13:38:09.204" v="885" actId="20577"/>
+          <ac:spMkLst>
+            <pc:docMk/>
+            <pc:sldMk cId="605044435" sldId="2544"/>
+            <ac:spMk id="11" creationId="{B59FCEF3-B015-47B8-8D8F-7C0C90D275EB}"/>
+          </ac:spMkLst>
+        </pc:spChg>
+        <pc:spChg chg="mod">
+          <ac:chgData name="elodiecslawinski@gmail.com" userId="2d9956b1ce3ed99c" providerId="LiveId" clId="{B99B3CDB-533B-4AF0-93E0-8041D68B3A02}" dt="2021-09-18T13:36:34.237" v="772" actId="14100"/>
+          <ac:spMkLst>
+            <pc:docMk/>
+            <pc:sldMk cId="605044435" sldId="2544"/>
+            <ac:spMk id="12" creationId="{045C97E3-0CF5-415A-BEEC-B465AA7F130B}"/>
+          </ac:spMkLst>
+        </pc:spChg>
+        <pc:picChg chg="mod">
+          <ac:chgData name="elodiecslawinski@gmail.com" userId="2d9956b1ce3ed99c" providerId="LiveId" clId="{B99B3CDB-533B-4AF0-93E0-8041D68B3A02}" dt="2021-09-18T13:37:49.340" v="881" actId="1037"/>
+          <ac:picMkLst>
+            <pc:docMk/>
+            <pc:sldMk cId="605044435" sldId="2544"/>
+            <ac:picMk id="5" creationId="{46D415C9-7299-415E-BB1A-8D05E98FAB58}"/>
+          </ac:picMkLst>
+        </pc:picChg>
+      </pc:sldChg>
+      <pc:sldChg chg="addSp delSp modSp mod">
+        <pc:chgData name="elodiecslawinski@gmail.com" userId="2d9956b1ce3ed99c" providerId="LiveId" clId="{B99B3CDB-533B-4AF0-93E0-8041D68B3A02}" dt="2021-09-18T13:46:45.653" v="1528" actId="14100"/>
+        <pc:sldMkLst>
+          <pc:docMk/>
+          <pc:sldMk cId="3298998420" sldId="2545"/>
+        </pc:sldMkLst>
+        <pc:spChg chg="add del mod">
+          <ac:chgData name="elodiecslawinski@gmail.com" userId="2d9956b1ce3ed99c" providerId="LiveId" clId="{B99B3CDB-533B-4AF0-93E0-8041D68B3A02}" dt="2021-09-18T13:39:29.868" v="915" actId="478"/>
+          <ac:spMkLst>
+            <pc:docMk/>
+            <pc:sldMk cId="3298998420" sldId="2545"/>
+            <ac:spMk id="3" creationId="{05AFE81D-F6A0-4E1A-810E-75C903384E18}"/>
+          </ac:spMkLst>
+        </pc:spChg>
+        <pc:spChg chg="add del mod">
+          <ac:chgData name="elodiecslawinski@gmail.com" userId="2d9956b1ce3ed99c" providerId="LiveId" clId="{B99B3CDB-533B-4AF0-93E0-8041D68B3A02}" dt="2021-09-18T13:43:06.877" v="1056" actId="478"/>
+          <ac:spMkLst>
+            <pc:docMk/>
+            <pc:sldMk cId="3298998420" sldId="2545"/>
+            <ac:spMk id="5" creationId="{929C5F7A-23E0-439E-9021-76AAC60F5ACB}"/>
+          </ac:spMkLst>
+        </pc:spChg>
+        <pc:spChg chg="mod">
+          <ac:chgData name="elodiecslawinski@gmail.com" userId="2d9956b1ce3ed99c" providerId="LiveId" clId="{B99B3CDB-533B-4AF0-93E0-8041D68B3A02}" dt="2021-09-18T13:39:53.436" v="933" actId="122"/>
+          <ac:spMkLst>
+            <pc:docMk/>
+            <pc:sldMk cId="3298998420" sldId="2545"/>
+            <ac:spMk id="14" creationId="{5A981189-9280-48E8-90AE-7F25E741BE94}"/>
+          </ac:spMkLst>
+        </pc:spChg>
+        <pc:spChg chg="mod">
+          <ac:chgData name="elodiecslawinski@gmail.com" userId="2d9956b1ce3ed99c" providerId="LiveId" clId="{B99B3CDB-533B-4AF0-93E0-8041D68B3A02}" dt="2021-09-18T13:46:23.373" v="1521" actId="27636"/>
+          <ac:spMkLst>
+            <pc:docMk/>
+            <pc:sldMk cId="3298998420" sldId="2545"/>
+            <ac:spMk id="16" creationId="{5E9ED32E-028C-428E-97AF-168C8D6F92A9}"/>
+          </ac:spMkLst>
+        </pc:spChg>
+        <pc:spChg chg="mod">
+          <ac:chgData name="elodiecslawinski@gmail.com" userId="2d9956b1ce3ed99c" providerId="LiveId" clId="{B99B3CDB-533B-4AF0-93E0-8041D68B3A02}" dt="2021-09-18T13:43:13.471" v="1058" actId="122"/>
+          <ac:spMkLst>
+            <pc:docMk/>
+            <pc:sldMk cId="3298998420" sldId="2545"/>
+            <ac:spMk id="17" creationId="{98B9CB9E-1380-488B-88F1-B99F12EFA776}"/>
+          </ac:spMkLst>
+        </pc:spChg>
+        <pc:spChg chg="mod">
+          <ac:chgData name="elodiecslawinski@gmail.com" userId="2d9956b1ce3ed99c" providerId="LiveId" clId="{B99B3CDB-533B-4AF0-93E0-8041D68B3A02}" dt="2021-09-18T13:46:45.653" v="1528" actId="14100"/>
+          <ac:spMkLst>
+            <pc:docMk/>
+            <pc:sldMk cId="3298998420" sldId="2545"/>
+            <ac:spMk id="18" creationId="{94D72ABF-5D1D-4141-8DFE-03D197B7C1E3}"/>
+          </ac:spMkLst>
+        </pc:spChg>
+        <pc:spChg chg="del">
+          <ac:chgData name="elodiecslawinski@gmail.com" userId="2d9956b1ce3ed99c" providerId="LiveId" clId="{B99B3CDB-533B-4AF0-93E0-8041D68B3A02}" dt="2021-09-18T13:43:04.425" v="1055" actId="478"/>
+          <ac:spMkLst>
+            <pc:docMk/>
+            <pc:sldMk cId="3298998420" sldId="2545"/>
+            <ac:spMk id="19" creationId="{4C3079F2-FA5D-4717-9945-965E324EBF60}"/>
+          </ac:spMkLst>
+        </pc:spChg>
+        <pc:picChg chg="add mod">
+          <ac:chgData name="elodiecslawinski@gmail.com" userId="2d9956b1ce3ed99c" providerId="LiveId" clId="{B99B3CDB-533B-4AF0-93E0-8041D68B3A02}" dt="2021-09-18T13:39:32.585" v="916" actId="1076"/>
+          <ac:picMkLst>
+            <pc:docMk/>
+            <pc:sldMk cId="3298998420" sldId="2545"/>
+            <ac:picMk id="10" creationId="{B93D62B6-D685-446E-92E8-EAAF5504305A}"/>
+          </ac:picMkLst>
+        </pc:picChg>
+        <pc:picChg chg="del">
+          <ac:chgData name="elodiecslawinski@gmail.com" userId="2d9956b1ce3ed99c" providerId="LiveId" clId="{B99B3CDB-533B-4AF0-93E0-8041D68B3A02}" dt="2021-09-18T13:39:18.759" v="912" actId="478"/>
+          <ac:picMkLst>
+            <pc:docMk/>
+            <pc:sldMk cId="3298998420" sldId="2545"/>
+            <ac:picMk id="21" creationId="{ED555F39-395C-4F00-87D7-A02A9B883554}"/>
+          </ac:picMkLst>
+        </pc:picChg>
+      </pc:sldChg>
+      <pc:sldChg chg="modSp mod ord">
+        <pc:chgData name="elodiecslawinski@gmail.com" userId="2d9956b1ce3ed99c" providerId="LiveId" clId="{B99B3CDB-533B-4AF0-93E0-8041D68B3A02}" dt="2021-09-18T13:55:59.102" v="2055" actId="20577"/>
+        <pc:sldMkLst>
+          <pc:docMk/>
+          <pc:sldMk cId="954333892" sldId="2552"/>
+        </pc:sldMkLst>
+        <pc:spChg chg="mod">
+          <ac:chgData name="elodiecslawinski@gmail.com" userId="2d9956b1ce3ed99c" providerId="LiveId" clId="{B99B3CDB-533B-4AF0-93E0-8041D68B3A02}" dt="2021-09-18T13:55:42.989" v="2047" actId="20577"/>
+          <ac:spMkLst>
+            <pc:docMk/>
+            <pc:sldMk cId="954333892" sldId="2552"/>
+            <ac:spMk id="3" creationId="{F73D75BE-E7AD-49A1-A453-D007D958AC3D}"/>
+          </ac:spMkLst>
+        </pc:spChg>
+        <pc:spChg chg="mod">
+          <ac:chgData name="elodiecslawinski@gmail.com" userId="2d9956b1ce3ed99c" providerId="LiveId" clId="{B99B3CDB-533B-4AF0-93E0-8041D68B3A02}" dt="2021-09-18T13:55:59.102" v="2055" actId="20577"/>
+          <ac:spMkLst>
+            <pc:docMk/>
+            <pc:sldMk cId="954333892" sldId="2552"/>
+            <ac:spMk id="4" creationId="{FD47FBB8-2A87-4FDD-8742-D0C12871A3DD}"/>
+          </ac:spMkLst>
+        </pc:spChg>
+      </pc:sldChg>
+      <pc:sldChg chg="modSp add del mod">
+        <pc:chgData name="elodiecslawinski@gmail.com" userId="2d9956b1ce3ed99c" providerId="LiveId" clId="{B99B3CDB-533B-4AF0-93E0-8041D68B3A02}" dt="2021-09-18T13:39:57.976" v="934" actId="47"/>
+        <pc:sldMkLst>
+          <pc:docMk/>
+          <pc:sldMk cId="1064955017" sldId="2583"/>
+        </pc:sldMkLst>
+        <pc:spChg chg="mod">
+          <ac:chgData name="elodiecslawinski@gmail.com" userId="2d9956b1ce3ed99c" providerId="LiveId" clId="{B99B3CDB-533B-4AF0-93E0-8041D68B3A02}" dt="2021-09-18T13:38:42.877" v="911" actId="20577"/>
+          <ac:spMkLst>
+            <pc:docMk/>
+            <pc:sldMk cId="1064955017" sldId="2583"/>
+            <ac:spMk id="9" creationId="{5249062A-D4B8-4980-B15D-2F0CF58BB5B7}"/>
+          </ac:spMkLst>
+        </pc:spChg>
+      </pc:sldChg>
+      <pc:sldChg chg="modSp add mod">
+        <pc:chgData name="elodiecslawinski@gmail.com" userId="2d9956b1ce3ed99c" providerId="LiveId" clId="{B99B3CDB-533B-4AF0-93E0-8041D68B3A02}" dt="2021-09-18T13:53:32.565" v="1922" actId="20577"/>
+        <pc:sldMkLst>
+          <pc:docMk/>
+          <pc:sldMk cId="2962108432" sldId="2583"/>
+        </pc:sldMkLst>
+        <pc:spChg chg="mod">
+          <ac:chgData name="elodiecslawinski@gmail.com" userId="2d9956b1ce3ed99c" providerId="LiveId" clId="{B99B3CDB-533B-4AF0-93E0-8041D68B3A02}" dt="2021-09-18T13:47:25.355" v="1550" actId="20577"/>
+          <ac:spMkLst>
+            <pc:docMk/>
+            <pc:sldMk cId="2962108432" sldId="2583"/>
+            <ac:spMk id="9" creationId="{5249062A-D4B8-4980-B15D-2F0CF58BB5B7}"/>
+          </ac:spMkLst>
+        </pc:spChg>
+        <pc:spChg chg="mod">
+          <ac:chgData name="elodiecslawinski@gmail.com" userId="2d9956b1ce3ed99c" providerId="LiveId" clId="{B99B3CDB-533B-4AF0-93E0-8041D68B3A02}" dt="2021-09-18T13:53:32.565" v="1922" actId="20577"/>
+          <ac:spMkLst>
+            <pc:docMk/>
+            <pc:sldMk cId="2962108432" sldId="2583"/>
+            <ac:spMk id="11" creationId="{B59FCEF3-B015-47B8-8D8F-7C0C90D275EB}"/>
+          </ac:spMkLst>
+        </pc:spChg>
+      </pc:sldChg>
+      <pc:sldChg chg="modSp new mod">
+        <pc:chgData name="elodiecslawinski@gmail.com" userId="2d9956b1ce3ed99c" providerId="LiveId" clId="{B99B3CDB-533B-4AF0-93E0-8041D68B3A02}" dt="2021-09-18T13:53:45.591" v="1936" actId="20577"/>
+        <pc:sldMkLst>
+          <pc:docMk/>
+          <pc:sldMk cId="3909312436" sldId="2584"/>
+        </pc:sldMkLst>
+        <pc:spChg chg="mod">
+          <ac:chgData name="elodiecslawinski@gmail.com" userId="2d9956b1ce3ed99c" providerId="LiveId" clId="{B99B3CDB-533B-4AF0-93E0-8041D68B3A02}" dt="2021-09-18T13:53:45.591" v="1936" actId="20577"/>
+          <ac:spMkLst>
+            <pc:docMk/>
+            <pc:sldMk cId="3909312436" sldId="2584"/>
+            <ac:spMk id="5" creationId="{E870BB1D-96EA-4078-AEC4-04F59C72F156}"/>
+          </ac:spMkLst>
+        </pc:spChg>
+      </pc:sldChg>
+      <pc:sldChg chg="modSp add del mod setBg">
+        <pc:chgData name="elodiecslawinski@gmail.com" userId="2d9956b1ce3ed99c" providerId="LiveId" clId="{B99B3CDB-533B-4AF0-93E0-8041D68B3A02}" dt="2021-09-18T13:55:07.621" v="2006" actId="47"/>
+        <pc:sldMkLst>
+          <pc:docMk/>
+          <pc:sldMk cId="495517623" sldId="2585"/>
+        </pc:sldMkLst>
+        <pc:spChg chg="mod">
+          <ac:chgData name="elodiecslawinski@gmail.com" userId="2d9956b1ce3ed99c" providerId="LiveId" clId="{B99B3CDB-533B-4AF0-93E0-8041D68B3A02}" dt="2021-09-18T13:54:28" v="1970" actId="27636"/>
+          <ac:spMkLst>
+            <pc:docMk/>
+            <pc:sldMk cId="495517623" sldId="2585"/>
+            <ac:spMk id="3" creationId="{F73D75BE-E7AD-49A1-A453-D007D958AC3D}"/>
+          </ac:spMkLst>
+        </pc:spChg>
+      </pc:sldChg>
+      <pc:sldChg chg="modSp add del mod">
+        <pc:chgData name="elodiecslawinski@gmail.com" userId="2d9956b1ce3ed99c" providerId="LiveId" clId="{B99B3CDB-533B-4AF0-93E0-8041D68B3A02}" dt="2021-09-18T13:55:16.365" v="2012" actId="47"/>
+        <pc:sldMkLst>
+          <pc:docMk/>
+          <pc:sldMk cId="4022038635" sldId="2586"/>
+        </pc:sldMkLst>
+        <pc:spChg chg="mod">
+          <ac:chgData name="elodiecslawinski@gmail.com" userId="2d9956b1ce3ed99c" providerId="LiveId" clId="{B99B3CDB-533B-4AF0-93E0-8041D68B3A02}" dt="2021-09-18T13:54:41.036" v="1996" actId="20577"/>
+          <ac:spMkLst>
+            <pc:docMk/>
+            <pc:sldMk cId="4022038635" sldId="2586"/>
+            <ac:spMk id="3" creationId="{F73D75BE-E7AD-49A1-A453-D007D958AC3D}"/>
+          </ac:spMkLst>
+        </pc:spChg>
+      </pc:sldChg>
+      <pc:sldChg chg="add del setBg">
+        <pc:chgData name="elodiecslawinski@gmail.com" userId="2d9956b1ce3ed99c" providerId="LiveId" clId="{B99B3CDB-533B-4AF0-93E0-8041D68B3A02}" dt="2021-09-18T13:55:06.589" v="2005" actId="47"/>
+        <pc:sldMkLst>
+          <pc:docMk/>
+          <pc:sldMk cId="4133173638" sldId="2587"/>
+        </pc:sldMkLst>
+      </pc:sldChg>
+      <pc:sldChg chg="add">
+        <pc:chgData name="elodiecslawinski@gmail.com" userId="2d9956b1ce3ed99c" providerId="LiveId" clId="{B99B3CDB-533B-4AF0-93E0-8041D68B3A02}" dt="2021-09-18T13:54:58.881" v="1998" actId="2890"/>
+        <pc:sldMkLst>
+          <pc:docMk/>
+          <pc:sldMk cId="3341258257" sldId="2588"/>
+        </pc:sldMkLst>
+      </pc:sldChg>
+      <pc:sldChg chg="modSp add mod ord">
+        <pc:chgData name="elodiecslawinski@gmail.com" userId="2d9956b1ce3ed99c" providerId="LiveId" clId="{B99B3CDB-533B-4AF0-93E0-8041D68B3A02}" dt="2021-09-18T13:56:02.582" v="2057" actId="20577"/>
+        <pc:sldMkLst>
+          <pc:docMk/>
+          <pc:sldMk cId="1155590625" sldId="2589"/>
+        </pc:sldMkLst>
+        <pc:spChg chg="mod">
+          <ac:chgData name="elodiecslawinski@gmail.com" userId="2d9956b1ce3ed99c" providerId="LiveId" clId="{B99B3CDB-533B-4AF0-93E0-8041D68B3A02}" dt="2021-09-18T13:55:48.716" v="2051" actId="20577"/>
+          <ac:spMkLst>
+            <pc:docMk/>
+            <pc:sldMk cId="1155590625" sldId="2589"/>
+            <ac:spMk id="3" creationId="{F73D75BE-E7AD-49A1-A453-D007D958AC3D}"/>
+          </ac:spMkLst>
+        </pc:spChg>
+        <pc:spChg chg="mod">
+          <ac:chgData name="elodiecslawinski@gmail.com" userId="2d9956b1ce3ed99c" providerId="LiveId" clId="{B99B3CDB-533B-4AF0-93E0-8041D68B3A02}" dt="2021-09-18T13:56:02.582" v="2057" actId="20577"/>
+          <ac:spMkLst>
+            <pc:docMk/>
+            <pc:sldMk cId="1155590625" sldId="2589"/>
+            <ac:spMk id="4" creationId="{FD47FBB8-2A87-4FDD-8742-D0C12871A3DD}"/>
+          </ac:spMkLst>
+        </pc:spChg>
+      </pc:sldChg>
+    </pc:docChg>
+  </pc:docChgLst>
   <pc:docChgLst>
     <pc:chgData name="elodiecslawinski@gmail.com" userId="2d9956b1ce3ed99c" providerId="LiveId" clId="{E1157C04-EE16-41FB-AB49-4671B015ECC6}"/>
     <pc:docChg chg="undo custSel modSld">
@@ -1734,7 +2094,7 @@
           <a:p>
             <a:fld id="{0248B25D-8766-427E-8C9E-4845048D8DFC}" type="datetimeFigureOut">
               <a:rPr lang="en-US" smtClean="0"/>
-              <a:t>9/8/2021</a:t>
+              <a:t>9/18/2021</a:t>
             </a:fld>
             <a:endParaRPr lang="en-US" dirty="0"/>
           </a:p>
@@ -1911,7 +2271,7 @@
           <a:p>
             <a:fld id="{426F439B-391B-4B41-826A-951FCF412C34}" type="datetimeFigureOut">
               <a:rPr lang="en-US" smtClean="0"/>
-              <a:t>9/8/2021</a:t>
+              <a:t>9/18/2021</a:t>
             </a:fld>
             <a:endParaRPr lang="en-US" dirty="0"/>
           </a:p>
@@ -2244,6 +2604,258 @@
 </p:notes>
 </file>
 
+<file path=ppt/notesSlides/notesSlide10.xml><?xml version="1.0" encoding="utf-8"?>
+<p:notes xmlns:a="http://schemas.openxmlformats.org/drawingml/2006/main" xmlns:r="http://schemas.openxmlformats.org/officeDocument/2006/relationships" xmlns:p="http://schemas.openxmlformats.org/presentationml/2006/main">
+  <p:cSld>
+    <p:spTree>
+      <p:nvGrpSpPr>
+        <p:cNvPr id="1" name=""/>
+        <p:cNvGrpSpPr/>
+        <p:nvPr/>
+      </p:nvGrpSpPr>
+      <p:grpSpPr>
+        <a:xfrm>
+          <a:off x="0" y="0"/>
+          <a:ext cx="0" cy="0"/>
+          <a:chOff x="0" y="0"/>
+          <a:chExt cx="0" cy="0"/>
+        </a:xfrm>
+      </p:grpSpPr>
+      <p:sp>
+        <p:nvSpPr>
+          <p:cNvPr id="2" name="Slide Image Placeholder 1"/>
+          <p:cNvSpPr>
+            <a:spLocks noGrp="1" noRot="1" noChangeAspect="1"/>
+          </p:cNvSpPr>
+          <p:nvPr>
+            <p:ph type="sldImg"/>
+          </p:nvPr>
+        </p:nvSpPr>
+        <p:spPr/>
+      </p:sp>
+      <p:sp>
+        <p:nvSpPr>
+          <p:cNvPr id="3" name="Notes Placeholder 2"/>
+          <p:cNvSpPr>
+            <a:spLocks noGrp="1"/>
+          </p:cNvSpPr>
+          <p:nvPr>
+            <p:ph type="body" idx="1"/>
+          </p:nvPr>
+        </p:nvSpPr>
+        <p:spPr/>
+        <p:txBody>
+          <a:bodyPr/>
+          <a:lstStyle/>
+          <a:p>
+            <a:endParaRPr lang="en-US" dirty="0"/>
+          </a:p>
+        </p:txBody>
+      </p:sp>
+      <p:sp>
+        <p:nvSpPr>
+          <p:cNvPr id="4" name="Slide Number Placeholder 3"/>
+          <p:cNvSpPr>
+            <a:spLocks noGrp="1"/>
+          </p:cNvSpPr>
+          <p:nvPr>
+            <p:ph type="sldNum" sz="quarter" idx="5"/>
+          </p:nvPr>
+        </p:nvSpPr>
+        <p:spPr/>
+        <p:txBody>
+          <a:bodyPr/>
+          <a:lstStyle/>
+          <a:p>
+            <a:fld id="{3CFA0038-7055-434C-B6C4-B8C69565C600}" type="slidenum">
+              <a:rPr lang="en-US" smtClean="0"/>
+              <a:t>11</a:t>
+            </a:fld>
+            <a:endParaRPr lang="en-US" dirty="0"/>
+          </a:p>
+        </p:txBody>
+      </p:sp>
+    </p:spTree>
+    <p:extLst>
+      <p:ext uri="{BB962C8B-B14F-4D97-AF65-F5344CB8AC3E}">
+        <p14:creationId xmlns:p14="http://schemas.microsoft.com/office/powerpoint/2010/main" val="2663438760"/>
+      </p:ext>
+    </p:extLst>
+  </p:cSld>
+  <p:clrMapOvr>
+    <a:masterClrMapping/>
+  </p:clrMapOvr>
+</p:notes>
+</file>
+
+<file path=ppt/notesSlides/notesSlide11.xml><?xml version="1.0" encoding="utf-8"?>
+<p:notes xmlns:a="http://schemas.openxmlformats.org/drawingml/2006/main" xmlns:r="http://schemas.openxmlformats.org/officeDocument/2006/relationships" xmlns:p="http://schemas.openxmlformats.org/presentationml/2006/main">
+  <p:cSld>
+    <p:spTree>
+      <p:nvGrpSpPr>
+        <p:cNvPr id="1" name=""/>
+        <p:cNvGrpSpPr/>
+        <p:nvPr/>
+      </p:nvGrpSpPr>
+      <p:grpSpPr>
+        <a:xfrm>
+          <a:off x="0" y="0"/>
+          <a:ext cx="0" cy="0"/>
+          <a:chOff x="0" y="0"/>
+          <a:chExt cx="0" cy="0"/>
+        </a:xfrm>
+      </p:grpSpPr>
+      <p:sp>
+        <p:nvSpPr>
+          <p:cNvPr id="2" name="Slide Image Placeholder 1"/>
+          <p:cNvSpPr>
+            <a:spLocks noGrp="1" noRot="1" noChangeAspect="1"/>
+          </p:cNvSpPr>
+          <p:nvPr>
+            <p:ph type="sldImg"/>
+          </p:nvPr>
+        </p:nvSpPr>
+        <p:spPr/>
+      </p:sp>
+      <p:sp>
+        <p:nvSpPr>
+          <p:cNvPr id="3" name="Notes Placeholder 2"/>
+          <p:cNvSpPr>
+            <a:spLocks noGrp="1"/>
+          </p:cNvSpPr>
+          <p:nvPr>
+            <p:ph type="body" idx="1"/>
+          </p:nvPr>
+        </p:nvSpPr>
+        <p:spPr/>
+        <p:txBody>
+          <a:bodyPr/>
+          <a:lstStyle/>
+          <a:p>
+            <a:endParaRPr lang="en-US" dirty="0"/>
+          </a:p>
+        </p:txBody>
+      </p:sp>
+      <p:sp>
+        <p:nvSpPr>
+          <p:cNvPr id="4" name="Slide Number Placeholder 3"/>
+          <p:cNvSpPr>
+            <a:spLocks noGrp="1"/>
+          </p:cNvSpPr>
+          <p:nvPr>
+            <p:ph type="sldNum" sz="quarter" idx="5"/>
+          </p:nvPr>
+        </p:nvSpPr>
+        <p:spPr/>
+        <p:txBody>
+          <a:bodyPr/>
+          <a:lstStyle/>
+          <a:p>
+            <a:fld id="{3CFA0038-7055-434C-B6C4-B8C69565C600}" type="slidenum">
+              <a:rPr lang="en-US" smtClean="0"/>
+              <a:t>12</a:t>
+            </a:fld>
+            <a:endParaRPr lang="en-US" dirty="0"/>
+          </a:p>
+        </p:txBody>
+      </p:sp>
+    </p:spTree>
+    <p:extLst>
+      <p:ext uri="{BB962C8B-B14F-4D97-AF65-F5344CB8AC3E}">
+        <p14:creationId xmlns:p14="http://schemas.microsoft.com/office/powerpoint/2010/main" val="3243940069"/>
+      </p:ext>
+    </p:extLst>
+  </p:cSld>
+  <p:clrMapOvr>
+    <a:masterClrMapping/>
+  </p:clrMapOvr>
+</p:notes>
+</file>
+
+<file path=ppt/notesSlides/notesSlide12.xml><?xml version="1.0" encoding="utf-8"?>
+<p:notes xmlns:a="http://schemas.openxmlformats.org/drawingml/2006/main" xmlns:r="http://schemas.openxmlformats.org/officeDocument/2006/relationships" xmlns:p="http://schemas.openxmlformats.org/presentationml/2006/main">
+  <p:cSld>
+    <p:spTree>
+      <p:nvGrpSpPr>
+        <p:cNvPr id="1" name=""/>
+        <p:cNvGrpSpPr/>
+        <p:nvPr/>
+      </p:nvGrpSpPr>
+      <p:grpSpPr>
+        <a:xfrm>
+          <a:off x="0" y="0"/>
+          <a:ext cx="0" cy="0"/>
+          <a:chOff x="0" y="0"/>
+          <a:chExt cx="0" cy="0"/>
+        </a:xfrm>
+      </p:grpSpPr>
+      <p:sp>
+        <p:nvSpPr>
+          <p:cNvPr id="2" name="Slide Image Placeholder 1"/>
+          <p:cNvSpPr>
+            <a:spLocks noGrp="1" noRot="1" noChangeAspect="1"/>
+          </p:cNvSpPr>
+          <p:nvPr>
+            <p:ph type="sldImg"/>
+          </p:nvPr>
+        </p:nvSpPr>
+        <p:spPr/>
+      </p:sp>
+      <p:sp>
+        <p:nvSpPr>
+          <p:cNvPr id="3" name="Notes Placeholder 2"/>
+          <p:cNvSpPr>
+            <a:spLocks noGrp="1"/>
+          </p:cNvSpPr>
+          <p:nvPr>
+            <p:ph type="body" idx="1"/>
+          </p:nvPr>
+        </p:nvSpPr>
+        <p:spPr/>
+        <p:txBody>
+          <a:bodyPr/>
+          <a:lstStyle/>
+          <a:p>
+            <a:endParaRPr lang="en-US" dirty="0"/>
+          </a:p>
+        </p:txBody>
+      </p:sp>
+      <p:sp>
+        <p:nvSpPr>
+          <p:cNvPr id="4" name="Slide Number Placeholder 3"/>
+          <p:cNvSpPr>
+            <a:spLocks noGrp="1"/>
+          </p:cNvSpPr>
+          <p:nvPr>
+            <p:ph type="sldNum" sz="quarter" idx="5"/>
+          </p:nvPr>
+        </p:nvSpPr>
+        <p:spPr/>
+        <p:txBody>
+          <a:bodyPr/>
+          <a:lstStyle/>
+          <a:p>
+            <a:fld id="{3CFA0038-7055-434C-B6C4-B8C69565C600}" type="slidenum">
+              <a:rPr lang="en-US" smtClean="0"/>
+              <a:t>13</a:t>
+            </a:fld>
+            <a:endParaRPr lang="en-US" dirty="0"/>
+          </a:p>
+        </p:txBody>
+      </p:sp>
+    </p:spTree>
+    <p:extLst>
+      <p:ext uri="{BB962C8B-B14F-4D97-AF65-F5344CB8AC3E}">
+        <p14:creationId xmlns:p14="http://schemas.microsoft.com/office/powerpoint/2010/main" val="3186800119"/>
+      </p:ext>
+    </p:extLst>
+  </p:cSld>
+  <p:clrMapOvr>
+    <a:masterClrMapping/>
+  </p:clrMapOvr>
+</p:notes>
+</file>
+
 <file path=ppt/notesSlides/notesSlide2.xml><?xml version="1.0" encoding="utf-8"?>
 <p:notes xmlns:a="http://schemas.openxmlformats.org/drawingml/2006/main" xmlns:r="http://schemas.openxmlformats.org/officeDocument/2006/relationships" xmlns:p="http://schemas.openxmlformats.org/presentationml/2006/main">
   <p:cSld>
@@ -2402,7 +3014,7 @@
     </p:spTree>
     <p:extLst>
       <p:ext uri="{BB962C8B-B14F-4D97-AF65-F5344CB8AC3E}">
-        <p14:creationId xmlns:p14="http://schemas.microsoft.com/office/powerpoint/2010/main" val="525550156"/>
+        <p14:creationId xmlns:p14="http://schemas.microsoft.com/office/powerpoint/2010/main" val="1699044950"/>
       </p:ext>
     </p:extLst>
   </p:cSld>
@@ -2486,7 +3098,7 @@
     </p:spTree>
     <p:extLst>
       <p:ext uri="{BB962C8B-B14F-4D97-AF65-F5344CB8AC3E}">
-        <p14:creationId xmlns:p14="http://schemas.microsoft.com/office/powerpoint/2010/main" val="3695746061"/>
+        <p14:creationId xmlns:p14="http://schemas.microsoft.com/office/powerpoint/2010/main" val="525550156"/>
       </p:ext>
     </p:extLst>
   </p:cSld>
@@ -2570,7 +3182,7 @@
     </p:spTree>
     <p:extLst>
       <p:ext uri="{BB962C8B-B14F-4D97-AF65-F5344CB8AC3E}">
-        <p14:creationId xmlns:p14="http://schemas.microsoft.com/office/powerpoint/2010/main" val="400531086"/>
+        <p14:creationId xmlns:p14="http://schemas.microsoft.com/office/powerpoint/2010/main" val="3695746061"/>
       </p:ext>
     </p:extLst>
   </p:cSld>
@@ -2654,7 +3266,7 @@
     </p:spTree>
     <p:extLst>
       <p:ext uri="{BB962C8B-B14F-4D97-AF65-F5344CB8AC3E}">
-        <p14:creationId xmlns:p14="http://schemas.microsoft.com/office/powerpoint/2010/main" val="1699044950"/>
+        <p14:creationId xmlns:p14="http://schemas.microsoft.com/office/powerpoint/2010/main" val="2942531351"/>
       </p:ext>
     </p:extLst>
   </p:cSld>
@@ -2738,7 +3350,7 @@
     </p:spTree>
     <p:extLst>
       <p:ext uri="{BB962C8B-B14F-4D97-AF65-F5344CB8AC3E}">
-        <p14:creationId xmlns:p14="http://schemas.microsoft.com/office/powerpoint/2010/main" val="2663438760"/>
+        <p14:creationId xmlns:p14="http://schemas.microsoft.com/office/powerpoint/2010/main" val="400531086"/>
       </p:ext>
     </p:extLst>
   </p:cSld>
@@ -2822,7 +3434,7 @@
     </p:spTree>
     <p:extLst>
       <p:ext uri="{BB962C8B-B14F-4D97-AF65-F5344CB8AC3E}">
-        <p14:creationId xmlns:p14="http://schemas.microsoft.com/office/powerpoint/2010/main" val="3243940069"/>
+        <p14:creationId xmlns:p14="http://schemas.microsoft.com/office/powerpoint/2010/main" val="2379141903"/>
       </p:ext>
     </p:extLst>
   </p:cSld>
@@ -2897,7 +3509,7 @@
           <a:p>
             <a:fld id="{3CFA0038-7055-434C-B6C4-B8C69565C600}" type="slidenum">
               <a:rPr lang="en-US" smtClean="0"/>
-              <a:t>9</a:t>
+              <a:t>10</a:t>
             </a:fld>
             <a:endParaRPr lang="en-US" dirty="0"/>
           </a:p>
@@ -2906,7 +3518,7 @@
     </p:spTree>
     <p:extLst>
       <p:ext uri="{BB962C8B-B14F-4D97-AF65-F5344CB8AC3E}">
-        <p14:creationId xmlns:p14="http://schemas.microsoft.com/office/powerpoint/2010/main" val="3186800119"/>
+        <p14:creationId xmlns:p14="http://schemas.microsoft.com/office/powerpoint/2010/main" val="2704731012"/>
       </p:ext>
     </p:extLst>
   </p:cSld>
@@ -19176,7 +19788,7 @@
                 </a:solidFill>
                 <a:latin typeface="+mn-lt"/>
               </a:rPr>
-              <a:t>CLICK TO ADD TITLE</a:t>
+              <a:t>OpenWeather Air Quality Index Analysis</a:t>
             </a:r>
           </a:p>
         </p:txBody>
@@ -19208,7 +19820,7 @@
                   <a:schemeClr val="bg1"/>
                 </a:solidFill>
               </a:rPr>
-              <a:t>SUBTITLE GOES HERE</a:t>
+              <a:t>GWU Data Analytics &amp; Visualization Bootcamp, Spring/Summer 2021</a:t>
             </a:r>
           </a:p>
           <a:p>
@@ -19238,15 +19850,1368 @@
         </p:blipFill>
         <p:spPr>
           <a:xfrm>
-            <a:off x="2056279" y="1806575"/>
+            <a:off x="2056279" y="1593850"/>
             <a:ext cx="8079441" cy="4578350"/>
           </a:xfrm>
         </p:spPr>
       </p:pic>
+      <p:sp>
+        <p:nvSpPr>
+          <p:cNvPr id="5" name="Text Placeholder 5">
+            <a:extLst>
+              <a:ext uri="{FF2B5EF4-FFF2-40B4-BE49-F238E27FC236}">
+                <a16:creationId xmlns:a16="http://schemas.microsoft.com/office/drawing/2014/main" id="{81B04E09-F326-4675-97CD-9748AD7BBE9D}"/>
+              </a:ext>
+            </a:extLst>
+          </p:cNvPr>
+          <p:cNvSpPr txBox="1">
+            <a:spLocks/>
+          </p:cNvSpPr>
+          <p:nvPr/>
+        </p:nvSpPr>
+        <p:spPr>
+          <a:xfrm>
+            <a:off x="647700" y="6189806"/>
+            <a:ext cx="10896600" cy="602887"/>
+          </a:xfrm>
+          <a:prstGeom prst="rect">
+            <a:avLst/>
+          </a:prstGeom>
+        </p:spPr>
+        <p:txBody>
+          <a:bodyPr vert="horz" lIns="91440" tIns="45720" rIns="91440" bIns="45720" rtlCol="0" anchor="ctr">
+            <a:normAutofit/>
+          </a:bodyPr>
+          <a:lstStyle>
+            <a:lvl1pPr marL="0" indent="0" algn="ctr" defTabSz="914400" rtl="0" eaLnBrk="1" latinLnBrk="0" hangingPunct="1">
+              <a:lnSpc>
+                <a:spcPct val="90000"/>
+              </a:lnSpc>
+              <a:spcBef>
+                <a:spcPts val="1000"/>
+              </a:spcBef>
+              <a:buFont typeface="Arial" panose="020B0604020202020204" pitchFamily="34" charset="0"/>
+              <a:buNone/>
+              <a:defRPr sz="1400" b="0" i="0" kern="1200" spc="300">
+                <a:solidFill>
+                  <a:schemeClr val="tx2"/>
+                </a:solidFill>
+                <a:latin typeface="+mn-lt"/>
+                <a:ea typeface="+mn-ea"/>
+                <a:cs typeface="Arial" panose="020B0604020202020204" pitchFamily="34" charset="0"/>
+              </a:defRPr>
+            </a:lvl1pPr>
+            <a:lvl2pPr marL="685800" indent="-228600" algn="l" defTabSz="914400" rtl="0" eaLnBrk="1" latinLnBrk="0" hangingPunct="1">
+              <a:lnSpc>
+                <a:spcPct val="90000"/>
+              </a:lnSpc>
+              <a:spcBef>
+                <a:spcPts val="500"/>
+              </a:spcBef>
+              <a:buFont typeface="Arial" panose="020B0604020202020204" pitchFamily="34" charset="0"/>
+              <a:buChar char="•"/>
+              <a:defRPr sz="1100" b="0" i="0" kern="1200">
+                <a:solidFill>
+                  <a:schemeClr val="tx2"/>
+                </a:solidFill>
+                <a:latin typeface="+mn-lt"/>
+                <a:ea typeface="+mn-ea"/>
+                <a:cs typeface="Arial" panose="020B0604020202020204" pitchFamily="34" charset="0"/>
+              </a:defRPr>
+            </a:lvl2pPr>
+            <a:lvl3pPr marL="1143000" indent="-228600" algn="l" defTabSz="914400" rtl="0" eaLnBrk="1" latinLnBrk="0" hangingPunct="1">
+              <a:lnSpc>
+                <a:spcPct val="90000"/>
+              </a:lnSpc>
+              <a:spcBef>
+                <a:spcPts val="500"/>
+              </a:spcBef>
+              <a:buFont typeface="Arial" panose="020B0604020202020204" pitchFamily="34" charset="0"/>
+              <a:buChar char="•"/>
+              <a:defRPr sz="1050" b="0" i="0" kern="1200">
+                <a:solidFill>
+                  <a:schemeClr val="tx2"/>
+                </a:solidFill>
+                <a:latin typeface="+mn-lt"/>
+                <a:ea typeface="+mn-ea"/>
+                <a:cs typeface="Arial" panose="020B0604020202020204" pitchFamily="34" charset="0"/>
+              </a:defRPr>
+            </a:lvl3pPr>
+            <a:lvl4pPr marL="1600200" indent="-228600" algn="l" defTabSz="914400" rtl="0" eaLnBrk="1" latinLnBrk="0" hangingPunct="1">
+              <a:lnSpc>
+                <a:spcPct val="90000"/>
+              </a:lnSpc>
+              <a:spcBef>
+                <a:spcPts val="500"/>
+              </a:spcBef>
+              <a:buFont typeface="Arial" panose="020B0604020202020204" pitchFamily="34" charset="0"/>
+              <a:buChar char="•"/>
+              <a:defRPr sz="1000" b="0" i="0" kern="1200">
+                <a:solidFill>
+                  <a:schemeClr val="tx2"/>
+                </a:solidFill>
+                <a:latin typeface="+mn-lt"/>
+                <a:ea typeface="+mn-ea"/>
+                <a:cs typeface="Arial" panose="020B0604020202020204" pitchFamily="34" charset="0"/>
+              </a:defRPr>
+            </a:lvl4pPr>
+            <a:lvl5pPr marL="2057400" indent="-228600" algn="l" defTabSz="914400" rtl="0" eaLnBrk="1" latinLnBrk="0" hangingPunct="1">
+              <a:lnSpc>
+                <a:spcPct val="90000"/>
+              </a:lnSpc>
+              <a:spcBef>
+                <a:spcPts val="500"/>
+              </a:spcBef>
+              <a:buFont typeface="Arial" panose="020B0604020202020204" pitchFamily="34" charset="0"/>
+              <a:buChar char="•"/>
+              <a:defRPr sz="1000" b="0" i="0" kern="1200">
+                <a:solidFill>
+                  <a:schemeClr val="tx2"/>
+                </a:solidFill>
+                <a:latin typeface="+mn-lt"/>
+                <a:ea typeface="+mn-ea"/>
+                <a:cs typeface="Arial" panose="020B0604020202020204" pitchFamily="34" charset="0"/>
+              </a:defRPr>
+            </a:lvl5pPr>
+            <a:lvl6pPr marL="2514600" indent="-228600" algn="l" defTabSz="914400" rtl="0" eaLnBrk="1" latinLnBrk="0" hangingPunct="1">
+              <a:lnSpc>
+                <a:spcPct val="90000"/>
+              </a:lnSpc>
+              <a:spcBef>
+                <a:spcPts val="500"/>
+              </a:spcBef>
+              <a:buFont typeface="Arial" panose="020B0604020202020204" pitchFamily="34" charset="0"/>
+              <a:buChar char="•"/>
+              <a:defRPr sz="1800" kern="1200">
+                <a:solidFill>
+                  <a:schemeClr val="tx1"/>
+                </a:solidFill>
+                <a:latin typeface="+mn-lt"/>
+                <a:ea typeface="+mn-ea"/>
+                <a:cs typeface="+mn-cs"/>
+              </a:defRPr>
+            </a:lvl6pPr>
+            <a:lvl7pPr marL="2971800" indent="-228600" algn="l" defTabSz="914400" rtl="0" eaLnBrk="1" latinLnBrk="0" hangingPunct="1">
+              <a:lnSpc>
+                <a:spcPct val="90000"/>
+              </a:lnSpc>
+              <a:spcBef>
+                <a:spcPts val="500"/>
+              </a:spcBef>
+              <a:buFont typeface="Arial" panose="020B0604020202020204" pitchFamily="34" charset="0"/>
+              <a:buChar char="•"/>
+              <a:defRPr sz="1800" kern="1200">
+                <a:solidFill>
+                  <a:schemeClr val="tx1"/>
+                </a:solidFill>
+                <a:latin typeface="+mn-lt"/>
+                <a:ea typeface="+mn-ea"/>
+                <a:cs typeface="+mn-cs"/>
+              </a:defRPr>
+            </a:lvl7pPr>
+            <a:lvl8pPr marL="3429000" indent="-228600" algn="l" defTabSz="914400" rtl="0" eaLnBrk="1" latinLnBrk="0" hangingPunct="1">
+              <a:lnSpc>
+                <a:spcPct val="90000"/>
+              </a:lnSpc>
+              <a:spcBef>
+                <a:spcPts val="500"/>
+              </a:spcBef>
+              <a:buFont typeface="Arial" panose="020B0604020202020204" pitchFamily="34" charset="0"/>
+              <a:buChar char="•"/>
+              <a:defRPr sz="1800" kern="1200">
+                <a:solidFill>
+                  <a:schemeClr val="tx1"/>
+                </a:solidFill>
+                <a:latin typeface="+mn-lt"/>
+                <a:ea typeface="+mn-ea"/>
+                <a:cs typeface="+mn-cs"/>
+              </a:defRPr>
+            </a:lvl8pPr>
+            <a:lvl9pPr marL="3886200" indent="-228600" algn="l" defTabSz="914400" rtl="0" eaLnBrk="1" latinLnBrk="0" hangingPunct="1">
+              <a:lnSpc>
+                <a:spcPct val="90000"/>
+              </a:lnSpc>
+              <a:spcBef>
+                <a:spcPts val="500"/>
+              </a:spcBef>
+              <a:buFont typeface="Arial" panose="020B0604020202020204" pitchFamily="34" charset="0"/>
+              <a:buChar char="•"/>
+              <a:defRPr sz="1800" kern="1200">
+                <a:solidFill>
+                  <a:schemeClr val="tx1"/>
+                </a:solidFill>
+                <a:latin typeface="+mn-lt"/>
+                <a:ea typeface="+mn-ea"/>
+                <a:cs typeface="+mn-cs"/>
+              </a:defRPr>
+            </a:lvl9pPr>
+          </a:lstStyle>
+          <a:p>
+            <a:r>
+              <a:rPr lang="en-US" b="1" dirty="0">
+                <a:solidFill>
+                  <a:schemeClr val="bg1"/>
+                </a:solidFill>
+              </a:rPr>
+              <a:t>By Michelle Reilly &amp; Elodie </a:t>
+            </a:r>
+            <a:r>
+              <a:rPr lang="en-US" b="1" dirty="0" err="1">
+                <a:solidFill>
+                  <a:schemeClr val="bg1"/>
+                </a:solidFill>
+              </a:rPr>
+              <a:t>Slawinski</a:t>
+            </a:r>
+            <a:endParaRPr lang="en-US" b="1" dirty="0">
+              <a:solidFill>
+                <a:schemeClr val="bg1"/>
+              </a:solidFill>
+            </a:endParaRPr>
+          </a:p>
+          <a:p>
+            <a:endParaRPr lang="en-US" dirty="0"/>
+          </a:p>
+        </p:txBody>
+      </p:sp>
     </p:spTree>
     <p:extLst>
       <p:ext uri="{BB962C8B-B14F-4D97-AF65-F5344CB8AC3E}">
         <p14:creationId xmlns:p14="http://schemas.microsoft.com/office/powerpoint/2010/main" val="2439656135"/>
+      </p:ext>
+    </p:extLst>
+  </p:cSld>
+  <p:clrMapOvr>
+    <a:masterClrMapping/>
+  </p:clrMapOvr>
+</p:sld>
+</file>
+
+<file path=ppt/slides/slide10.xml><?xml version="1.0" encoding="utf-8"?>
+<p:sld xmlns:a="http://schemas.openxmlformats.org/drawingml/2006/main" xmlns:r="http://schemas.openxmlformats.org/officeDocument/2006/relationships" xmlns:p="http://schemas.openxmlformats.org/presentationml/2006/main">
+  <p:cSld>
+    <p:bg>
+      <p:bgPr>
+        <a:solidFill>
+          <a:srgbClr val="5DAAB0"/>
+        </a:solidFill>
+        <a:effectLst/>
+      </p:bgPr>
+    </p:bg>
+    <p:spTree>
+      <p:nvGrpSpPr>
+        <p:cNvPr id="1" name=""/>
+        <p:cNvGrpSpPr/>
+        <p:nvPr/>
+      </p:nvGrpSpPr>
+      <p:grpSpPr>
+        <a:xfrm>
+          <a:off x="0" y="0"/>
+          <a:ext cx="0" cy="0"/>
+          <a:chOff x="0" y="0"/>
+          <a:chExt cx="0" cy="0"/>
+        </a:xfrm>
+      </p:grpSpPr>
+      <p:sp>
+        <p:nvSpPr>
+          <p:cNvPr id="4" name="Text Placeholder 3">
+            <a:extLst>
+              <a:ext uri="{FF2B5EF4-FFF2-40B4-BE49-F238E27FC236}">
+                <a16:creationId xmlns:a16="http://schemas.microsoft.com/office/drawing/2014/main" id="{FD47FBB8-2A87-4FDD-8742-D0C12871A3DD}"/>
+              </a:ext>
+            </a:extLst>
+          </p:cNvPr>
+          <p:cNvSpPr>
+            <a:spLocks noGrp="1"/>
+          </p:cNvSpPr>
+          <p:nvPr>
+            <p:ph type="body" sz="quarter" idx="10"/>
+          </p:nvPr>
+        </p:nvSpPr>
+        <p:spPr/>
+        <p:txBody>
+          <a:bodyPr/>
+          <a:lstStyle/>
+          <a:p>
+            <a:r>
+              <a:rPr lang="en-US" dirty="0">
+                <a:solidFill>
+                  <a:schemeClr val="bg1">
+                    <a:alpha val="20000"/>
+                  </a:schemeClr>
+                </a:solidFill>
+                <a:latin typeface="+mn-lt"/>
+              </a:rPr>
+              <a:t>1</a:t>
+            </a:r>
+          </a:p>
+        </p:txBody>
+      </p:sp>
+      <p:sp>
+        <p:nvSpPr>
+          <p:cNvPr id="3" name="Title 2">
+            <a:extLst>
+              <a:ext uri="{FF2B5EF4-FFF2-40B4-BE49-F238E27FC236}">
+                <a16:creationId xmlns:a16="http://schemas.microsoft.com/office/drawing/2014/main" id="{F73D75BE-E7AD-49A1-A453-D007D958AC3D}"/>
+              </a:ext>
+            </a:extLst>
+          </p:cNvPr>
+          <p:cNvSpPr>
+            <a:spLocks noGrp="1"/>
+          </p:cNvSpPr>
+          <p:nvPr>
+            <p:ph type="title"/>
+          </p:nvPr>
+        </p:nvSpPr>
+        <p:spPr/>
+        <p:txBody>
+          <a:bodyPr>
+            <a:normAutofit fontScale="90000"/>
+          </a:bodyPr>
+          <a:lstStyle/>
+          <a:p>
+            <a:r>
+              <a:rPr lang="en-US" dirty="0">
+                <a:solidFill>
+                  <a:schemeClr val="bg1"/>
+                </a:solidFill>
+                <a:latin typeface="+mn-lt"/>
+              </a:rPr>
+              <a:t>Section Header </a:t>
+            </a:r>
+          </a:p>
+        </p:txBody>
+      </p:sp>
+    </p:spTree>
+    <p:extLst>
+      <p:ext uri="{BB962C8B-B14F-4D97-AF65-F5344CB8AC3E}">
+        <p14:creationId xmlns:p14="http://schemas.microsoft.com/office/powerpoint/2010/main" val="3341258257"/>
+      </p:ext>
+    </p:extLst>
+  </p:cSld>
+  <p:clrMapOvr>
+    <a:masterClrMapping/>
+  </p:clrMapOvr>
+</p:sld>
+</file>
+
+<file path=ppt/slides/slide11.xml><?xml version="1.0" encoding="utf-8"?>
+<p:sld xmlns:a="http://schemas.openxmlformats.org/drawingml/2006/main" xmlns:r="http://schemas.openxmlformats.org/officeDocument/2006/relationships" xmlns:p="http://schemas.openxmlformats.org/presentationml/2006/main">
+  <p:cSld>
+    <p:spTree>
+      <p:nvGrpSpPr>
+        <p:cNvPr id="1" name=""/>
+        <p:cNvGrpSpPr/>
+        <p:nvPr/>
+      </p:nvGrpSpPr>
+      <p:grpSpPr>
+        <a:xfrm>
+          <a:off x="0" y="0"/>
+          <a:ext cx="0" cy="0"/>
+          <a:chOff x="0" y="0"/>
+          <a:chExt cx="0" cy="0"/>
+        </a:xfrm>
+      </p:grpSpPr>
+      <p:sp>
+        <p:nvSpPr>
+          <p:cNvPr id="5" name="Title 4">
+            <a:extLst>
+              <a:ext uri="{FF2B5EF4-FFF2-40B4-BE49-F238E27FC236}">
+                <a16:creationId xmlns:a16="http://schemas.microsoft.com/office/drawing/2014/main" id="{96DBE169-BA91-4B17-9AF2-4BAD528BEE06}"/>
+              </a:ext>
+            </a:extLst>
+          </p:cNvPr>
+          <p:cNvSpPr>
+            <a:spLocks noGrp="1"/>
+          </p:cNvSpPr>
+          <p:nvPr>
+            <p:ph type="title"/>
+          </p:nvPr>
+        </p:nvSpPr>
+        <p:spPr/>
+        <p:txBody>
+          <a:bodyPr>
+            <a:normAutofit fontScale="90000"/>
+          </a:bodyPr>
+          <a:lstStyle/>
+          <a:p>
+            <a:r>
+              <a:rPr lang="en-US" dirty="0"/>
+              <a:t>Click to Add Icon </a:t>
+            </a:r>
+            <a:r>
+              <a:rPr lang="en-US" dirty="0">
+                <a:solidFill>
+                  <a:srgbClr val="5DAAB0"/>
+                </a:solidFill>
+              </a:rPr>
+              <a:t>Slide Title Here </a:t>
+            </a:r>
+          </a:p>
+        </p:txBody>
+      </p:sp>
+      <p:sp>
+        <p:nvSpPr>
+          <p:cNvPr id="8" name="Text Placeholder 7">
+            <a:extLst>
+              <a:ext uri="{FF2B5EF4-FFF2-40B4-BE49-F238E27FC236}">
+                <a16:creationId xmlns:a16="http://schemas.microsoft.com/office/drawing/2014/main" id="{D9C2EAA8-D3C6-403B-B439-F95C60D0B3B9}"/>
+              </a:ext>
+            </a:extLst>
+          </p:cNvPr>
+          <p:cNvSpPr>
+            <a:spLocks noGrp="1"/>
+          </p:cNvSpPr>
+          <p:nvPr>
+            <p:ph type="body" sz="quarter" idx="12"/>
+          </p:nvPr>
+        </p:nvSpPr>
+        <p:spPr/>
+        <p:txBody>
+          <a:bodyPr/>
+          <a:lstStyle/>
+          <a:p>
+            <a:r>
+              <a:rPr lang="en-US" dirty="0"/>
+              <a:t>SUBTITLE GOES HERE</a:t>
+            </a:r>
+          </a:p>
+        </p:txBody>
+      </p:sp>
+      <p:pic>
+        <p:nvPicPr>
+          <p:cNvPr id="46" name="Picture Placeholder 45">
+            <a:extLst>
+              <a:ext uri="{FF2B5EF4-FFF2-40B4-BE49-F238E27FC236}">
+                <a16:creationId xmlns:a16="http://schemas.microsoft.com/office/drawing/2014/main" id="{6263CE43-D410-4BF8-8529-41197F401002}"/>
+              </a:ext>
+              <a:ext uri="{C183D7F6-B498-43B3-948B-1728B52AA6E4}">
+                <adec:decorative xmlns:adec="http://schemas.microsoft.com/office/drawing/2017/decorative" val="1"/>
+              </a:ext>
+            </a:extLst>
+          </p:cNvPr>
+          <p:cNvPicPr>
+            <a:picLocks noGrp="1" noChangeAspect="1"/>
+          </p:cNvPicPr>
+          <p:nvPr>
+            <p:ph type="pic" sz="quarter" idx="13"/>
+          </p:nvPr>
+        </p:nvPicPr>
+        <p:blipFill rotWithShape="1">
+          <a:blip r:embed="rId3" cstate="screen">
+            <a:extLst>
+              <a:ext uri="{28A0092B-C50C-407E-A947-70E740481C1C}">
+                <a14:useLocalDpi xmlns:a14="http://schemas.microsoft.com/office/drawing/2010/main"/>
+              </a:ext>
+              <a:ext uri="{96DAC541-7B7A-43D3-8B79-37D633B846F1}">
+                <asvg:svgBlip xmlns:asvg="http://schemas.microsoft.com/office/drawing/2016/SVG/main" r:embed="rId4"/>
+              </a:ext>
+            </a:extLst>
+          </a:blip>
+          <a:srcRect l="-29560" t="-29716" r="-29560" b="-29716"/>
+          <a:stretch/>
+        </p:blipFill>
+        <p:spPr>
+          <a:xfrm>
+            <a:off x="6687422" y="1038724"/>
+            <a:ext cx="804759" cy="804759"/>
+          </a:xfrm>
+        </p:spPr>
+      </p:pic>
+      <p:pic>
+        <p:nvPicPr>
+          <p:cNvPr id="50" name="Picture Placeholder 49">
+            <a:extLst>
+              <a:ext uri="{FF2B5EF4-FFF2-40B4-BE49-F238E27FC236}">
+                <a16:creationId xmlns:a16="http://schemas.microsoft.com/office/drawing/2014/main" id="{44B7CF38-0B19-41D9-8D37-6D59A3F3E045}"/>
+              </a:ext>
+              <a:ext uri="{C183D7F6-B498-43B3-948B-1728B52AA6E4}">
+                <adec:decorative xmlns:adec="http://schemas.microsoft.com/office/drawing/2017/decorative" val="1"/>
+              </a:ext>
+            </a:extLst>
+          </p:cNvPr>
+          <p:cNvPicPr>
+            <a:picLocks noGrp="1" noChangeAspect="1"/>
+          </p:cNvPicPr>
+          <p:nvPr>
+            <p:ph type="pic" sz="quarter" idx="14"/>
+          </p:nvPr>
+        </p:nvPicPr>
+        <p:blipFill rotWithShape="1">
+          <a:blip r:embed="rId5" cstate="screen">
+            <a:extLst>
+              <a:ext uri="{28A0092B-C50C-407E-A947-70E740481C1C}">
+                <a14:useLocalDpi xmlns:a14="http://schemas.microsoft.com/office/drawing/2010/main"/>
+              </a:ext>
+              <a:ext uri="{96DAC541-7B7A-43D3-8B79-37D633B846F1}">
+                <asvg:svgBlip xmlns:asvg="http://schemas.microsoft.com/office/drawing/2016/SVG/main" r:embed="rId6"/>
+              </a:ext>
+            </a:extLst>
+          </a:blip>
+          <a:srcRect l="-22179" t="-22322" r="-22179" b="-22322"/>
+          <a:stretch/>
+        </p:blipFill>
+        <p:spPr>
+          <a:xfrm>
+            <a:off x="6687422" y="2330235"/>
+            <a:ext cx="804759" cy="804759"/>
+          </a:xfrm>
+        </p:spPr>
+      </p:pic>
+      <p:pic>
+        <p:nvPicPr>
+          <p:cNvPr id="52" name="Picture Placeholder 51">
+            <a:extLst>
+              <a:ext uri="{FF2B5EF4-FFF2-40B4-BE49-F238E27FC236}">
+                <a16:creationId xmlns:a16="http://schemas.microsoft.com/office/drawing/2014/main" id="{26AA0551-AA74-4E7E-80AF-5D856020D1F8}"/>
+              </a:ext>
+              <a:ext uri="{C183D7F6-B498-43B3-948B-1728B52AA6E4}">
+                <adec:decorative xmlns:adec="http://schemas.microsoft.com/office/drawing/2017/decorative" val="1"/>
+              </a:ext>
+            </a:extLst>
+          </p:cNvPr>
+          <p:cNvPicPr>
+            <a:picLocks noGrp="1" noChangeAspect="1"/>
+          </p:cNvPicPr>
+          <p:nvPr>
+            <p:ph type="pic" sz="quarter" idx="15"/>
+          </p:nvPr>
+        </p:nvPicPr>
+        <p:blipFill rotWithShape="1">
+          <a:blip r:embed="rId7" cstate="screen">
+            <a:extLst>
+              <a:ext uri="{28A0092B-C50C-407E-A947-70E740481C1C}">
+                <a14:useLocalDpi xmlns:a14="http://schemas.microsoft.com/office/drawing/2010/main"/>
+              </a:ext>
+              <a:ext uri="{96DAC541-7B7A-43D3-8B79-37D633B846F1}">
+                <asvg:svgBlip xmlns:asvg="http://schemas.microsoft.com/office/drawing/2016/SVG/main" r:embed="rId8"/>
+              </a:ext>
+            </a:extLst>
+          </a:blip>
+          <a:srcRect l="-27274" t="-27427" r="-27274" b="-27427"/>
+          <a:stretch/>
+        </p:blipFill>
+        <p:spPr>
+          <a:xfrm>
+            <a:off x="6687422" y="3621746"/>
+            <a:ext cx="804759" cy="804759"/>
+          </a:xfrm>
+        </p:spPr>
+      </p:pic>
+      <p:pic>
+        <p:nvPicPr>
+          <p:cNvPr id="54" name="Picture Placeholder 53">
+            <a:extLst>
+              <a:ext uri="{FF2B5EF4-FFF2-40B4-BE49-F238E27FC236}">
+                <a16:creationId xmlns:a16="http://schemas.microsoft.com/office/drawing/2014/main" id="{21139392-74B8-43B3-BFDF-58CAC133651E}"/>
+              </a:ext>
+              <a:ext uri="{C183D7F6-B498-43B3-948B-1728B52AA6E4}">
+                <adec:decorative xmlns:adec="http://schemas.microsoft.com/office/drawing/2017/decorative" val="1"/>
+              </a:ext>
+            </a:extLst>
+          </p:cNvPr>
+          <p:cNvPicPr>
+            <a:picLocks noGrp="1" noChangeAspect="1"/>
+          </p:cNvPicPr>
+          <p:nvPr>
+            <p:ph type="pic" sz="quarter" idx="16"/>
+          </p:nvPr>
+        </p:nvPicPr>
+        <p:blipFill rotWithShape="1">
+          <a:blip r:embed="rId9" cstate="screen">
+            <a:extLst>
+              <a:ext uri="{28A0092B-C50C-407E-A947-70E740481C1C}">
+                <a14:useLocalDpi xmlns:a14="http://schemas.microsoft.com/office/drawing/2010/main"/>
+              </a:ext>
+              <a:ext uri="{96DAC541-7B7A-43D3-8B79-37D633B846F1}">
+                <asvg:svgBlip xmlns:asvg="http://schemas.microsoft.com/office/drawing/2016/SVG/main" r:embed="rId10"/>
+              </a:ext>
+            </a:extLst>
+          </a:blip>
+          <a:srcRect l="-30855" t="-31015" r="-30855" b="-31015"/>
+          <a:stretch/>
+        </p:blipFill>
+        <p:spPr>
+          <a:xfrm>
+            <a:off x="6687422" y="4913257"/>
+            <a:ext cx="804759" cy="804759"/>
+          </a:xfrm>
+        </p:spPr>
+      </p:pic>
+      <p:sp>
+        <p:nvSpPr>
+          <p:cNvPr id="7" name="Text Placeholder 6">
+            <a:extLst>
+              <a:ext uri="{FF2B5EF4-FFF2-40B4-BE49-F238E27FC236}">
+                <a16:creationId xmlns:a16="http://schemas.microsoft.com/office/drawing/2014/main" id="{87FCC6D1-213C-4A86-A2D0-742E15438C09}"/>
+              </a:ext>
+            </a:extLst>
+          </p:cNvPr>
+          <p:cNvSpPr>
+            <a:spLocks noGrp="1"/>
+          </p:cNvSpPr>
+          <p:nvPr>
+            <p:ph type="body" sz="quarter" idx="17"/>
+          </p:nvPr>
+        </p:nvSpPr>
+        <p:spPr/>
+        <p:txBody>
+          <a:bodyPr>
+            <a:normAutofit/>
+          </a:bodyPr>
+          <a:lstStyle/>
+          <a:p>
+            <a:r>
+              <a:rPr lang="en-US" dirty="0"/>
+              <a:t>Lorem ipsum dolor sit amet, consectetur adipiscing elit. Phasellus auctor efficitur </a:t>
+            </a:r>
+            <a:br>
+              <a:rPr lang="en-US" dirty="0"/>
+            </a:br>
+            <a:r>
+              <a:rPr lang="en-US" dirty="0"/>
+              <a:t>duiet facilisis. </a:t>
+            </a:r>
+          </a:p>
+        </p:txBody>
+      </p:sp>
+      <p:sp>
+        <p:nvSpPr>
+          <p:cNvPr id="20" name="Text Placeholder 19">
+            <a:extLst>
+              <a:ext uri="{FF2B5EF4-FFF2-40B4-BE49-F238E27FC236}">
+                <a16:creationId xmlns:a16="http://schemas.microsoft.com/office/drawing/2014/main" id="{82414D74-66D2-4C65-A48E-39F723FB2B2F}"/>
+              </a:ext>
+            </a:extLst>
+          </p:cNvPr>
+          <p:cNvSpPr>
+            <a:spLocks noGrp="1"/>
+          </p:cNvSpPr>
+          <p:nvPr>
+            <p:ph type="body" sz="quarter" idx="18"/>
+          </p:nvPr>
+        </p:nvSpPr>
+        <p:spPr/>
+        <p:txBody>
+          <a:bodyPr/>
+          <a:lstStyle/>
+          <a:p>
+            <a:r>
+              <a:rPr lang="en-US" dirty="0"/>
+              <a:t>Lorem ipsum dolor sit amet, consectetur adipiscing elit. Phasellus auctor efficitur </a:t>
+            </a:r>
+            <a:br>
+              <a:rPr lang="en-US" dirty="0"/>
+            </a:br>
+            <a:r>
+              <a:rPr lang="en-US" dirty="0"/>
+              <a:t>duiet facilisis. </a:t>
+            </a:r>
+          </a:p>
+        </p:txBody>
+      </p:sp>
+      <p:sp>
+        <p:nvSpPr>
+          <p:cNvPr id="21" name="Text Placeholder 20">
+            <a:extLst>
+              <a:ext uri="{FF2B5EF4-FFF2-40B4-BE49-F238E27FC236}">
+                <a16:creationId xmlns:a16="http://schemas.microsoft.com/office/drawing/2014/main" id="{E4D7EF6E-37B1-4694-B769-3DDEC29D8381}"/>
+              </a:ext>
+            </a:extLst>
+          </p:cNvPr>
+          <p:cNvSpPr>
+            <a:spLocks noGrp="1"/>
+          </p:cNvSpPr>
+          <p:nvPr>
+            <p:ph type="body" sz="quarter" idx="19"/>
+          </p:nvPr>
+        </p:nvSpPr>
+        <p:spPr/>
+        <p:txBody>
+          <a:bodyPr/>
+          <a:lstStyle/>
+          <a:p>
+            <a:r>
+              <a:rPr lang="en-US" dirty="0"/>
+              <a:t>Lorem ipsum dolor sit amet, consectetur adipiscing elit. Phasellus auctor efficitur </a:t>
+            </a:r>
+            <a:br>
+              <a:rPr lang="en-US" dirty="0"/>
+            </a:br>
+            <a:r>
+              <a:rPr lang="en-US" dirty="0"/>
+              <a:t>duiet facilisis. </a:t>
+            </a:r>
+          </a:p>
+        </p:txBody>
+      </p:sp>
+      <p:sp>
+        <p:nvSpPr>
+          <p:cNvPr id="22" name="Text Placeholder 21">
+            <a:extLst>
+              <a:ext uri="{FF2B5EF4-FFF2-40B4-BE49-F238E27FC236}">
+                <a16:creationId xmlns:a16="http://schemas.microsoft.com/office/drawing/2014/main" id="{ABF89FBA-20AC-4FD7-833B-ADA0EEFFCADC}"/>
+              </a:ext>
+            </a:extLst>
+          </p:cNvPr>
+          <p:cNvSpPr>
+            <a:spLocks noGrp="1"/>
+          </p:cNvSpPr>
+          <p:nvPr>
+            <p:ph type="body" sz="quarter" idx="20"/>
+          </p:nvPr>
+        </p:nvSpPr>
+        <p:spPr/>
+        <p:txBody>
+          <a:bodyPr/>
+          <a:lstStyle/>
+          <a:p>
+            <a:r>
+              <a:rPr lang="en-US" dirty="0"/>
+              <a:t>Lorem ipsum dolor sit amet, consectetur adipiscing elit. Phasellus auctor efficitur </a:t>
+            </a:r>
+            <a:br>
+              <a:rPr lang="en-US" dirty="0"/>
+            </a:br>
+            <a:r>
+              <a:rPr lang="en-US" dirty="0"/>
+              <a:t>duiet facilisis. </a:t>
+            </a:r>
+          </a:p>
+        </p:txBody>
+      </p:sp>
+      <p:sp>
+        <p:nvSpPr>
+          <p:cNvPr id="66" name="Text Placeholder 65">
+            <a:extLst>
+              <a:ext uri="{FF2B5EF4-FFF2-40B4-BE49-F238E27FC236}">
+                <a16:creationId xmlns:a16="http://schemas.microsoft.com/office/drawing/2014/main" id="{1AEF3ED8-A75C-4318-877C-139C98C0007D}"/>
+              </a:ext>
+            </a:extLst>
+          </p:cNvPr>
+          <p:cNvSpPr>
+            <a:spLocks noGrp="1"/>
+          </p:cNvSpPr>
+          <p:nvPr>
+            <p:ph type="body" sz="quarter" idx="11"/>
+          </p:nvPr>
+        </p:nvSpPr>
+        <p:spPr/>
+        <p:txBody>
+          <a:bodyPr/>
+          <a:lstStyle/>
+          <a:p>
+            <a:pPr>
+              <a:lnSpc>
+                <a:spcPct val="100000"/>
+              </a:lnSpc>
+            </a:pPr>
+            <a:r>
+              <a:rPr lang="en-US" dirty="0"/>
+              <a:t>Lorem ipsum dolor sit amet, consectetur adipiscing elit. Phasellus auctor efficitur dui et facilisis. Pellentesque habitant morbi tristique senectus et netus et malesuada fames ac turpis egestas. Etiam molestie in quam ac viverra. Cras consequat gravida aliquam. Maecenas cursus eleifend risus, in vulputate velit imperdiet non. Aenean tincidunt euismod ultricies. Fusce tempor dui ipsum, nec ultricies ante eleifend vel curabitur.</a:t>
+            </a:r>
+          </a:p>
+        </p:txBody>
+      </p:sp>
+    </p:spTree>
+    <p:extLst>
+      <p:ext uri="{BB962C8B-B14F-4D97-AF65-F5344CB8AC3E}">
+        <p14:creationId xmlns:p14="http://schemas.microsoft.com/office/powerpoint/2010/main" val="226842063"/>
+      </p:ext>
+    </p:extLst>
+  </p:cSld>
+  <p:clrMapOvr>
+    <a:masterClrMapping/>
+  </p:clrMapOvr>
+</p:sld>
+</file>
+
+<file path=ppt/slides/slide12.xml><?xml version="1.0" encoding="utf-8"?>
+<p:sld xmlns:a="http://schemas.openxmlformats.org/drawingml/2006/main" xmlns:r="http://schemas.openxmlformats.org/officeDocument/2006/relationships" xmlns:p="http://schemas.openxmlformats.org/presentationml/2006/main">
+  <p:cSld>
+    <p:spTree>
+      <p:nvGrpSpPr>
+        <p:cNvPr id="1" name=""/>
+        <p:cNvGrpSpPr/>
+        <p:nvPr/>
+      </p:nvGrpSpPr>
+      <p:grpSpPr>
+        <a:xfrm>
+          <a:off x="0" y="0"/>
+          <a:ext cx="0" cy="0"/>
+          <a:chOff x="0" y="0"/>
+          <a:chExt cx="0" cy="0"/>
+        </a:xfrm>
+      </p:grpSpPr>
+      <p:sp>
+        <p:nvSpPr>
+          <p:cNvPr id="12" name="Title 11">
+            <a:extLst>
+              <a:ext uri="{FF2B5EF4-FFF2-40B4-BE49-F238E27FC236}">
+                <a16:creationId xmlns:a16="http://schemas.microsoft.com/office/drawing/2014/main" id="{13F9A722-C416-4CA0-9E81-3AB439623A87}"/>
+              </a:ext>
+            </a:extLst>
+          </p:cNvPr>
+          <p:cNvSpPr>
+            <a:spLocks noGrp="1"/>
+          </p:cNvSpPr>
+          <p:nvPr>
+            <p:ph type="title"/>
+          </p:nvPr>
+        </p:nvSpPr>
+        <p:spPr/>
+        <p:txBody>
+          <a:bodyPr/>
+          <a:lstStyle/>
+          <a:p>
+            <a:r>
+              <a:rPr lang="en-US" dirty="0">
+                <a:latin typeface="+mn-lt"/>
+              </a:rPr>
+              <a:t>Click to Add Team Slide Title Here </a:t>
+            </a:r>
+          </a:p>
+        </p:txBody>
+      </p:sp>
+      <p:pic>
+        <p:nvPicPr>
+          <p:cNvPr id="25" name="Picture Placeholder 23" descr="Member Photo">
+            <a:extLst>
+              <a:ext uri="{FF2B5EF4-FFF2-40B4-BE49-F238E27FC236}">
+                <a16:creationId xmlns:a16="http://schemas.microsoft.com/office/drawing/2014/main" id="{28471B48-B5D4-4311-8051-3D8458674D12}"/>
+              </a:ext>
+            </a:extLst>
+          </p:cNvPr>
+          <p:cNvPicPr>
+            <a:picLocks noGrp="1" noChangeAspect="1"/>
+          </p:cNvPicPr>
+          <p:nvPr>
+            <p:ph type="pic" sz="quarter" idx="11"/>
+          </p:nvPr>
+        </p:nvPicPr>
+        <p:blipFill>
+          <a:blip r:embed="rId3">
+            <a:grayscl/>
+            <a:extLst>
+              <a:ext uri="{28A0092B-C50C-407E-A947-70E740481C1C}">
+                <a14:useLocalDpi xmlns:a14="http://schemas.microsoft.com/office/drawing/2010/main"/>
+              </a:ext>
+            </a:extLst>
+          </a:blip>
+          <a:srcRect/>
+          <a:stretch>
+            <a:fillRect/>
+          </a:stretch>
+        </p:blipFill>
+        <p:spPr/>
+      </p:pic>
+      <p:pic>
+        <p:nvPicPr>
+          <p:cNvPr id="29" name="Picture Placeholder 25" descr="Member Photo">
+            <a:extLst>
+              <a:ext uri="{FF2B5EF4-FFF2-40B4-BE49-F238E27FC236}">
+                <a16:creationId xmlns:a16="http://schemas.microsoft.com/office/drawing/2014/main" id="{1507C138-F295-471C-A7C2-F827C437DE97}"/>
+              </a:ext>
+            </a:extLst>
+          </p:cNvPr>
+          <p:cNvPicPr>
+            <a:picLocks noGrp="1" noChangeAspect="1"/>
+          </p:cNvPicPr>
+          <p:nvPr>
+            <p:ph type="pic" sz="quarter" idx="12"/>
+          </p:nvPr>
+        </p:nvPicPr>
+        <p:blipFill>
+          <a:blip r:embed="rId4">
+            <a:grayscl/>
+            <a:extLst>
+              <a:ext uri="{28A0092B-C50C-407E-A947-70E740481C1C}">
+                <a14:useLocalDpi xmlns:a14="http://schemas.microsoft.com/office/drawing/2010/main"/>
+              </a:ext>
+            </a:extLst>
+          </a:blip>
+          <a:srcRect/>
+          <a:stretch>
+            <a:fillRect/>
+          </a:stretch>
+        </p:blipFill>
+        <p:spPr/>
+      </p:pic>
+      <p:pic>
+        <p:nvPicPr>
+          <p:cNvPr id="30" name="Picture Placeholder 27" descr="Member Photo">
+            <a:extLst>
+              <a:ext uri="{FF2B5EF4-FFF2-40B4-BE49-F238E27FC236}">
+                <a16:creationId xmlns:a16="http://schemas.microsoft.com/office/drawing/2014/main" id="{10D7B446-4830-437D-90F2-78FF39F842A8}"/>
+              </a:ext>
+            </a:extLst>
+          </p:cNvPr>
+          <p:cNvPicPr>
+            <a:picLocks noGrp="1" noChangeAspect="1"/>
+          </p:cNvPicPr>
+          <p:nvPr>
+            <p:ph type="pic" sz="quarter" idx="13"/>
+          </p:nvPr>
+        </p:nvPicPr>
+        <p:blipFill>
+          <a:blip r:embed="rId5">
+            <a:grayscl/>
+            <a:extLst>
+              <a:ext uri="{28A0092B-C50C-407E-A947-70E740481C1C}">
+                <a14:useLocalDpi xmlns:a14="http://schemas.microsoft.com/office/drawing/2010/main"/>
+              </a:ext>
+            </a:extLst>
+          </a:blip>
+          <a:srcRect/>
+          <a:stretch>
+            <a:fillRect/>
+          </a:stretch>
+        </p:blipFill>
+        <p:spPr/>
+      </p:pic>
+      <p:pic>
+        <p:nvPicPr>
+          <p:cNvPr id="31" name="Picture Placeholder 29" descr="Member Photo">
+            <a:extLst>
+              <a:ext uri="{FF2B5EF4-FFF2-40B4-BE49-F238E27FC236}">
+                <a16:creationId xmlns:a16="http://schemas.microsoft.com/office/drawing/2014/main" id="{7453335E-1D5E-4FDC-8418-75FFB424DE6C}"/>
+              </a:ext>
+            </a:extLst>
+          </p:cNvPr>
+          <p:cNvPicPr>
+            <a:picLocks noGrp="1" noChangeAspect="1"/>
+          </p:cNvPicPr>
+          <p:nvPr>
+            <p:ph type="pic" sz="quarter" idx="14"/>
+          </p:nvPr>
+        </p:nvPicPr>
+        <p:blipFill>
+          <a:blip r:embed="rId6">
+            <a:grayscl/>
+            <a:extLst>
+              <a:ext uri="{28A0092B-C50C-407E-A947-70E740481C1C}">
+                <a14:useLocalDpi xmlns:a14="http://schemas.microsoft.com/office/drawing/2010/main"/>
+              </a:ext>
+            </a:extLst>
+          </a:blip>
+          <a:srcRect/>
+          <a:stretch>
+            <a:fillRect/>
+          </a:stretch>
+        </p:blipFill>
+        <p:spPr/>
+      </p:pic>
+      <p:sp>
+        <p:nvSpPr>
+          <p:cNvPr id="17" name="Text Placeholder 16">
+            <a:extLst>
+              <a:ext uri="{FF2B5EF4-FFF2-40B4-BE49-F238E27FC236}">
+                <a16:creationId xmlns:a16="http://schemas.microsoft.com/office/drawing/2014/main" id="{4E6B8FC3-C6AB-4C05-AB1A-6A425F437168}"/>
+              </a:ext>
+            </a:extLst>
+          </p:cNvPr>
+          <p:cNvSpPr>
+            <a:spLocks noGrp="1"/>
+          </p:cNvSpPr>
+          <p:nvPr>
+            <p:ph type="body" sz="quarter" idx="15"/>
+          </p:nvPr>
+        </p:nvSpPr>
+        <p:spPr/>
+        <p:txBody>
+          <a:bodyPr/>
+          <a:lstStyle/>
+          <a:p>
+            <a:r>
+              <a:rPr lang="en-US" dirty="0"/>
+              <a:t>Lorem ipsum dolor sit amet, consectetur adipiscing elit. </a:t>
+            </a:r>
+          </a:p>
+        </p:txBody>
+      </p:sp>
+      <p:sp>
+        <p:nvSpPr>
+          <p:cNvPr id="18" name="Text Placeholder 17">
+            <a:extLst>
+              <a:ext uri="{FF2B5EF4-FFF2-40B4-BE49-F238E27FC236}">
+                <a16:creationId xmlns:a16="http://schemas.microsoft.com/office/drawing/2014/main" id="{6D905B54-BC78-4D3A-98A7-8BF350FAE60E}"/>
+              </a:ext>
+            </a:extLst>
+          </p:cNvPr>
+          <p:cNvSpPr>
+            <a:spLocks noGrp="1"/>
+          </p:cNvSpPr>
+          <p:nvPr>
+            <p:ph type="body" sz="quarter" idx="16"/>
+          </p:nvPr>
+        </p:nvSpPr>
+        <p:spPr/>
+        <p:txBody>
+          <a:bodyPr/>
+          <a:lstStyle/>
+          <a:p>
+            <a:r>
+              <a:rPr lang="en-US" dirty="0"/>
+              <a:t>ADD NAME</a:t>
+            </a:r>
+          </a:p>
+        </p:txBody>
+      </p:sp>
+      <p:sp>
+        <p:nvSpPr>
+          <p:cNvPr id="19" name="Text Placeholder 18">
+            <a:extLst>
+              <a:ext uri="{FF2B5EF4-FFF2-40B4-BE49-F238E27FC236}">
+                <a16:creationId xmlns:a16="http://schemas.microsoft.com/office/drawing/2014/main" id="{35D841AC-77B9-46F0-877E-EDFD058BCBF2}"/>
+              </a:ext>
+            </a:extLst>
+          </p:cNvPr>
+          <p:cNvSpPr>
+            <a:spLocks noGrp="1"/>
+          </p:cNvSpPr>
+          <p:nvPr>
+            <p:ph type="body" sz="quarter" idx="17"/>
+          </p:nvPr>
+        </p:nvSpPr>
+        <p:spPr/>
+        <p:txBody>
+          <a:bodyPr/>
+          <a:lstStyle/>
+          <a:p>
+            <a:r>
+              <a:rPr lang="en-US" dirty="0"/>
+              <a:t>Lorem ipsum dolor sit amet, consectetur adipiscing elit. </a:t>
+            </a:r>
+          </a:p>
+          <a:p>
+            <a:endParaRPr lang="en-US" dirty="0"/>
+          </a:p>
+        </p:txBody>
+      </p:sp>
+      <p:sp>
+        <p:nvSpPr>
+          <p:cNvPr id="20" name="Text Placeholder 19">
+            <a:extLst>
+              <a:ext uri="{FF2B5EF4-FFF2-40B4-BE49-F238E27FC236}">
+                <a16:creationId xmlns:a16="http://schemas.microsoft.com/office/drawing/2014/main" id="{D20F164F-C51A-49BD-BCBB-07C7BED267C0}"/>
+              </a:ext>
+            </a:extLst>
+          </p:cNvPr>
+          <p:cNvSpPr>
+            <a:spLocks noGrp="1"/>
+          </p:cNvSpPr>
+          <p:nvPr>
+            <p:ph type="body" sz="quarter" idx="18"/>
+          </p:nvPr>
+        </p:nvSpPr>
+        <p:spPr/>
+        <p:txBody>
+          <a:bodyPr/>
+          <a:lstStyle/>
+          <a:p>
+            <a:r>
+              <a:rPr lang="en-US" dirty="0"/>
+              <a:t>ADD NAME</a:t>
+            </a:r>
+          </a:p>
+        </p:txBody>
+      </p:sp>
+      <p:sp>
+        <p:nvSpPr>
+          <p:cNvPr id="21" name="Text Placeholder 20">
+            <a:extLst>
+              <a:ext uri="{FF2B5EF4-FFF2-40B4-BE49-F238E27FC236}">
+                <a16:creationId xmlns:a16="http://schemas.microsoft.com/office/drawing/2014/main" id="{F6997EE2-4A7E-42BA-A9A4-CA8914C6CA1F}"/>
+              </a:ext>
+            </a:extLst>
+          </p:cNvPr>
+          <p:cNvSpPr>
+            <a:spLocks noGrp="1"/>
+          </p:cNvSpPr>
+          <p:nvPr>
+            <p:ph type="body" sz="quarter" idx="23"/>
+          </p:nvPr>
+        </p:nvSpPr>
+        <p:spPr/>
+        <p:txBody>
+          <a:bodyPr/>
+          <a:lstStyle/>
+          <a:p>
+            <a:r>
+              <a:rPr lang="en-US" dirty="0"/>
+              <a:t>Lorem ipsum dolor sit amet, consectetur adipiscing elit. </a:t>
+            </a:r>
+          </a:p>
+          <a:p>
+            <a:endParaRPr lang="en-US" dirty="0"/>
+          </a:p>
+        </p:txBody>
+      </p:sp>
+      <p:sp>
+        <p:nvSpPr>
+          <p:cNvPr id="22" name="Text Placeholder 21">
+            <a:extLst>
+              <a:ext uri="{FF2B5EF4-FFF2-40B4-BE49-F238E27FC236}">
+                <a16:creationId xmlns:a16="http://schemas.microsoft.com/office/drawing/2014/main" id="{3604A973-1FC1-4BD3-A8B8-0C46262D77B6}"/>
+              </a:ext>
+            </a:extLst>
+          </p:cNvPr>
+          <p:cNvSpPr>
+            <a:spLocks noGrp="1"/>
+          </p:cNvSpPr>
+          <p:nvPr>
+            <p:ph type="body" sz="quarter" idx="24"/>
+          </p:nvPr>
+        </p:nvSpPr>
+        <p:spPr/>
+        <p:txBody>
+          <a:bodyPr/>
+          <a:lstStyle/>
+          <a:p>
+            <a:r>
+              <a:rPr lang="en-US" dirty="0"/>
+              <a:t>ADD NAME</a:t>
+            </a:r>
+          </a:p>
+        </p:txBody>
+      </p:sp>
+      <p:sp>
+        <p:nvSpPr>
+          <p:cNvPr id="23" name="Text Placeholder 22">
+            <a:extLst>
+              <a:ext uri="{FF2B5EF4-FFF2-40B4-BE49-F238E27FC236}">
+                <a16:creationId xmlns:a16="http://schemas.microsoft.com/office/drawing/2014/main" id="{F71130C1-E2E7-4700-A220-231BB58349DE}"/>
+              </a:ext>
+            </a:extLst>
+          </p:cNvPr>
+          <p:cNvSpPr>
+            <a:spLocks noGrp="1"/>
+          </p:cNvSpPr>
+          <p:nvPr>
+            <p:ph type="body" sz="quarter" idx="25"/>
+          </p:nvPr>
+        </p:nvSpPr>
+        <p:spPr/>
+        <p:txBody>
+          <a:bodyPr/>
+          <a:lstStyle/>
+          <a:p>
+            <a:r>
+              <a:rPr lang="en-US" dirty="0"/>
+              <a:t>Lorem ipsum dolor sit amet, consectetur adipiscing elit. </a:t>
+            </a:r>
+          </a:p>
+          <a:p>
+            <a:endParaRPr lang="en-US" dirty="0"/>
+          </a:p>
+        </p:txBody>
+      </p:sp>
+      <p:sp>
+        <p:nvSpPr>
+          <p:cNvPr id="24" name="Text Placeholder 23">
+            <a:extLst>
+              <a:ext uri="{FF2B5EF4-FFF2-40B4-BE49-F238E27FC236}">
+                <a16:creationId xmlns:a16="http://schemas.microsoft.com/office/drawing/2014/main" id="{DDC5EC52-0B52-4D0E-B00E-8E5EF35BC9CD}"/>
+              </a:ext>
+            </a:extLst>
+          </p:cNvPr>
+          <p:cNvSpPr>
+            <a:spLocks noGrp="1"/>
+          </p:cNvSpPr>
+          <p:nvPr>
+            <p:ph type="body" sz="quarter" idx="26"/>
+          </p:nvPr>
+        </p:nvSpPr>
+        <p:spPr/>
+        <p:txBody>
+          <a:bodyPr/>
+          <a:lstStyle/>
+          <a:p>
+            <a:r>
+              <a:rPr lang="en-US" dirty="0"/>
+              <a:t>ADD NAME</a:t>
+            </a:r>
+          </a:p>
+        </p:txBody>
+      </p:sp>
+    </p:spTree>
+    <p:extLst>
+      <p:ext uri="{BB962C8B-B14F-4D97-AF65-F5344CB8AC3E}">
+        <p14:creationId xmlns:p14="http://schemas.microsoft.com/office/powerpoint/2010/main" val="1684697404"/>
+      </p:ext>
+    </p:extLst>
+  </p:cSld>
+  <p:clrMapOvr>
+    <a:masterClrMapping/>
+  </p:clrMapOvr>
+</p:sld>
+</file>
+
+<file path=ppt/slides/slide13.xml><?xml version="1.0" encoding="utf-8"?>
+<p:sld xmlns:a="http://schemas.openxmlformats.org/drawingml/2006/main" xmlns:r="http://schemas.openxmlformats.org/officeDocument/2006/relationships" xmlns:p="http://schemas.openxmlformats.org/presentationml/2006/main">
+  <p:cSld>
+    <p:spTree>
+      <p:nvGrpSpPr>
+        <p:cNvPr id="1" name=""/>
+        <p:cNvGrpSpPr/>
+        <p:nvPr/>
+      </p:nvGrpSpPr>
+      <p:grpSpPr>
+        <a:xfrm>
+          <a:off x="0" y="0"/>
+          <a:ext cx="0" cy="0"/>
+          <a:chOff x="0" y="0"/>
+          <a:chExt cx="0" cy="0"/>
+        </a:xfrm>
+      </p:grpSpPr>
+      <p:sp>
+        <p:nvSpPr>
+          <p:cNvPr id="8" name="Title 7">
+            <a:extLst>
+              <a:ext uri="{FF2B5EF4-FFF2-40B4-BE49-F238E27FC236}">
+                <a16:creationId xmlns:a16="http://schemas.microsoft.com/office/drawing/2014/main" id="{AB58A585-52FA-4A45-B2D0-660EC2D22B31}"/>
+              </a:ext>
+            </a:extLst>
+          </p:cNvPr>
+          <p:cNvSpPr>
+            <a:spLocks noGrp="1"/>
+          </p:cNvSpPr>
+          <p:nvPr>
+            <p:ph type="title"/>
+          </p:nvPr>
+        </p:nvSpPr>
+        <p:spPr/>
+        <p:txBody>
+          <a:bodyPr/>
+          <a:lstStyle/>
+          <a:p>
+            <a:r>
+              <a:rPr lang="en-US" dirty="0">
+                <a:latin typeface="+mn-lt"/>
+              </a:rPr>
+              <a:t>Click to Add Chart </a:t>
+            </a:r>
+            <a:r>
+              <a:rPr lang="en-US" dirty="0">
+                <a:solidFill>
+                  <a:srgbClr val="5DAAB0"/>
+                </a:solidFill>
+                <a:latin typeface="+mn-lt"/>
+              </a:rPr>
+              <a:t>Slide Title Here </a:t>
+            </a:r>
+          </a:p>
+        </p:txBody>
+      </p:sp>
+      <p:sp>
+        <p:nvSpPr>
+          <p:cNvPr id="10" name="Text Placeholder 9">
+            <a:extLst>
+              <a:ext uri="{FF2B5EF4-FFF2-40B4-BE49-F238E27FC236}">
+                <a16:creationId xmlns:a16="http://schemas.microsoft.com/office/drawing/2014/main" id="{76C3E0A7-1C3E-0A40-AC21-1EAD4086CBB7}"/>
+              </a:ext>
+            </a:extLst>
+          </p:cNvPr>
+          <p:cNvSpPr>
+            <a:spLocks noGrp="1"/>
+          </p:cNvSpPr>
+          <p:nvPr>
+            <p:ph type="body" sz="quarter" idx="11"/>
+          </p:nvPr>
+        </p:nvSpPr>
+        <p:spPr/>
+        <p:txBody>
+          <a:bodyPr/>
+          <a:lstStyle/>
+          <a:p>
+            <a:pPr lvl="0"/>
+            <a:r>
+              <a:rPr lang="en-US" dirty="0"/>
+              <a:t>Lorem ipsum dolor sit amet, consectetur adipiscing elit. Ut gravida eros erat. Proin a tellus sed risus lobortis sagittis eu quis est. Duis ut aliquam nisi. Suspendisse vehicula mi diam, sit amet lacinia massa sodales ac. </a:t>
+            </a:r>
+          </a:p>
+          <a:p>
+            <a:pPr lvl="0"/>
+            <a:r>
+              <a:rPr lang="en-US" dirty="0"/>
+              <a:t>Fusce condimentum egestas nunc a maximus. Quisque et orci purus. Proin dolor mi, ultrices sit amet ipsum placerat, congue mattis turpis. Donec vestibulum eros eget mauris dignissim, ut ultricies dolor viverra. Phasellus efficitur ante nec sem convallis, in ornare est accumsan. </a:t>
+            </a:r>
+          </a:p>
+          <a:p>
+            <a:pPr lvl="0"/>
+            <a:r>
+              <a:rPr lang="en-US" dirty="0"/>
+              <a:t>Lorem ipsum dolor sit amet, consectetur adipiscing elit. Ut gravida eros erat. Proin a tellus sed risus lobortis sagittis eu quis est. </a:t>
+            </a:r>
+          </a:p>
+          <a:p>
+            <a:endParaRPr lang="en-US" dirty="0"/>
+          </a:p>
+        </p:txBody>
+      </p:sp>
+      <p:sp>
+        <p:nvSpPr>
+          <p:cNvPr id="12" name="Text Placeholder 11">
+            <a:extLst>
+              <a:ext uri="{FF2B5EF4-FFF2-40B4-BE49-F238E27FC236}">
+                <a16:creationId xmlns:a16="http://schemas.microsoft.com/office/drawing/2014/main" id="{F82458FA-5D5F-6A41-B047-910858C1E142}"/>
+              </a:ext>
+            </a:extLst>
+          </p:cNvPr>
+          <p:cNvSpPr>
+            <a:spLocks noGrp="1"/>
+          </p:cNvSpPr>
+          <p:nvPr>
+            <p:ph type="body" sz="quarter" idx="12"/>
+          </p:nvPr>
+        </p:nvSpPr>
+        <p:spPr/>
+        <p:txBody>
+          <a:bodyPr/>
+          <a:lstStyle/>
+          <a:p>
+            <a:r>
+              <a:rPr lang="en-US" dirty="0"/>
+              <a:t>SUBTITLE HERE</a:t>
+            </a:r>
+          </a:p>
+        </p:txBody>
+      </p:sp>
+      <p:graphicFrame>
+        <p:nvGraphicFramePr>
+          <p:cNvPr id="16" name="Chart Placeholder 17" descr="Chart">
+            <a:extLst>
+              <a:ext uri="{FF2B5EF4-FFF2-40B4-BE49-F238E27FC236}">
+                <a16:creationId xmlns:a16="http://schemas.microsoft.com/office/drawing/2014/main" id="{8F6D4133-13DB-4D35-AA57-2E241762BC26}"/>
+              </a:ext>
+            </a:extLst>
+          </p:cNvPr>
+          <p:cNvGraphicFramePr>
+            <a:graphicFrameLocks noGrp="1"/>
+          </p:cNvGraphicFramePr>
+          <p:nvPr>
+            <p:ph type="chart" sz="quarter" idx="13"/>
+            <p:extLst>
+              <p:ext uri="{D42A27DB-BD31-4B8C-83A1-F6EECF244321}">
+                <p14:modId xmlns:p14="http://schemas.microsoft.com/office/powerpoint/2010/main" val="998066129"/>
+              </p:ext>
+            </p:extLst>
+          </p:nvPr>
+        </p:nvGraphicFramePr>
+        <p:xfrm>
+          <a:off x="838200" y="2247900"/>
+          <a:ext cx="5619750" cy="3870325"/>
+        </p:xfrm>
+        <a:graphic>
+          <a:graphicData uri="http://schemas.openxmlformats.org/drawingml/2006/chart">
+            <c:chart xmlns:c="http://schemas.openxmlformats.org/drawingml/2006/chart" xmlns:r="http://schemas.openxmlformats.org/officeDocument/2006/relationships" r:id="rId3"/>
+          </a:graphicData>
+        </a:graphic>
+      </p:graphicFrame>
+    </p:spTree>
+    <p:extLst>
+      <p:ext uri="{BB962C8B-B14F-4D97-AF65-F5344CB8AC3E}">
+        <p14:creationId xmlns:p14="http://schemas.microsoft.com/office/powerpoint/2010/main" val="389446795"/>
       </p:ext>
     </p:extLst>
   </p:cSld>
@@ -19326,12 +21291,14 @@
         </p:nvSpPr>
         <p:spPr/>
         <p:txBody>
-          <a:bodyPr/>
+          <a:bodyPr>
+            <a:normAutofit/>
+          </a:bodyPr>
           <a:lstStyle/>
           <a:p>
             <a:r>
-              <a:rPr lang="en-US" dirty="0"/>
-              <a:t>Lorem ipsum dolor sit amet, consectetur adipiscing elit phasellus auctor efficitur.</a:t>
+              <a:rPr lang="en-US" sz="1600" b="1" dirty="0"/>
+              <a:t>1. Selected Topic</a:t>
             </a:r>
           </a:p>
         </p:txBody>
@@ -19354,12 +21321,14 @@
         </p:nvSpPr>
         <p:spPr/>
         <p:txBody>
-          <a:bodyPr/>
+          <a:bodyPr>
+            <a:normAutofit/>
+          </a:bodyPr>
           <a:lstStyle/>
           <a:p>
             <a:r>
-              <a:rPr lang="en-US" dirty="0"/>
-              <a:t>Lorem ipsum dolor sit amet, consectetur adipiscing elit phasellus auctor efficitur.</a:t>
+              <a:rPr lang="en-US" sz="1600" b="1" dirty="0"/>
+              <a:t>2. Sources of Data</a:t>
             </a:r>
           </a:p>
         </p:txBody>
@@ -19382,12 +21351,14 @@
         </p:nvSpPr>
         <p:spPr/>
         <p:txBody>
-          <a:bodyPr/>
+          <a:bodyPr>
+            <a:normAutofit/>
+          </a:bodyPr>
           <a:lstStyle/>
           <a:p>
             <a:r>
-              <a:rPr lang="en-US" dirty="0"/>
-              <a:t>Lorem ipsum dolor sit amet, consectetur adipiscing elit phasellus auctor efficitur.</a:t>
+              <a:rPr lang="en-US" sz="1600" b="1" dirty="0"/>
+              <a:t>4. Data Exploration</a:t>
             </a:r>
           </a:p>
         </p:txBody>
@@ -19410,12 +21381,14 @@
         </p:nvSpPr>
         <p:spPr/>
         <p:txBody>
-          <a:bodyPr/>
+          <a:bodyPr>
+            <a:normAutofit/>
+          </a:bodyPr>
           <a:lstStyle/>
           <a:p>
             <a:r>
-              <a:rPr lang="en-US" dirty="0"/>
-              <a:t>Lorem ipsum dolor sit amet, consectetur adipiscing elit phasellus auctor efficitur.</a:t>
+              <a:rPr lang="en-US" sz="1600" b="1" dirty="0"/>
+              <a:t>3. Analysis Hypothesis</a:t>
             </a:r>
           </a:p>
         </p:txBody>
@@ -19438,12 +21411,14 @@
         </p:nvSpPr>
         <p:spPr/>
         <p:txBody>
-          <a:bodyPr/>
+          <a:bodyPr>
+            <a:normAutofit/>
+          </a:bodyPr>
           <a:lstStyle/>
           <a:p>
             <a:r>
-              <a:rPr lang="en-US" dirty="0"/>
-              <a:t>Lorem ipsum dolor sit amet, consectetur adipiscing elit phasellus auctor efficitur.</a:t>
+              <a:rPr lang="en-US" sz="1600" b="1" dirty="0"/>
+              <a:t>5. Data Analysis</a:t>
             </a:r>
           </a:p>
         </p:txBody>
@@ -19489,6 +21464,14 @@
 <file path=ppt/slides/slide3.xml><?xml version="1.0" encoding="utf-8"?>
 <p:sld xmlns:a="http://schemas.openxmlformats.org/drawingml/2006/main" xmlns:r="http://schemas.openxmlformats.org/officeDocument/2006/relationships" xmlns:p="http://schemas.openxmlformats.org/presentationml/2006/main">
   <p:cSld>
+    <p:bg>
+      <p:bgPr>
+        <a:solidFill>
+          <a:srgbClr val="5DAAB0"/>
+        </a:solidFill>
+        <a:effectLst/>
+      </p:bgPr>
+    </p:bg>
     <p:spTree>
       <p:nvGrpSpPr>
         <p:cNvPr id="1" name=""/>
@@ -19503,40 +21486,47 @@
           <a:chExt cx="0" cy="0"/>
         </a:xfrm>
       </p:grpSpPr>
-      <p:pic>
-        <p:nvPicPr>
-          <p:cNvPr id="5" name="Picture Placeholder 4" descr="A picture containing diagram&#10;&#10;Description automatically generated">
-            <a:extLst>
-              <a:ext uri="{FF2B5EF4-FFF2-40B4-BE49-F238E27FC236}">
-                <a16:creationId xmlns:a16="http://schemas.microsoft.com/office/drawing/2014/main" id="{46D415C9-7299-415E-BB1A-8D05E98FAB58}"/>
-              </a:ext>
-            </a:extLst>
-          </p:cNvPr>
-          <p:cNvPicPr>
-            <a:picLocks noGrp="1" noChangeAspect="1"/>
-          </p:cNvPicPr>
-          <p:nvPr>
-            <p:ph type="pic" sz="quarter" idx="10"/>
-          </p:nvPr>
-        </p:nvPicPr>
-        <p:blipFill rotWithShape="1">
-          <a:blip r:embed="rId3"/>
-          <a:srcRect l="755" t="14912" r="-755" b="17163"/>
-          <a:stretch/>
-        </p:blipFill>
-        <p:spPr>
-          <a:xfrm>
-            <a:off x="2057400" y="3179380"/>
-            <a:ext cx="8077200" cy="3657600"/>
-          </a:xfrm>
-        </p:spPr>
-      </p:pic>
-      <p:sp>
-        <p:nvSpPr>
-          <p:cNvPr id="9" name="Title 8">
-            <a:extLst>
-              <a:ext uri="{FF2B5EF4-FFF2-40B4-BE49-F238E27FC236}">
-                <a16:creationId xmlns:a16="http://schemas.microsoft.com/office/drawing/2014/main" id="{5249062A-D4B8-4980-B15D-2F0CF58BB5B7}"/>
+      <p:sp>
+        <p:nvSpPr>
+          <p:cNvPr id="4" name="Text Placeholder 3">
+            <a:extLst>
+              <a:ext uri="{FF2B5EF4-FFF2-40B4-BE49-F238E27FC236}">
+                <a16:creationId xmlns:a16="http://schemas.microsoft.com/office/drawing/2014/main" id="{FD47FBB8-2A87-4FDD-8742-D0C12871A3DD}"/>
+              </a:ext>
+            </a:extLst>
+          </p:cNvPr>
+          <p:cNvSpPr>
+            <a:spLocks noGrp="1"/>
+          </p:cNvSpPr>
+          <p:nvPr>
+            <p:ph type="body" sz="quarter" idx="10"/>
+          </p:nvPr>
+        </p:nvSpPr>
+        <p:spPr/>
+        <p:txBody>
+          <a:bodyPr/>
+          <a:lstStyle/>
+          <a:p>
+            <a:r>
+              <a:rPr lang="en-US" dirty="0">
+                <a:solidFill>
+                  <a:schemeClr val="bg1">
+                    <a:alpha val="20000"/>
+                  </a:schemeClr>
+                </a:solidFill>
+                <a:latin typeface="+mn-lt"/>
+              </a:rPr>
+              <a:t>1</a:t>
+            </a:r>
+          </a:p>
+        </p:txBody>
+      </p:sp>
+      <p:sp>
+        <p:nvSpPr>
+          <p:cNvPr id="3" name="Title 2">
+            <a:extLst>
+              <a:ext uri="{FF2B5EF4-FFF2-40B4-BE49-F238E27FC236}">
+                <a16:creationId xmlns:a16="http://schemas.microsoft.com/office/drawing/2014/main" id="{F73D75BE-E7AD-49A1-A453-D007D958AC3D}"/>
               </a:ext>
             </a:extLst>
           </p:cNvPr>
@@ -19547,98 +21537,27 @@
             <p:ph type="title"/>
           </p:nvPr>
         </p:nvSpPr>
-        <p:spPr>
-          <a:xfrm>
-            <a:off x="2152891" y="1691472"/>
-            <a:ext cx="5045593" cy="1325563"/>
-          </a:xfrm>
-        </p:spPr>
-        <p:txBody>
-          <a:bodyPr/>
+        <p:spPr/>
+        <p:txBody>
+          <a:bodyPr>
+            <a:normAutofit fontScale="90000"/>
+          </a:bodyPr>
           <a:lstStyle/>
           <a:p>
             <a:r>
               <a:rPr lang="en-US" dirty="0">
                 <a:latin typeface="+mn-lt"/>
               </a:rPr>
-              <a:t>Click to </a:t>
-            </a:r>
-            <a:br>
-              <a:rPr lang="en-US" dirty="0">
-                <a:latin typeface="+mn-lt"/>
-              </a:rPr>
-            </a:br>
+              <a:t>AQI </a:t>
+            </a:r>
             <a:r>
               <a:rPr lang="en-US" dirty="0">
                 <a:solidFill>
-                  <a:srgbClr val="5DAAB0"/>
+                  <a:schemeClr val="bg1"/>
                 </a:solidFill>
                 <a:latin typeface="+mn-lt"/>
               </a:rPr>
-              <a:t>Add Title Here </a:t>
-            </a:r>
-          </a:p>
-        </p:txBody>
-      </p:sp>
-      <p:sp>
-        <p:nvSpPr>
-          <p:cNvPr id="11" name="Text Placeholder 10">
-            <a:extLst>
-              <a:ext uri="{FF2B5EF4-FFF2-40B4-BE49-F238E27FC236}">
-                <a16:creationId xmlns:a16="http://schemas.microsoft.com/office/drawing/2014/main" id="{B59FCEF3-B015-47B8-8D8F-7C0C90D275EB}"/>
-              </a:ext>
-            </a:extLst>
-          </p:cNvPr>
-          <p:cNvSpPr>
-            <a:spLocks noGrp="1"/>
-          </p:cNvSpPr>
-          <p:nvPr>
-            <p:ph type="body" sz="quarter" idx="11"/>
-          </p:nvPr>
-        </p:nvSpPr>
-        <p:spPr/>
-        <p:txBody>
-          <a:bodyPr>
-            <a:noAutofit/>
-          </a:bodyPr>
-          <a:lstStyle/>
-          <a:p>
-            <a:pPr>
-              <a:lnSpc>
-                <a:spcPct val="100000"/>
-              </a:lnSpc>
-            </a:pPr>
-            <a:r>
-              <a:rPr lang="en-US" dirty="0"/>
-              <a:t>Lorem ipsum dolor sit amet, consectetur adipiscing elit. Phasellus auctor efficitur dui et facilisis. Pellentesque habitant morbi tristique senectus et netus et malesuada fames ac turpis egestas. Etiam molestie in quam ac viverra. Cras consequat gravida aliquam. </a:t>
-            </a:r>
-          </a:p>
-        </p:txBody>
-      </p:sp>
-      <p:sp>
-        <p:nvSpPr>
-          <p:cNvPr id="12" name="Text Placeholder 11">
-            <a:extLst>
-              <a:ext uri="{FF2B5EF4-FFF2-40B4-BE49-F238E27FC236}">
-                <a16:creationId xmlns:a16="http://schemas.microsoft.com/office/drawing/2014/main" id="{045C97E3-0CF5-415A-BEEC-B465AA7F130B}"/>
-              </a:ext>
-            </a:extLst>
-          </p:cNvPr>
-          <p:cNvSpPr>
-            <a:spLocks noGrp="1"/>
-          </p:cNvSpPr>
-          <p:nvPr>
-            <p:ph type="body" sz="quarter" idx="12"/>
-          </p:nvPr>
-        </p:nvSpPr>
-        <p:spPr/>
-        <p:txBody>
-          <a:bodyPr/>
-          <a:lstStyle/>
-          <a:p>
-            <a:r>
-              <a:rPr lang="en-US" dirty="0"/>
-              <a:t>Click to add title here</a:t>
+              <a:t>Hypothesis</a:t>
             </a:r>
           </a:p>
         </p:txBody>
@@ -19646,7 +21565,7 @@
     </p:spTree>
     <p:extLst>
       <p:ext uri="{BB962C8B-B14F-4D97-AF65-F5344CB8AC3E}">
-        <p14:creationId xmlns:p14="http://schemas.microsoft.com/office/powerpoint/2010/main" val="605044435"/>
+        <p14:creationId xmlns:p14="http://schemas.microsoft.com/office/powerpoint/2010/main" val="954333892"/>
       </p:ext>
     </p:extLst>
   </p:cSld>
@@ -19673,12 +21592,40 @@
           <a:chExt cx="0" cy="0"/>
         </a:xfrm>
       </p:grpSpPr>
-      <p:sp>
-        <p:nvSpPr>
-          <p:cNvPr id="14" name="Title 13">
-            <a:extLst>
-              <a:ext uri="{FF2B5EF4-FFF2-40B4-BE49-F238E27FC236}">
-                <a16:creationId xmlns:a16="http://schemas.microsoft.com/office/drawing/2014/main" id="{5A981189-9280-48E8-90AE-7F25E741BE94}"/>
+      <p:pic>
+        <p:nvPicPr>
+          <p:cNvPr id="5" name="Picture Placeholder 4" descr="A picture containing diagram&#10;&#10;Description automatically generated">
+            <a:extLst>
+              <a:ext uri="{FF2B5EF4-FFF2-40B4-BE49-F238E27FC236}">
+                <a16:creationId xmlns:a16="http://schemas.microsoft.com/office/drawing/2014/main" id="{46D415C9-7299-415E-BB1A-8D05E98FAB58}"/>
+              </a:ext>
+            </a:extLst>
+          </p:cNvPr>
+          <p:cNvPicPr>
+            <a:picLocks noGrp="1" noChangeAspect="1"/>
+          </p:cNvPicPr>
+          <p:nvPr>
+            <p:ph type="pic" sz="quarter" idx="10"/>
+          </p:nvPr>
+        </p:nvPicPr>
+        <p:blipFill rotWithShape="1">
+          <a:blip r:embed="rId3"/>
+          <a:srcRect l="755" t="14912" r="-755" b="17163"/>
+          <a:stretch/>
+        </p:blipFill>
+        <p:spPr>
+          <a:xfrm>
+            <a:off x="838200" y="3179380"/>
+            <a:ext cx="8077200" cy="3657600"/>
+          </a:xfrm>
+        </p:spPr>
+      </p:pic>
+      <p:sp>
+        <p:nvSpPr>
+          <p:cNvPr id="9" name="Title 8">
+            <a:extLst>
+              <a:ext uri="{FF2B5EF4-FFF2-40B4-BE49-F238E27FC236}">
+                <a16:creationId xmlns:a16="http://schemas.microsoft.com/office/drawing/2014/main" id="{5249062A-D4B8-4980-B15D-2F0CF58BB5B7}"/>
               </a:ext>
             </a:extLst>
           </p:cNvPr>
@@ -19691,22 +21638,15 @@
         </p:nvSpPr>
         <p:spPr>
           <a:xfrm>
-            <a:off x="844946" y="1193765"/>
-            <a:ext cx="4385843" cy="1325563"/>
-          </a:xfrm>
-        </p:spPr>
-        <p:txBody>
-          <a:bodyPr>
-            <a:normAutofit/>
-          </a:bodyPr>
+            <a:off x="2354003" y="1691472"/>
+            <a:ext cx="5045593" cy="1325563"/>
+          </a:xfrm>
+        </p:spPr>
+        <p:txBody>
+          <a:bodyPr/>
           <a:lstStyle/>
           <a:p>
-            <a:r>
-              <a:rPr lang="en-US" dirty="0">
-                <a:latin typeface="+mn-lt"/>
-              </a:rPr>
-              <a:t>Two Column </a:t>
-            </a:r>
+            <a:pPr algn="ctr"/>
             <a:r>
               <a:rPr lang="en-US" dirty="0">
                 <a:solidFill>
@@ -19714,214 +21654,218 @@
                 </a:solidFill>
                 <a:latin typeface="+mn-lt"/>
               </a:rPr>
-              <a:t>Layout </a:t>
-            </a:r>
-          </a:p>
-        </p:txBody>
-      </p:sp>
-      <p:pic>
-        <p:nvPicPr>
-          <p:cNvPr id="21" name="Picture Placeholder 20" descr="A group of people sitting at a table ">
-            <a:extLst>
-              <a:ext uri="{FF2B5EF4-FFF2-40B4-BE49-F238E27FC236}">
-                <a16:creationId xmlns:a16="http://schemas.microsoft.com/office/drawing/2014/main" id="{ED555F39-395C-4F00-87D7-A02A9B883554}"/>
-              </a:ext>
-            </a:extLst>
-          </p:cNvPr>
-          <p:cNvPicPr>
-            <a:picLocks noGrp="1" noChangeAspect="1"/>
-          </p:cNvPicPr>
-          <p:nvPr>
-            <p:ph type="pic" sz="quarter" idx="10"/>
-          </p:nvPr>
-        </p:nvPicPr>
-        <p:blipFill>
-          <a:blip r:embed="rId3" cstate="screen">
-            <a:extLst>
-              <a:ext uri="{28A0092B-C50C-407E-A947-70E740481C1C}">
-                <a14:useLocalDpi xmlns:a14="http://schemas.microsoft.com/office/drawing/2010/main"/>
-              </a:ext>
-            </a:extLst>
-          </a:blip>
-          <a:srcRect l="6454" r="6454"/>
-          <a:stretch>
-            <a:fillRect/>
-          </a:stretch>
-        </p:blipFill>
-        <p:spPr>
-          <a:xfrm>
-            <a:off x="844947" y="2632337"/>
-            <a:ext cx="4385841" cy="3357563"/>
-          </a:xfrm>
-        </p:spPr>
-      </p:pic>
-      <p:sp>
-        <p:nvSpPr>
-          <p:cNvPr id="17" name="Text Placeholder 16">
-            <a:extLst>
-              <a:ext uri="{FF2B5EF4-FFF2-40B4-BE49-F238E27FC236}">
-                <a16:creationId xmlns:a16="http://schemas.microsoft.com/office/drawing/2014/main" id="{98B9CB9E-1380-488B-88F1-B99F12EFA776}"/>
-              </a:ext>
-            </a:extLst>
-          </p:cNvPr>
-          <p:cNvSpPr>
-            <a:spLocks noGrp="1"/>
-          </p:cNvSpPr>
-          <p:nvPr>
-            <p:ph type="body" sz="quarter" idx="12"/>
-          </p:nvPr>
-        </p:nvSpPr>
-        <p:spPr/>
-        <p:txBody>
-          <a:bodyPr/>
-          <a:lstStyle/>
-          <a:p>
-            <a:r>
-              <a:rPr lang="en-US" dirty="0"/>
-              <a:t>Click to add title here</a:t>
-            </a:r>
-          </a:p>
-        </p:txBody>
-      </p:sp>
-      <p:sp>
-        <p:nvSpPr>
-          <p:cNvPr id="19" name="Text Placeholder 18">
-            <a:extLst>
-              <a:ext uri="{FF2B5EF4-FFF2-40B4-BE49-F238E27FC236}">
-                <a16:creationId xmlns:a16="http://schemas.microsoft.com/office/drawing/2014/main" id="{4C3079F2-FA5D-4717-9945-965E324EBF60}"/>
-              </a:ext>
-            </a:extLst>
-          </p:cNvPr>
-          <p:cNvSpPr>
-            <a:spLocks noGrp="1"/>
-          </p:cNvSpPr>
-          <p:nvPr>
-            <p:ph type="body" sz="quarter" idx="14"/>
-          </p:nvPr>
-        </p:nvSpPr>
-        <p:spPr/>
-        <p:txBody>
-          <a:bodyPr/>
-          <a:lstStyle/>
-          <a:p>
-            <a:pPr marL="0" indent="0">
-              <a:buNone/>
-            </a:pPr>
-            <a:r>
-              <a:rPr lang="en-US" dirty="0"/>
-              <a:t>Click to add title here</a:t>
-            </a:r>
-          </a:p>
-        </p:txBody>
-      </p:sp>
-      <p:sp>
-        <p:nvSpPr>
-          <p:cNvPr id="16" name="Text Placeholder 15">
-            <a:extLst>
-              <a:ext uri="{FF2B5EF4-FFF2-40B4-BE49-F238E27FC236}">
-                <a16:creationId xmlns:a16="http://schemas.microsoft.com/office/drawing/2014/main" id="{5E9ED32E-028C-428E-97AF-168C8D6F92A9}"/>
-              </a:ext>
-            </a:extLst>
-          </p:cNvPr>
-          <p:cNvSpPr>
-            <a:spLocks noGrp="1"/>
-          </p:cNvSpPr>
-          <p:nvPr>
-            <p:ph type="body" sz="quarter" idx="15"/>
-          </p:nvPr>
-        </p:nvSpPr>
-        <p:spPr/>
-        <p:txBody>
-          <a:bodyPr/>
-          <a:lstStyle/>
-          <a:p>
-            <a:r>
-              <a:rPr lang="en-US" dirty="0"/>
-              <a:t>Lorem ipsum dolor sit amet, consectetur adipiscing elit.</a:t>
-            </a:r>
-          </a:p>
-          <a:p>
-            <a:r>
-              <a:rPr lang="en-US" dirty="0"/>
-              <a:t>Phasellus auctor efficitur dui et facilisis. </a:t>
-            </a:r>
-          </a:p>
-          <a:p>
-            <a:r>
-              <a:rPr lang="en-US" dirty="0"/>
-              <a:t>Pellentesque habitant morbi tristique senectus et netus et malesuada fames ac turpis egestas. </a:t>
-            </a:r>
-          </a:p>
-          <a:p>
-            <a:r>
-              <a:rPr lang="en-US" dirty="0"/>
-              <a:t>Etiam molestie in quam ac viverra. </a:t>
-            </a:r>
-          </a:p>
-          <a:p>
-            <a:r>
-              <a:rPr lang="en-US" dirty="0"/>
-              <a:t>Cras consequat gravida aliquam. Maecenas cursus eleifend risus, in vulputate velit imperdiet non..</a:t>
-            </a:r>
-          </a:p>
-        </p:txBody>
-      </p:sp>
-      <p:sp>
-        <p:nvSpPr>
-          <p:cNvPr id="18" name="Text Placeholder 17">
-            <a:extLst>
-              <a:ext uri="{FF2B5EF4-FFF2-40B4-BE49-F238E27FC236}">
-                <a16:creationId xmlns:a16="http://schemas.microsoft.com/office/drawing/2014/main" id="{94D72ABF-5D1D-4141-8DFE-03D197B7C1E3}"/>
-              </a:ext>
-            </a:extLst>
-          </p:cNvPr>
-          <p:cNvSpPr>
-            <a:spLocks noGrp="1"/>
-          </p:cNvSpPr>
-          <p:nvPr>
-            <p:ph type="body" sz="quarter" idx="16"/>
-          </p:nvPr>
-        </p:nvSpPr>
-        <p:spPr/>
+              <a:t>Selected Topic</a:t>
+            </a:r>
+          </a:p>
+        </p:txBody>
+      </p:sp>
+      <p:sp>
+        <p:nvSpPr>
+          <p:cNvPr id="11" name="Text Placeholder 10">
+            <a:extLst>
+              <a:ext uri="{FF2B5EF4-FFF2-40B4-BE49-F238E27FC236}">
+                <a16:creationId xmlns:a16="http://schemas.microsoft.com/office/drawing/2014/main" id="{B59FCEF3-B015-47B8-8D8F-7C0C90D275EB}"/>
+              </a:ext>
+            </a:extLst>
+          </p:cNvPr>
+          <p:cNvSpPr>
+            <a:spLocks noGrp="1"/>
+          </p:cNvSpPr>
+          <p:nvPr>
+            <p:ph type="body" sz="quarter" idx="11"/>
+          </p:nvPr>
+        </p:nvSpPr>
+        <p:spPr>
+          <a:xfrm>
+            <a:off x="7569842" y="920190"/>
+            <a:ext cx="4545957" cy="5328210"/>
+          </a:xfrm>
+        </p:spPr>
         <p:txBody>
           <a:bodyPr>
-            <a:normAutofit fontScale="92500"/>
+            <a:noAutofit/>
           </a:bodyPr>
           <a:lstStyle/>
           <a:p>
+            <a:pPr>
+              <a:spcBef>
+                <a:spcPts val="1200"/>
+              </a:spcBef>
+            </a:pPr>
             <a:r>
               <a:rPr lang="en-US" dirty="0"/>
-              <a:t>Lorem ipsum dolor sit amet, consectetur adipiscing elit. </a:t>
-            </a:r>
-            <a:br>
+              <a:t>The U.S. Environmental Protection Agency (EPA) establishes an AQI for several major air pollutants regulated by the Clean Air Act. Each of these pollutants has a national air quality standard set by EPA to protect public health. </a:t>
+            </a:r>
+          </a:p>
+          <a:p>
+            <a:pPr>
+              <a:spcBef>
+                <a:spcPts val="1200"/>
+              </a:spcBef>
+            </a:pPr>
+            <a:r>
               <a:rPr lang="en-US" dirty="0"/>
-            </a:br>
+              <a:t>As the world is battling global warming, our team decided to review and analyze AQIs for four different states. </a:t>
+            </a:r>
+          </a:p>
+          <a:p>
+            <a:pPr>
+              <a:spcBef>
+                <a:spcPts val="1200"/>
+              </a:spcBef>
+            </a:pPr>
             <a:r>
               <a:rPr lang="en-US" dirty="0"/>
-              <a:t>Phasellus auctor efficitur dui et facilisis. </a:t>
-            </a:r>
-          </a:p>
-          <a:p>
-            <a:r>
-              <a:rPr lang="en-US" dirty="0"/>
-              <a:t>Pellentesque habitant morbi tristique senectus et netus et malesuada fames ac turpis egestas. Etiam molestie in quam ac viverra. </a:t>
-            </a:r>
-          </a:p>
-          <a:p>
-            <a:r>
-              <a:rPr lang="en-US" dirty="0"/>
-              <a:t>Cras consequat gravida aliquam. Maecenas cursus eleifend risus, in vulputate velit imperdiet non. Aenean tincidunt euismod ultricies. Fusce tempor dui ipsum, nec ultricies ante eleifend vel curabitur.</a:t>
-            </a:r>
-          </a:p>
-          <a:p>
+              <a:t>Specifically, we captured historical data on the following pollutants:</a:t>
+            </a:r>
+          </a:p>
+          <a:p>
+            <a:pPr marL="684213" lvl="1">
+              <a:lnSpc>
+                <a:spcPct val="100000"/>
+              </a:lnSpc>
+              <a:spcBef>
+                <a:spcPts val="1200"/>
+              </a:spcBef>
+            </a:pPr>
+            <a:r>
+              <a:rPr lang="en-US" sz="1200" dirty="0"/>
+              <a:t>Carbon monoxide (CO)</a:t>
+            </a:r>
+          </a:p>
+          <a:p>
+            <a:pPr marL="684213" lvl="1">
+              <a:lnSpc>
+                <a:spcPct val="100000"/>
+              </a:lnSpc>
+              <a:spcBef>
+                <a:spcPts val="1200"/>
+              </a:spcBef>
+            </a:pPr>
+            <a:r>
+              <a:rPr lang="en-US" sz="1200" dirty="0"/>
+              <a:t>Nitrogen monoxide (NO)</a:t>
+            </a:r>
+          </a:p>
+          <a:p>
+            <a:pPr marL="684213" lvl="1">
+              <a:lnSpc>
+                <a:spcPct val="100000"/>
+              </a:lnSpc>
+              <a:spcBef>
+                <a:spcPts val="1200"/>
+              </a:spcBef>
+            </a:pPr>
+            <a:r>
+              <a:rPr lang="en-US" sz="1200" dirty="0"/>
+              <a:t>Nitrogen dioxide (NO2)</a:t>
+            </a:r>
+          </a:p>
+          <a:p>
+            <a:pPr marL="684213" lvl="1">
+              <a:lnSpc>
+                <a:spcPct val="100000"/>
+              </a:lnSpc>
+              <a:spcBef>
+                <a:spcPts val="1200"/>
+              </a:spcBef>
+            </a:pPr>
+            <a:r>
+              <a:rPr lang="en-US" sz="1200" dirty="0"/>
+              <a:t>Ozone (O3)</a:t>
+            </a:r>
+          </a:p>
+          <a:p>
+            <a:pPr marL="684213" lvl="1">
+              <a:lnSpc>
+                <a:spcPct val="100000"/>
+              </a:lnSpc>
+              <a:spcBef>
+                <a:spcPts val="1200"/>
+              </a:spcBef>
+            </a:pPr>
+            <a:r>
+              <a:rPr lang="en-US" sz="1200" dirty="0"/>
+              <a:t>Sulphur dioxide (SO2)</a:t>
+            </a:r>
+          </a:p>
+          <a:p>
+            <a:pPr marL="684213" lvl="1">
+              <a:lnSpc>
+                <a:spcPct val="100000"/>
+              </a:lnSpc>
+              <a:spcBef>
+                <a:spcPts val="1200"/>
+              </a:spcBef>
+            </a:pPr>
+            <a:r>
+              <a:rPr lang="en-US" sz="1200" dirty="0"/>
+              <a:t>Ammonia (NH3)</a:t>
+            </a:r>
+          </a:p>
+          <a:p>
+            <a:pPr marL="684213" lvl="1">
+              <a:lnSpc>
+                <a:spcPct val="100000"/>
+              </a:lnSpc>
+              <a:spcBef>
+                <a:spcPts val="1200"/>
+              </a:spcBef>
+            </a:pPr>
+            <a:r>
+              <a:rPr lang="en-US" sz="1200" dirty="0"/>
+              <a:t>Particle pollution (also known as particulate matter, specifically PM2.5 and PM10)</a:t>
+            </a:r>
+          </a:p>
+          <a:p>
+            <a:pPr>
+              <a:spcBef>
+                <a:spcPts val="1200"/>
+              </a:spcBef>
+            </a:pPr>
             <a:endParaRPr lang="en-US" dirty="0"/>
+          </a:p>
+        </p:txBody>
+      </p:sp>
+      <p:sp>
+        <p:nvSpPr>
+          <p:cNvPr id="12" name="Text Placeholder 11">
+            <a:extLst>
+              <a:ext uri="{FF2B5EF4-FFF2-40B4-BE49-F238E27FC236}">
+                <a16:creationId xmlns:a16="http://schemas.microsoft.com/office/drawing/2014/main" id="{045C97E3-0CF5-415A-BEEC-B465AA7F130B}"/>
+              </a:ext>
+            </a:extLst>
+          </p:cNvPr>
+          <p:cNvSpPr>
+            <a:spLocks noGrp="1"/>
+          </p:cNvSpPr>
+          <p:nvPr>
+            <p:ph type="body" sz="quarter" idx="12"/>
+          </p:nvPr>
+        </p:nvSpPr>
+        <p:spPr>
+          <a:xfrm>
+            <a:off x="7569842" y="457200"/>
+            <a:ext cx="4545957" cy="382749"/>
+          </a:xfrm>
+        </p:spPr>
+        <p:txBody>
+          <a:bodyPr>
+            <a:normAutofit/>
+          </a:bodyPr>
+          <a:lstStyle/>
+          <a:p>
+            <a:r>
+              <a:rPr lang="en-US" sz="1800" dirty="0"/>
+              <a:t>Air Quality Index (AQI) Analysis</a:t>
+            </a:r>
           </a:p>
         </p:txBody>
       </p:sp>
     </p:spTree>
     <p:extLst>
       <p:ext uri="{BB962C8B-B14F-4D97-AF65-F5344CB8AC3E}">
-        <p14:creationId xmlns:p14="http://schemas.microsoft.com/office/powerpoint/2010/main" val="3298998420"/>
+        <p14:creationId xmlns:p14="http://schemas.microsoft.com/office/powerpoint/2010/main" val="605044435"/>
       </p:ext>
     </p:extLst>
   </p:cSld>
@@ -19948,53 +21892,325 @@
           <a:chExt cx="0" cy="0"/>
         </a:xfrm>
       </p:grpSpPr>
+      <p:sp>
+        <p:nvSpPr>
+          <p:cNvPr id="14" name="Title 13">
+            <a:extLst>
+              <a:ext uri="{FF2B5EF4-FFF2-40B4-BE49-F238E27FC236}">
+                <a16:creationId xmlns:a16="http://schemas.microsoft.com/office/drawing/2014/main" id="{5A981189-9280-48E8-90AE-7F25E741BE94}"/>
+              </a:ext>
+            </a:extLst>
+          </p:cNvPr>
+          <p:cNvSpPr>
+            <a:spLocks noGrp="1"/>
+          </p:cNvSpPr>
+          <p:nvPr>
+            <p:ph type="title"/>
+          </p:nvPr>
+        </p:nvSpPr>
+        <p:spPr>
+          <a:xfrm>
+            <a:off x="844946" y="1193765"/>
+            <a:ext cx="4385843" cy="1325563"/>
+          </a:xfrm>
+        </p:spPr>
+        <p:txBody>
+          <a:bodyPr>
+            <a:normAutofit/>
+          </a:bodyPr>
+          <a:lstStyle/>
+          <a:p>
+            <a:pPr algn="ctr"/>
+            <a:r>
+              <a:rPr lang="en-US" sz="4400" dirty="0">
+                <a:solidFill>
+                  <a:srgbClr val="5DAAB0"/>
+                </a:solidFill>
+                <a:latin typeface="+mn-lt"/>
+              </a:rPr>
+              <a:t>Sources of Data</a:t>
+            </a:r>
+          </a:p>
+        </p:txBody>
+      </p:sp>
+      <p:sp>
+        <p:nvSpPr>
+          <p:cNvPr id="17" name="Text Placeholder 16">
+            <a:extLst>
+              <a:ext uri="{FF2B5EF4-FFF2-40B4-BE49-F238E27FC236}">
+                <a16:creationId xmlns:a16="http://schemas.microsoft.com/office/drawing/2014/main" id="{98B9CB9E-1380-488B-88F1-B99F12EFA776}"/>
+              </a:ext>
+            </a:extLst>
+          </p:cNvPr>
+          <p:cNvSpPr>
+            <a:spLocks noGrp="1"/>
+          </p:cNvSpPr>
+          <p:nvPr>
+            <p:ph type="body" sz="quarter" idx="12"/>
+          </p:nvPr>
+        </p:nvSpPr>
+        <p:spPr>
+          <a:xfrm>
+            <a:off x="5470815" y="2540529"/>
+            <a:ext cx="6321939" cy="382749"/>
+          </a:xfrm>
+        </p:spPr>
+        <p:txBody>
+          <a:bodyPr/>
+          <a:lstStyle/>
+          <a:p>
+            <a:pPr algn="ctr"/>
+            <a:r>
+              <a:rPr lang="en-US" dirty="0"/>
+              <a:t>OpenWeather API</a:t>
+            </a:r>
+          </a:p>
+        </p:txBody>
+      </p:sp>
+      <p:sp>
+        <p:nvSpPr>
+          <p:cNvPr id="16" name="Text Placeholder 15">
+            <a:extLst>
+              <a:ext uri="{FF2B5EF4-FFF2-40B4-BE49-F238E27FC236}">
+                <a16:creationId xmlns:a16="http://schemas.microsoft.com/office/drawing/2014/main" id="{5E9ED32E-028C-428E-97AF-168C8D6F92A9}"/>
+              </a:ext>
+            </a:extLst>
+          </p:cNvPr>
+          <p:cNvSpPr>
+            <a:spLocks noGrp="1"/>
+          </p:cNvSpPr>
+          <p:nvPr>
+            <p:ph type="body" sz="quarter" idx="15"/>
+          </p:nvPr>
+        </p:nvSpPr>
+        <p:spPr>
+          <a:xfrm>
+            <a:off x="5470525" y="2944813"/>
+            <a:ext cx="3046413" cy="3471862"/>
+          </a:xfrm>
+        </p:spPr>
+        <p:txBody>
+          <a:bodyPr>
+            <a:normAutofit lnSpcReduction="10000"/>
+          </a:bodyPr>
+          <a:lstStyle/>
+          <a:p>
+            <a:pPr>
+              <a:lnSpc>
+                <a:spcPct val="110000"/>
+              </a:lnSpc>
+              <a:spcBef>
+                <a:spcPts val="600"/>
+              </a:spcBef>
+            </a:pPr>
+            <a:r>
+              <a:rPr lang="en-US" sz="1200" dirty="0"/>
+              <a:t>The OpenWeather Air Pollution API provides current, forecast and historical air pollution data for any coordinates on the globe</a:t>
+            </a:r>
+          </a:p>
+          <a:p>
+            <a:pPr algn="l">
+              <a:lnSpc>
+                <a:spcPct val="110000"/>
+              </a:lnSpc>
+              <a:spcBef>
+                <a:spcPts val="600"/>
+              </a:spcBef>
+            </a:pPr>
+            <a:r>
+              <a:rPr lang="en-US" sz="1200" dirty="0"/>
+              <a:t>OpenWeather classifies Air Quality per the scale below:</a:t>
+            </a:r>
+          </a:p>
+          <a:p>
+            <a:pPr marL="461963" lvl="1">
+              <a:lnSpc>
+                <a:spcPct val="110000"/>
+              </a:lnSpc>
+              <a:spcBef>
+                <a:spcPts val="600"/>
+              </a:spcBef>
+            </a:pPr>
+            <a:r>
+              <a:rPr lang="en-US" sz="1100" dirty="0"/>
+              <a:t>1 = Good</a:t>
+            </a:r>
+          </a:p>
+          <a:p>
+            <a:pPr marL="461963" lvl="1">
+              <a:lnSpc>
+                <a:spcPct val="110000"/>
+              </a:lnSpc>
+              <a:spcBef>
+                <a:spcPts val="600"/>
+              </a:spcBef>
+            </a:pPr>
+            <a:r>
+              <a:rPr lang="en-US" sz="1100" dirty="0"/>
+              <a:t>2 = Fair</a:t>
+            </a:r>
+          </a:p>
+          <a:p>
+            <a:pPr marL="461963" lvl="1">
+              <a:lnSpc>
+                <a:spcPct val="110000"/>
+              </a:lnSpc>
+              <a:spcBef>
+                <a:spcPts val="600"/>
+              </a:spcBef>
+            </a:pPr>
+            <a:r>
+              <a:rPr lang="en-US" sz="1100" dirty="0"/>
+              <a:t>3 = Moderate</a:t>
+            </a:r>
+          </a:p>
+          <a:p>
+            <a:pPr marL="461963" lvl="1">
+              <a:lnSpc>
+                <a:spcPct val="110000"/>
+              </a:lnSpc>
+              <a:spcBef>
+                <a:spcPts val="600"/>
+              </a:spcBef>
+            </a:pPr>
+            <a:r>
+              <a:rPr lang="en-US" sz="1100" dirty="0"/>
+              <a:t>4 = Poor</a:t>
+            </a:r>
+          </a:p>
+          <a:p>
+            <a:pPr marL="461963" lvl="1">
+              <a:lnSpc>
+                <a:spcPct val="110000"/>
+              </a:lnSpc>
+              <a:spcBef>
+                <a:spcPts val="600"/>
+              </a:spcBef>
+            </a:pPr>
+            <a:r>
+              <a:rPr lang="en-US" sz="1100" dirty="0"/>
+              <a:t>5 = Very Poor</a:t>
+            </a:r>
+          </a:p>
+          <a:p>
+            <a:pPr>
+              <a:lnSpc>
+                <a:spcPct val="110000"/>
+              </a:lnSpc>
+              <a:spcBef>
+                <a:spcPts val="600"/>
+              </a:spcBef>
+            </a:pPr>
+            <a:r>
+              <a:rPr lang="en-US" sz="1200" dirty="0" err="1"/>
+              <a:t>OpenWeather's</a:t>
+            </a:r>
+            <a:r>
+              <a:rPr lang="en-US" sz="1200" dirty="0"/>
+              <a:t> API considers elements beyond the basic Air Quality Index (AQI). It also captures metrics on 8 different pollutants</a:t>
+            </a:r>
+          </a:p>
+        </p:txBody>
+      </p:sp>
+      <p:sp>
+        <p:nvSpPr>
+          <p:cNvPr id="18" name="Text Placeholder 17">
+            <a:extLst>
+              <a:ext uri="{FF2B5EF4-FFF2-40B4-BE49-F238E27FC236}">
+                <a16:creationId xmlns:a16="http://schemas.microsoft.com/office/drawing/2014/main" id="{94D72ABF-5D1D-4141-8DFE-03D197B7C1E3}"/>
+              </a:ext>
+            </a:extLst>
+          </p:cNvPr>
+          <p:cNvSpPr>
+            <a:spLocks noGrp="1"/>
+          </p:cNvSpPr>
+          <p:nvPr>
+            <p:ph type="body" sz="quarter" idx="16"/>
+          </p:nvPr>
+        </p:nvSpPr>
+        <p:spPr>
+          <a:xfrm>
+            <a:off x="8769606" y="2944813"/>
+            <a:ext cx="3023149" cy="3471862"/>
+          </a:xfrm>
+        </p:spPr>
+        <p:txBody>
+          <a:bodyPr>
+            <a:noAutofit/>
+          </a:bodyPr>
+          <a:lstStyle/>
+          <a:p>
+            <a:r>
+              <a:rPr lang="en-US" sz="1200" dirty="0"/>
+              <a:t>Historical data is accessible from 27th November 2020</a:t>
+            </a:r>
+          </a:p>
+          <a:p>
+            <a:r>
+              <a:rPr lang="en-US" sz="1200" dirty="0"/>
+              <a:t>We pulled latitudes and longitudes from all US states in a separate CSV and used this data to capture the </a:t>
+            </a:r>
+            <a:r>
+              <a:rPr lang="en-US" sz="1200" dirty="0" err="1"/>
+              <a:t>lat</a:t>
+            </a:r>
+            <a:r>
+              <a:rPr lang="en-US" sz="1200" dirty="0"/>
+              <a:t>/long coordinates of the center of our 4 selected states:</a:t>
+            </a:r>
+          </a:p>
+          <a:p>
+            <a:pPr marL="461963" lvl="1"/>
+            <a:r>
+              <a:rPr lang="en-US" sz="1100" dirty="0"/>
+              <a:t>Alaska</a:t>
+            </a:r>
+          </a:p>
+          <a:p>
+            <a:pPr marL="461963" lvl="1"/>
+            <a:r>
+              <a:rPr lang="en-US" sz="1100" dirty="0"/>
+              <a:t>California</a:t>
+            </a:r>
+          </a:p>
+          <a:p>
+            <a:pPr marL="461963" lvl="1"/>
+            <a:r>
+              <a:rPr lang="en-US" sz="1100" dirty="0"/>
+              <a:t>Washington, DC</a:t>
+            </a:r>
+          </a:p>
+          <a:p>
+            <a:pPr marL="461963" lvl="1"/>
+            <a:r>
+              <a:rPr lang="en-US" sz="1100" dirty="0"/>
+              <a:t>Massachusetts</a:t>
+            </a:r>
+          </a:p>
+          <a:p>
+            <a:r>
+              <a:rPr lang="en-US" sz="1200" dirty="0"/>
+              <a:t>We then created 4 different API requests for the 4 states and captured the AQI data into a separate CSV, which we then loaded into Tableau for visualization purposes</a:t>
+            </a:r>
+          </a:p>
+        </p:txBody>
+      </p:sp>
       <p:pic>
         <p:nvPicPr>
-          <p:cNvPr id="10" name="Picture Placeholder 13" descr="Two people standing in front of a window&#10; ">
-            <a:extLst>
-              <a:ext uri="{FF2B5EF4-FFF2-40B4-BE49-F238E27FC236}">
-                <a16:creationId xmlns:a16="http://schemas.microsoft.com/office/drawing/2014/main" id="{CF497EBA-3F02-4AFE-A2E1-05410BF6A4C0}"/>
+          <p:cNvPr id="10" name="Picture Placeholder 12" descr="A person standing on a table&#10; ">
+            <a:extLst>
+              <a:ext uri="{FF2B5EF4-FFF2-40B4-BE49-F238E27FC236}">
+                <a16:creationId xmlns:a16="http://schemas.microsoft.com/office/drawing/2014/main" id="{B93D62B6-D685-446E-92E8-EAAF5504305A}"/>
               </a:ext>
             </a:extLst>
           </p:cNvPr>
           <p:cNvPicPr>
-            <a:picLocks noGrp="1" noChangeAspect="1"/>
+            <a:picLocks noChangeAspect="1"/>
           </p:cNvPicPr>
-          <p:nvPr>
-            <p:ph type="pic" sz="quarter" idx="13"/>
-          </p:nvPr>
-        </p:nvPicPr>
-        <p:blipFill rotWithShape="1">
-          <a:blip r:embed="rId3" cstate="screen">
-            <a:extLst>
-              <a:ext uri="{28A0092B-C50C-407E-A947-70E740481C1C}">
-                <a14:useLocalDpi xmlns:a14="http://schemas.microsoft.com/office/drawing/2010/main"/>
-              </a:ext>
-            </a:extLst>
-          </a:blip>
-          <a:srcRect l="26219" r="26219"/>
-          <a:stretch/>
-        </p:blipFill>
-        <p:spPr/>
-      </p:pic>
-      <p:pic>
-        <p:nvPicPr>
-          <p:cNvPr id="13" name="Picture Placeholder 12" descr="A person standing on a table&#10; ">
-            <a:extLst>
-              <a:ext uri="{FF2B5EF4-FFF2-40B4-BE49-F238E27FC236}">
-                <a16:creationId xmlns:a16="http://schemas.microsoft.com/office/drawing/2014/main" id="{A4B6015D-7E4F-478A-B264-E70A90F082D8}"/>
-              </a:ext>
-            </a:extLst>
-          </p:cNvPr>
-          <p:cNvPicPr>
-            <a:picLocks noGrp="1" noChangeAspect="1"/>
-          </p:cNvPicPr>
-          <p:nvPr>
-            <p:ph type="pic" sz="quarter" idx="15"/>
-          </p:nvPr>
+          <p:nvPr/>
         </p:nvPicPr>
         <p:blipFill>
-          <a:blip r:embed="rId4" cstate="screen">
+          <a:blip r:embed="rId3" cstate="screen">
             <a:extLst>
               <a:ext uri="{28A0092B-C50C-407E-A947-70E740481C1C}">
                 <a14:useLocalDpi xmlns:a14="http://schemas.microsoft.com/office/drawing/2010/main"/>
@@ -20006,76 +22222,20 @@
             <a:fillRect/>
           </a:stretch>
         </p:blipFill>
-        <p:spPr/>
+        <p:spPr>
+          <a:xfrm>
+            <a:off x="1011423" y="2519328"/>
+            <a:ext cx="4052888" cy="3803650"/>
+          </a:xfrm>
+          <a:prstGeom prst="rect">
+            <a:avLst/>
+          </a:prstGeom>
+        </p:spPr>
       </p:pic>
-      <p:pic>
-        <p:nvPicPr>
-          <p:cNvPr id="11" name="Picture Placeholder 13" descr="3 ladies in discussion">
-            <a:extLst>
-              <a:ext uri="{FF2B5EF4-FFF2-40B4-BE49-F238E27FC236}">
-                <a16:creationId xmlns:a16="http://schemas.microsoft.com/office/drawing/2014/main" id="{FD7B103C-B5B8-46F9-B225-3C5D1DF400E3}"/>
-              </a:ext>
-              <a:ext uri="{C183D7F6-B498-43B3-948B-1728B52AA6E4}">
-                <adec:decorative xmlns:adec="http://schemas.microsoft.com/office/drawing/2017/decorative" val="0"/>
-              </a:ext>
-            </a:extLst>
-          </p:cNvPr>
-          <p:cNvPicPr>
-            <a:picLocks noGrp="1" noChangeAspect="1"/>
-          </p:cNvPicPr>
-          <p:nvPr>
-            <p:ph type="pic" sz="quarter" idx="16"/>
-          </p:nvPr>
-        </p:nvPicPr>
-        <p:blipFill>
-          <a:blip r:embed="rId5" cstate="screen">
-            <a:extLst>
-              <a:ext uri="{28A0092B-C50C-407E-A947-70E740481C1C}">
-                <a14:useLocalDpi xmlns:a14="http://schemas.microsoft.com/office/drawing/2010/main"/>
-              </a:ext>
-            </a:extLst>
-          </a:blip>
-          <a:srcRect t="5646" b="5646"/>
-          <a:stretch>
-            <a:fillRect/>
-          </a:stretch>
-        </p:blipFill>
-        <p:spPr/>
-      </p:pic>
-      <p:sp>
-        <p:nvSpPr>
-          <p:cNvPr id="6" name="Title 5">
-            <a:extLst>
-              <a:ext uri="{FF2B5EF4-FFF2-40B4-BE49-F238E27FC236}">
-                <a16:creationId xmlns:a16="http://schemas.microsoft.com/office/drawing/2014/main" id="{AD8CD555-AB49-4CAE-998F-97A85F59AD6D}"/>
-              </a:ext>
-            </a:extLst>
-          </p:cNvPr>
-          <p:cNvSpPr>
-            <a:spLocks noGrp="1"/>
-          </p:cNvSpPr>
-          <p:nvPr>
-            <p:ph type="title"/>
-          </p:nvPr>
-        </p:nvSpPr>
-        <p:spPr/>
-        <p:txBody>
-          <a:bodyPr/>
-          <a:lstStyle/>
-          <a:p>
-            <a:r>
-              <a:rPr lang="en-US" dirty="0">
-                <a:latin typeface="+mn-lt"/>
-              </a:rPr>
-              <a:t>Click to Add Slide Title Here</a:t>
-            </a:r>
-          </a:p>
-        </p:txBody>
-      </p:sp>
     </p:spTree>
     <p:extLst>
       <p:ext uri="{BB962C8B-B14F-4D97-AF65-F5344CB8AC3E}">
-        <p14:creationId xmlns:p14="http://schemas.microsoft.com/office/powerpoint/2010/main" val="202479834"/>
+        <p14:creationId xmlns:p14="http://schemas.microsoft.com/office/powerpoint/2010/main" val="3298998420"/>
       </p:ext>
     </p:extLst>
   </p:cSld>
@@ -20088,14 +22248,6 @@
 <file path=ppt/slides/slide6.xml><?xml version="1.0" encoding="utf-8"?>
 <p:sld xmlns:a="http://schemas.openxmlformats.org/drawingml/2006/main" xmlns:r="http://schemas.openxmlformats.org/officeDocument/2006/relationships" xmlns:p="http://schemas.openxmlformats.org/presentationml/2006/main">
   <p:cSld>
-    <p:bg>
-      <p:bgPr>
-        <a:solidFill>
-          <a:srgbClr val="5DAAB0"/>
-        </a:solidFill>
-        <a:effectLst/>
-      </p:bgPr>
-    </p:bg>
     <p:spTree>
       <p:nvGrpSpPr>
         <p:cNvPr id="1" name=""/>
@@ -20110,72 +22262,272 @@
           <a:chExt cx="0" cy="0"/>
         </a:xfrm>
       </p:grpSpPr>
-      <p:sp>
-        <p:nvSpPr>
-          <p:cNvPr id="4" name="Text Placeholder 3">
-            <a:extLst>
-              <a:ext uri="{FF2B5EF4-FFF2-40B4-BE49-F238E27FC236}">
-                <a16:creationId xmlns:a16="http://schemas.microsoft.com/office/drawing/2014/main" id="{FD47FBB8-2A87-4FDD-8742-D0C12871A3DD}"/>
-              </a:ext>
-            </a:extLst>
-          </p:cNvPr>
-          <p:cNvSpPr>
-            <a:spLocks noGrp="1"/>
-          </p:cNvSpPr>
-          <p:nvPr>
-            <p:ph type="body" sz="quarter" idx="10"/>
-          </p:nvPr>
-        </p:nvSpPr>
-        <p:spPr/>
+      <p:pic>
+        <p:nvPicPr>
+          <p:cNvPr id="5" name="Picture Placeholder 4" descr="A picture containing diagram&#10;&#10;Description automatically generated">
+            <a:extLst>
+              <a:ext uri="{FF2B5EF4-FFF2-40B4-BE49-F238E27FC236}">
+                <a16:creationId xmlns:a16="http://schemas.microsoft.com/office/drawing/2014/main" id="{46D415C9-7299-415E-BB1A-8D05E98FAB58}"/>
+              </a:ext>
+            </a:extLst>
+          </p:cNvPr>
+          <p:cNvPicPr>
+            <a:picLocks noGrp="1" noChangeAspect="1"/>
+          </p:cNvPicPr>
+          <p:nvPr>
+            <p:ph type="pic" sz="quarter" idx="10"/>
+          </p:nvPr>
+        </p:nvPicPr>
+        <p:blipFill rotWithShape="1">
+          <a:blip r:embed="rId3"/>
+          <a:srcRect l="755" t="14912" r="-755" b="17163"/>
+          <a:stretch/>
+        </p:blipFill>
+        <p:spPr>
+          <a:xfrm>
+            <a:off x="838200" y="3179380"/>
+            <a:ext cx="8077200" cy="3657600"/>
+          </a:xfrm>
+        </p:spPr>
+      </p:pic>
+      <p:sp>
+        <p:nvSpPr>
+          <p:cNvPr id="9" name="Title 8">
+            <a:extLst>
+              <a:ext uri="{FF2B5EF4-FFF2-40B4-BE49-F238E27FC236}">
+                <a16:creationId xmlns:a16="http://schemas.microsoft.com/office/drawing/2014/main" id="{5249062A-D4B8-4980-B15D-2F0CF58BB5B7}"/>
+              </a:ext>
+            </a:extLst>
+          </p:cNvPr>
+          <p:cNvSpPr>
+            <a:spLocks noGrp="1"/>
+          </p:cNvSpPr>
+          <p:nvPr>
+            <p:ph type="title"/>
+          </p:nvPr>
+        </p:nvSpPr>
+        <p:spPr>
+          <a:xfrm>
+            <a:off x="2354003" y="1691472"/>
+            <a:ext cx="5045593" cy="1325563"/>
+          </a:xfrm>
+        </p:spPr>
         <p:txBody>
           <a:bodyPr/>
           <a:lstStyle/>
           <a:p>
+            <a:pPr algn="ctr"/>
             <a:r>
               <a:rPr lang="en-US" dirty="0">
                 <a:solidFill>
-                  <a:schemeClr val="bg1">
-                    <a:alpha val="20000"/>
-                  </a:schemeClr>
+                  <a:srgbClr val="5DAAB0"/>
                 </a:solidFill>
                 <a:latin typeface="+mn-lt"/>
               </a:rPr>
-              <a:t>1</a:t>
-            </a:r>
-          </a:p>
-        </p:txBody>
-      </p:sp>
-      <p:sp>
-        <p:nvSpPr>
-          <p:cNvPr id="3" name="Title 2">
-            <a:extLst>
-              <a:ext uri="{FF2B5EF4-FFF2-40B4-BE49-F238E27FC236}">
-                <a16:creationId xmlns:a16="http://schemas.microsoft.com/office/drawing/2014/main" id="{F73D75BE-E7AD-49A1-A453-D007D958AC3D}"/>
-              </a:ext>
-            </a:extLst>
-          </p:cNvPr>
-          <p:cNvSpPr>
-            <a:spLocks noGrp="1"/>
-          </p:cNvSpPr>
-          <p:nvPr>
-            <p:ph type="title"/>
-          </p:nvPr>
-        </p:nvSpPr>
-        <p:spPr/>
+              <a:t>Analysis Hypothesis</a:t>
+            </a:r>
+          </a:p>
+        </p:txBody>
+      </p:sp>
+      <p:sp>
+        <p:nvSpPr>
+          <p:cNvPr id="11" name="Text Placeholder 10">
+            <a:extLst>
+              <a:ext uri="{FF2B5EF4-FFF2-40B4-BE49-F238E27FC236}">
+                <a16:creationId xmlns:a16="http://schemas.microsoft.com/office/drawing/2014/main" id="{B59FCEF3-B015-47B8-8D8F-7C0C90D275EB}"/>
+              </a:ext>
+            </a:extLst>
+          </p:cNvPr>
+          <p:cNvSpPr>
+            <a:spLocks noGrp="1"/>
+          </p:cNvSpPr>
+          <p:nvPr>
+            <p:ph type="body" sz="quarter" idx="11"/>
+          </p:nvPr>
+        </p:nvSpPr>
+        <p:spPr>
+          <a:xfrm>
+            <a:off x="7569842" y="920190"/>
+            <a:ext cx="4545957" cy="5328210"/>
+          </a:xfrm>
+        </p:spPr>
         <p:txBody>
           <a:bodyPr>
-            <a:normAutofit fontScale="90000"/>
+            <a:noAutofit/>
           </a:bodyPr>
           <a:lstStyle/>
           <a:p>
-            <a:r>
-              <a:rPr lang="en-US" dirty="0">
-                <a:solidFill>
-                  <a:schemeClr val="bg1"/>
-                </a:solidFill>
-                <a:latin typeface="+mn-lt"/>
-              </a:rPr>
-              <a:t>Section Header </a:t>
+            <a:pPr>
+              <a:spcBef>
+                <a:spcPts val="1200"/>
+              </a:spcBef>
+            </a:pPr>
+            <a:r>
+              <a:rPr lang="en-US" dirty="0"/>
+              <a:t>Which of the below air pollutants have the most impact of the overall AQI?</a:t>
+            </a:r>
+          </a:p>
+          <a:p>
+            <a:pPr marL="684213" lvl="1">
+              <a:lnSpc>
+                <a:spcPct val="100000"/>
+              </a:lnSpc>
+              <a:spcBef>
+                <a:spcPts val="1200"/>
+              </a:spcBef>
+            </a:pPr>
+            <a:r>
+              <a:rPr lang="en-US" sz="1200" dirty="0"/>
+              <a:t>Carbon monoxide (CO)</a:t>
+            </a:r>
+          </a:p>
+          <a:p>
+            <a:pPr marL="684213" lvl="1">
+              <a:lnSpc>
+                <a:spcPct val="100000"/>
+              </a:lnSpc>
+              <a:spcBef>
+                <a:spcPts val="1200"/>
+              </a:spcBef>
+            </a:pPr>
+            <a:r>
+              <a:rPr lang="en-US" sz="1200" dirty="0"/>
+              <a:t>Nitrogen monoxide (NO)</a:t>
+            </a:r>
+          </a:p>
+          <a:p>
+            <a:pPr marL="684213" lvl="1">
+              <a:lnSpc>
+                <a:spcPct val="100000"/>
+              </a:lnSpc>
+              <a:spcBef>
+                <a:spcPts val="1200"/>
+              </a:spcBef>
+            </a:pPr>
+            <a:r>
+              <a:rPr lang="en-US" sz="1200" dirty="0"/>
+              <a:t>Nitrogen dioxide (NO2)</a:t>
+            </a:r>
+          </a:p>
+          <a:p>
+            <a:pPr marL="684213" lvl="1">
+              <a:lnSpc>
+                <a:spcPct val="100000"/>
+              </a:lnSpc>
+              <a:spcBef>
+                <a:spcPts val="1200"/>
+              </a:spcBef>
+            </a:pPr>
+            <a:r>
+              <a:rPr lang="en-US" sz="1200" dirty="0"/>
+              <a:t>Ozone (O3)</a:t>
+            </a:r>
+          </a:p>
+          <a:p>
+            <a:pPr marL="684213" lvl="1">
+              <a:lnSpc>
+                <a:spcPct val="100000"/>
+              </a:lnSpc>
+              <a:spcBef>
+                <a:spcPts val="1200"/>
+              </a:spcBef>
+            </a:pPr>
+            <a:r>
+              <a:rPr lang="en-US" sz="1200" dirty="0"/>
+              <a:t>Sulphur dioxide (SO2)</a:t>
+            </a:r>
+          </a:p>
+          <a:p>
+            <a:pPr marL="684213" lvl="1">
+              <a:lnSpc>
+                <a:spcPct val="100000"/>
+              </a:lnSpc>
+              <a:spcBef>
+                <a:spcPts val="1200"/>
+              </a:spcBef>
+            </a:pPr>
+            <a:r>
+              <a:rPr lang="en-US" sz="1200" dirty="0"/>
+              <a:t>Ammonia (NH3)</a:t>
+            </a:r>
+          </a:p>
+          <a:p>
+            <a:pPr marL="684213" lvl="1">
+              <a:lnSpc>
+                <a:spcPct val="100000"/>
+              </a:lnSpc>
+              <a:spcBef>
+                <a:spcPts val="1200"/>
+              </a:spcBef>
+            </a:pPr>
+            <a:r>
+              <a:rPr lang="en-US" sz="1200" dirty="0"/>
+              <a:t>Particle pollution (also known as particulate matter, specifically PM2.5 and PM10)</a:t>
+            </a:r>
+          </a:p>
+          <a:p>
+            <a:pPr>
+              <a:spcBef>
+                <a:spcPts val="1200"/>
+              </a:spcBef>
+            </a:pPr>
+            <a:r>
+              <a:rPr lang="en-US" dirty="0"/>
+              <a:t>By running various machine learning models, we are trying to assess whether specific pollutants have more or less impact of the AQI. </a:t>
+            </a:r>
+          </a:p>
+          <a:p>
+            <a:pPr>
+              <a:spcBef>
+                <a:spcPts val="1200"/>
+              </a:spcBef>
+            </a:pPr>
+            <a:r>
+              <a:rPr lang="en-US" dirty="0"/>
+              <a:t>Moreover, we want to compare various states’ pollutants to see if there are any trends at the state level.</a:t>
+            </a:r>
+          </a:p>
+          <a:p>
+            <a:pPr>
+              <a:spcBef>
+                <a:spcPts val="1200"/>
+              </a:spcBef>
+            </a:pPr>
+            <a:endParaRPr lang="en-US" dirty="0"/>
+          </a:p>
+        </p:txBody>
+      </p:sp>
+      <p:sp>
+        <p:nvSpPr>
+          <p:cNvPr id="12" name="Text Placeholder 11">
+            <a:extLst>
+              <a:ext uri="{FF2B5EF4-FFF2-40B4-BE49-F238E27FC236}">
+                <a16:creationId xmlns:a16="http://schemas.microsoft.com/office/drawing/2014/main" id="{045C97E3-0CF5-415A-BEEC-B465AA7F130B}"/>
+              </a:ext>
+            </a:extLst>
+          </p:cNvPr>
+          <p:cNvSpPr>
+            <a:spLocks noGrp="1"/>
+          </p:cNvSpPr>
+          <p:nvPr>
+            <p:ph type="body" sz="quarter" idx="12"/>
+          </p:nvPr>
+        </p:nvSpPr>
+        <p:spPr>
+          <a:xfrm>
+            <a:off x="7569842" y="457200"/>
+            <a:ext cx="4545957" cy="382749"/>
+          </a:xfrm>
+        </p:spPr>
+        <p:txBody>
+          <a:bodyPr>
+            <a:normAutofit/>
+          </a:bodyPr>
+          <a:lstStyle/>
+          <a:p>
+            <a:r>
+              <a:rPr lang="en-US" sz="1800" dirty="0"/>
+              <a:t>Air Quality Index (AQI) Analysis</a:t>
             </a:r>
           </a:p>
         </p:txBody>
@@ -20183,7 +22535,7 @@
     </p:spTree>
     <p:extLst>
       <p:ext uri="{BB962C8B-B14F-4D97-AF65-F5344CB8AC3E}">
-        <p14:creationId xmlns:p14="http://schemas.microsoft.com/office/powerpoint/2010/main" val="954333892"/>
+        <p14:creationId xmlns:p14="http://schemas.microsoft.com/office/powerpoint/2010/main" val="2962108432"/>
       </p:ext>
     </p:extLst>
   </p:cSld>
@@ -20210,81 +22562,12 @@
           <a:chExt cx="0" cy="0"/>
         </a:xfrm>
       </p:grpSpPr>
-      <p:sp>
-        <p:nvSpPr>
-          <p:cNvPr id="5" name="Title 4">
-            <a:extLst>
-              <a:ext uri="{FF2B5EF4-FFF2-40B4-BE49-F238E27FC236}">
-                <a16:creationId xmlns:a16="http://schemas.microsoft.com/office/drawing/2014/main" id="{96DBE169-BA91-4B17-9AF2-4BAD528BEE06}"/>
-              </a:ext>
-            </a:extLst>
-          </p:cNvPr>
-          <p:cNvSpPr>
-            <a:spLocks noGrp="1"/>
-          </p:cNvSpPr>
-          <p:nvPr>
-            <p:ph type="title"/>
-          </p:nvPr>
-        </p:nvSpPr>
-        <p:spPr/>
-        <p:txBody>
-          <a:bodyPr>
-            <a:normAutofit fontScale="90000"/>
-          </a:bodyPr>
-          <a:lstStyle/>
-          <a:p>
-            <a:r>
-              <a:rPr lang="en-US" dirty="0"/>
-              <a:t>Click to Add Icon </a:t>
-            </a:r>
-            <a:r>
-              <a:rPr lang="en-US" dirty="0">
-                <a:solidFill>
-                  <a:srgbClr val="5DAAB0"/>
-                </a:solidFill>
-              </a:rPr>
-              <a:t>Slide Title Here </a:t>
-            </a:r>
-          </a:p>
-        </p:txBody>
-      </p:sp>
-      <p:sp>
-        <p:nvSpPr>
-          <p:cNvPr id="8" name="Text Placeholder 7">
-            <a:extLst>
-              <a:ext uri="{FF2B5EF4-FFF2-40B4-BE49-F238E27FC236}">
-                <a16:creationId xmlns:a16="http://schemas.microsoft.com/office/drawing/2014/main" id="{D9C2EAA8-D3C6-403B-B439-F95C60D0B3B9}"/>
-              </a:ext>
-            </a:extLst>
-          </p:cNvPr>
-          <p:cNvSpPr>
-            <a:spLocks noGrp="1"/>
-          </p:cNvSpPr>
-          <p:nvPr>
-            <p:ph type="body" sz="quarter" idx="12"/>
-          </p:nvPr>
-        </p:nvSpPr>
-        <p:spPr/>
-        <p:txBody>
-          <a:bodyPr/>
-          <a:lstStyle/>
-          <a:p>
-            <a:r>
-              <a:rPr lang="en-US" dirty="0"/>
-              <a:t>SUBTITLE GOES HERE</a:t>
-            </a:r>
-          </a:p>
-        </p:txBody>
-      </p:sp>
       <p:pic>
         <p:nvPicPr>
-          <p:cNvPr id="46" name="Picture Placeholder 45">
-            <a:extLst>
-              <a:ext uri="{FF2B5EF4-FFF2-40B4-BE49-F238E27FC236}">
-                <a16:creationId xmlns:a16="http://schemas.microsoft.com/office/drawing/2014/main" id="{6263CE43-D410-4BF8-8529-41197F401002}"/>
-              </a:ext>
-              <a:ext uri="{C183D7F6-B498-43B3-948B-1728B52AA6E4}">
-                <adec:decorative xmlns:adec="http://schemas.microsoft.com/office/drawing/2017/decorative" val="1"/>
+          <p:cNvPr id="10" name="Picture Placeholder 13" descr="Two people standing in front of a window&#10; ">
+            <a:extLst>
+              <a:ext uri="{FF2B5EF4-FFF2-40B4-BE49-F238E27FC236}">
+                <a16:creationId xmlns:a16="http://schemas.microsoft.com/office/drawing/2014/main" id="{CF497EBA-3F02-4AFE-A2E1-05410BF6A4C0}"/>
               </a:ext>
             </a:extLst>
           </p:cNvPr>
@@ -20301,30 +22584,19 @@
               <a:ext uri="{28A0092B-C50C-407E-A947-70E740481C1C}">
                 <a14:useLocalDpi xmlns:a14="http://schemas.microsoft.com/office/drawing/2010/main"/>
               </a:ext>
-              <a:ext uri="{96DAC541-7B7A-43D3-8B79-37D633B846F1}">
-                <asvg:svgBlip xmlns:asvg="http://schemas.microsoft.com/office/drawing/2016/SVG/main" r:embed="rId4"/>
-              </a:ext>
             </a:extLst>
           </a:blip>
-          <a:srcRect l="-29560" t="-29716" r="-29560" b="-29716"/>
+          <a:srcRect l="26219" r="26219"/>
           <a:stretch/>
         </p:blipFill>
-        <p:spPr>
-          <a:xfrm>
-            <a:off x="6687422" y="1038724"/>
-            <a:ext cx="804759" cy="804759"/>
-          </a:xfrm>
-        </p:spPr>
+        <p:spPr/>
       </p:pic>
       <p:pic>
         <p:nvPicPr>
-          <p:cNvPr id="50" name="Picture Placeholder 49">
-            <a:extLst>
-              <a:ext uri="{FF2B5EF4-FFF2-40B4-BE49-F238E27FC236}">
-                <a16:creationId xmlns:a16="http://schemas.microsoft.com/office/drawing/2014/main" id="{44B7CF38-0B19-41D9-8D37-6D59A3F3E045}"/>
-              </a:ext>
-              <a:ext uri="{C183D7F6-B498-43B3-948B-1728B52AA6E4}">
-                <adec:decorative xmlns:adec="http://schemas.microsoft.com/office/drawing/2017/decorative" val="1"/>
+          <p:cNvPr id="13" name="Picture Placeholder 12" descr="A person standing on a table&#10; ">
+            <a:extLst>
+              <a:ext uri="{FF2B5EF4-FFF2-40B4-BE49-F238E27FC236}">
+                <a16:creationId xmlns:a16="http://schemas.microsoft.com/office/drawing/2014/main" id="{A4B6015D-7E4F-478A-B264-E70A90F082D8}"/>
               </a:ext>
             </a:extLst>
           </p:cNvPr>
@@ -20332,39 +22604,33 @@
             <a:picLocks noGrp="1" noChangeAspect="1"/>
           </p:cNvPicPr>
           <p:nvPr>
-            <p:ph type="pic" sz="quarter" idx="14"/>
+            <p:ph type="pic" sz="quarter" idx="15"/>
           </p:nvPr>
         </p:nvPicPr>
-        <p:blipFill rotWithShape="1">
-          <a:blip r:embed="rId5" cstate="screen">
+        <p:blipFill>
+          <a:blip r:embed="rId4" cstate="screen">
             <a:extLst>
               <a:ext uri="{28A0092B-C50C-407E-A947-70E740481C1C}">
                 <a14:useLocalDpi xmlns:a14="http://schemas.microsoft.com/office/drawing/2010/main"/>
               </a:ext>
-              <a:ext uri="{96DAC541-7B7A-43D3-8B79-37D633B846F1}">
-                <asvg:svgBlip xmlns:asvg="http://schemas.microsoft.com/office/drawing/2016/SVG/main" r:embed="rId6"/>
-              </a:ext>
             </a:extLst>
           </a:blip>
-          <a:srcRect l="-22179" t="-22322" r="-22179" b="-22322"/>
-          <a:stretch/>
+          <a:srcRect l="14435" r="14435"/>
+          <a:stretch>
+            <a:fillRect/>
+          </a:stretch>
         </p:blipFill>
-        <p:spPr>
-          <a:xfrm>
-            <a:off x="6687422" y="2330235"/>
-            <a:ext cx="804759" cy="804759"/>
-          </a:xfrm>
-        </p:spPr>
+        <p:spPr/>
       </p:pic>
       <p:pic>
         <p:nvPicPr>
-          <p:cNvPr id="52" name="Picture Placeholder 51">
-            <a:extLst>
-              <a:ext uri="{FF2B5EF4-FFF2-40B4-BE49-F238E27FC236}">
-                <a16:creationId xmlns:a16="http://schemas.microsoft.com/office/drawing/2014/main" id="{26AA0551-AA74-4E7E-80AF-5D856020D1F8}"/>
+          <p:cNvPr id="11" name="Picture Placeholder 13" descr="3 ladies in discussion">
+            <a:extLst>
+              <a:ext uri="{FF2B5EF4-FFF2-40B4-BE49-F238E27FC236}">
+                <a16:creationId xmlns:a16="http://schemas.microsoft.com/office/drawing/2014/main" id="{FD7B103C-B5B8-46F9-B225-3C5D1DF400E3}"/>
               </a:ext>
               <a:ext uri="{C183D7F6-B498-43B3-948B-1728B52AA6E4}">
-                <adec:decorative xmlns:adec="http://schemas.microsoft.com/office/drawing/2017/decorative" val="1"/>
+                <adec:decorative xmlns:adec="http://schemas.microsoft.com/office/drawing/2017/decorative" val="0"/>
               </a:ext>
             </a:extLst>
           </p:cNvPr>
@@ -20372,121 +22638,38 @@
             <a:picLocks noGrp="1" noChangeAspect="1"/>
           </p:cNvPicPr>
           <p:nvPr>
-            <p:ph type="pic" sz="quarter" idx="15"/>
+            <p:ph type="pic" sz="quarter" idx="16"/>
           </p:nvPr>
         </p:nvPicPr>
-        <p:blipFill rotWithShape="1">
-          <a:blip r:embed="rId7" cstate="screen">
+        <p:blipFill>
+          <a:blip r:embed="rId5" cstate="screen">
             <a:extLst>
               <a:ext uri="{28A0092B-C50C-407E-A947-70E740481C1C}">
                 <a14:useLocalDpi xmlns:a14="http://schemas.microsoft.com/office/drawing/2010/main"/>
               </a:ext>
-              <a:ext uri="{96DAC541-7B7A-43D3-8B79-37D633B846F1}">
-                <asvg:svgBlip xmlns:asvg="http://schemas.microsoft.com/office/drawing/2016/SVG/main" r:embed="rId8"/>
-              </a:ext>
             </a:extLst>
           </a:blip>
-          <a:srcRect l="-27274" t="-27427" r="-27274" b="-27427"/>
-          <a:stretch/>
+          <a:srcRect t="5646" b="5646"/>
+          <a:stretch>
+            <a:fillRect/>
+          </a:stretch>
         </p:blipFill>
-        <p:spPr>
-          <a:xfrm>
-            <a:off x="6687422" y="3621746"/>
-            <a:ext cx="804759" cy="804759"/>
-          </a:xfrm>
-        </p:spPr>
+        <p:spPr/>
       </p:pic>
-      <p:pic>
-        <p:nvPicPr>
-          <p:cNvPr id="54" name="Picture Placeholder 53">
-            <a:extLst>
-              <a:ext uri="{FF2B5EF4-FFF2-40B4-BE49-F238E27FC236}">
-                <a16:creationId xmlns:a16="http://schemas.microsoft.com/office/drawing/2014/main" id="{21139392-74B8-43B3-BFDF-58CAC133651E}"/>
-              </a:ext>
-              <a:ext uri="{C183D7F6-B498-43B3-948B-1728B52AA6E4}">
-                <adec:decorative xmlns:adec="http://schemas.microsoft.com/office/drawing/2017/decorative" val="1"/>
-              </a:ext>
-            </a:extLst>
-          </p:cNvPr>
-          <p:cNvPicPr>
-            <a:picLocks noGrp="1" noChangeAspect="1"/>
-          </p:cNvPicPr>
-          <p:nvPr>
-            <p:ph type="pic" sz="quarter" idx="16"/>
-          </p:nvPr>
-        </p:nvPicPr>
-        <p:blipFill rotWithShape="1">
-          <a:blip r:embed="rId9" cstate="screen">
-            <a:extLst>
-              <a:ext uri="{28A0092B-C50C-407E-A947-70E740481C1C}">
-                <a14:useLocalDpi xmlns:a14="http://schemas.microsoft.com/office/drawing/2010/main"/>
-              </a:ext>
-              <a:ext uri="{96DAC541-7B7A-43D3-8B79-37D633B846F1}">
-                <asvg:svgBlip xmlns:asvg="http://schemas.microsoft.com/office/drawing/2016/SVG/main" r:embed="rId10"/>
-              </a:ext>
-            </a:extLst>
-          </a:blip>
-          <a:srcRect l="-30855" t="-31015" r="-30855" b="-31015"/>
-          <a:stretch/>
-        </p:blipFill>
-        <p:spPr>
-          <a:xfrm>
-            <a:off x="6687422" y="4913257"/>
-            <a:ext cx="804759" cy="804759"/>
-          </a:xfrm>
-        </p:spPr>
-      </p:pic>
-      <p:sp>
-        <p:nvSpPr>
-          <p:cNvPr id="7" name="Text Placeholder 6">
-            <a:extLst>
-              <a:ext uri="{FF2B5EF4-FFF2-40B4-BE49-F238E27FC236}">
-                <a16:creationId xmlns:a16="http://schemas.microsoft.com/office/drawing/2014/main" id="{87FCC6D1-213C-4A86-A2D0-742E15438C09}"/>
-              </a:ext>
-            </a:extLst>
-          </p:cNvPr>
-          <p:cNvSpPr>
-            <a:spLocks noGrp="1"/>
-          </p:cNvSpPr>
-          <p:nvPr>
-            <p:ph type="body" sz="quarter" idx="17"/>
-          </p:nvPr>
-        </p:nvSpPr>
-        <p:spPr/>
-        <p:txBody>
-          <a:bodyPr>
-            <a:normAutofit/>
-          </a:bodyPr>
-          <a:lstStyle/>
-          <a:p>
-            <a:r>
-              <a:rPr lang="en-US" dirty="0"/>
-              <a:t>Lorem ipsum dolor sit amet, consectetur adipiscing elit. Phasellus auctor efficitur </a:t>
-            </a:r>
-            <a:br>
-              <a:rPr lang="en-US" dirty="0"/>
-            </a:br>
-            <a:r>
-              <a:rPr lang="en-US" dirty="0"/>
-              <a:t>duiet facilisis. </a:t>
-            </a:r>
-          </a:p>
-        </p:txBody>
-      </p:sp>
-      <p:sp>
-        <p:nvSpPr>
-          <p:cNvPr id="20" name="Text Placeholder 19">
-            <a:extLst>
-              <a:ext uri="{FF2B5EF4-FFF2-40B4-BE49-F238E27FC236}">
-                <a16:creationId xmlns:a16="http://schemas.microsoft.com/office/drawing/2014/main" id="{82414D74-66D2-4C65-A48E-39F723FB2B2F}"/>
-              </a:ext>
-            </a:extLst>
-          </p:cNvPr>
-          <p:cNvSpPr>
-            <a:spLocks noGrp="1"/>
-          </p:cNvSpPr>
-          <p:nvPr>
-            <p:ph type="body" sz="quarter" idx="18"/>
+      <p:sp>
+        <p:nvSpPr>
+          <p:cNvPr id="6" name="Title 5">
+            <a:extLst>
+              <a:ext uri="{FF2B5EF4-FFF2-40B4-BE49-F238E27FC236}">
+                <a16:creationId xmlns:a16="http://schemas.microsoft.com/office/drawing/2014/main" id="{AD8CD555-AB49-4CAE-998F-97A85F59AD6D}"/>
+              </a:ext>
+            </a:extLst>
+          </p:cNvPr>
+          <p:cNvSpPr>
+            <a:spLocks noGrp="1"/>
+          </p:cNvSpPr>
+          <p:nvPr>
+            <p:ph type="title"/>
           </p:nvPr>
         </p:nvSpPr>
         <p:spPr/>
@@ -20495,118 +22678,10 @@
           <a:lstStyle/>
           <a:p>
             <a:r>
-              <a:rPr lang="en-US" dirty="0"/>
-              <a:t>Lorem ipsum dolor sit amet, consectetur adipiscing elit. Phasellus auctor efficitur </a:t>
-            </a:r>
-            <a:br>
-              <a:rPr lang="en-US" dirty="0"/>
-            </a:br>
-            <a:r>
-              <a:rPr lang="en-US" dirty="0"/>
-              <a:t>duiet facilisis. </a:t>
-            </a:r>
-          </a:p>
-        </p:txBody>
-      </p:sp>
-      <p:sp>
-        <p:nvSpPr>
-          <p:cNvPr id="21" name="Text Placeholder 20">
-            <a:extLst>
-              <a:ext uri="{FF2B5EF4-FFF2-40B4-BE49-F238E27FC236}">
-                <a16:creationId xmlns:a16="http://schemas.microsoft.com/office/drawing/2014/main" id="{E4D7EF6E-37B1-4694-B769-3DDEC29D8381}"/>
-              </a:ext>
-            </a:extLst>
-          </p:cNvPr>
-          <p:cNvSpPr>
-            <a:spLocks noGrp="1"/>
-          </p:cNvSpPr>
-          <p:nvPr>
-            <p:ph type="body" sz="quarter" idx="19"/>
-          </p:nvPr>
-        </p:nvSpPr>
-        <p:spPr/>
-        <p:txBody>
-          <a:bodyPr/>
-          <a:lstStyle/>
-          <a:p>
-            <a:r>
-              <a:rPr lang="en-US" dirty="0"/>
-              <a:t>Lorem ipsum dolor sit amet, consectetur adipiscing elit. Phasellus auctor efficitur </a:t>
-            </a:r>
-            <a:br>
-              <a:rPr lang="en-US" dirty="0"/>
-            </a:br>
-            <a:r>
-              <a:rPr lang="en-US" dirty="0"/>
-              <a:t>duiet facilisis. </a:t>
-            </a:r>
-          </a:p>
-        </p:txBody>
-      </p:sp>
-      <p:sp>
-        <p:nvSpPr>
-          <p:cNvPr id="22" name="Text Placeholder 21">
-            <a:extLst>
-              <a:ext uri="{FF2B5EF4-FFF2-40B4-BE49-F238E27FC236}">
-                <a16:creationId xmlns:a16="http://schemas.microsoft.com/office/drawing/2014/main" id="{ABF89FBA-20AC-4FD7-833B-ADA0EEFFCADC}"/>
-              </a:ext>
-            </a:extLst>
-          </p:cNvPr>
-          <p:cNvSpPr>
-            <a:spLocks noGrp="1"/>
-          </p:cNvSpPr>
-          <p:nvPr>
-            <p:ph type="body" sz="quarter" idx="20"/>
-          </p:nvPr>
-        </p:nvSpPr>
-        <p:spPr/>
-        <p:txBody>
-          <a:bodyPr/>
-          <a:lstStyle/>
-          <a:p>
-            <a:r>
-              <a:rPr lang="en-US" dirty="0"/>
-              <a:t>Lorem ipsum dolor sit amet, consectetur adipiscing elit. Phasellus auctor efficitur </a:t>
-            </a:r>
-            <a:br>
-              <a:rPr lang="en-US" dirty="0"/>
-            </a:br>
-            <a:r>
-              <a:rPr lang="en-US" dirty="0"/>
-              <a:t>duiet facilisis. </a:t>
-            </a:r>
-          </a:p>
-        </p:txBody>
-      </p:sp>
-      <p:sp>
-        <p:nvSpPr>
-          <p:cNvPr id="66" name="Text Placeholder 65">
-            <a:extLst>
-              <a:ext uri="{FF2B5EF4-FFF2-40B4-BE49-F238E27FC236}">
-                <a16:creationId xmlns:a16="http://schemas.microsoft.com/office/drawing/2014/main" id="{1AEF3ED8-A75C-4318-877C-139C98C0007D}"/>
-              </a:ext>
-            </a:extLst>
-          </p:cNvPr>
-          <p:cNvSpPr>
-            <a:spLocks noGrp="1"/>
-          </p:cNvSpPr>
-          <p:nvPr>
-            <p:ph type="body" sz="quarter" idx="11"/>
-          </p:nvPr>
-        </p:nvSpPr>
-        <p:spPr/>
-        <p:txBody>
-          <a:bodyPr/>
-          <a:lstStyle/>
-          <a:p>
-            <a:pPr>
-              <a:lnSpc>
-                <a:spcPct val="100000"/>
-              </a:lnSpc>
-            </a:pPr>
-            <a:r>
-              <a:rPr lang="en-US" dirty="0"/>
-              <a:t>Lorem ipsum dolor sit amet, consectetur adipiscing elit. Phasellus auctor efficitur dui et facilisis. Pellentesque habitant morbi tristique senectus et netus et malesuada fames ac turpis egestas. Etiam molestie in quam ac viverra. Cras consequat gravida aliquam. Maecenas cursus eleifend risus, in vulputate velit imperdiet non. Aenean tincidunt euismod ultricies. Fusce tempor dui ipsum, nec ultricies ante eleifend vel curabitur.</a:t>
+              <a:rPr lang="en-US" dirty="0">
+                <a:latin typeface="+mn-lt"/>
+              </a:rPr>
+              <a:t>Click to Add Slide Title Here</a:t>
             </a:r>
           </a:p>
         </p:txBody>
@@ -20614,7 +22689,7 @@
     </p:spTree>
     <p:extLst>
       <p:ext uri="{BB962C8B-B14F-4D97-AF65-F5344CB8AC3E}">
-        <p14:creationId xmlns:p14="http://schemas.microsoft.com/office/powerpoint/2010/main" val="226842063"/>
+        <p14:creationId xmlns:p14="http://schemas.microsoft.com/office/powerpoint/2010/main" val="202479834"/>
       </p:ext>
     </p:extLst>
   </p:cSld>
@@ -20627,6 +22702,14 @@
 <file path=ppt/slides/slide8.xml><?xml version="1.0" encoding="utf-8"?>
 <p:sld xmlns:a="http://schemas.openxmlformats.org/drawingml/2006/main" xmlns:r="http://schemas.openxmlformats.org/officeDocument/2006/relationships" xmlns:p="http://schemas.openxmlformats.org/presentationml/2006/main">
   <p:cSld>
+    <p:bg>
+      <p:bgPr>
+        <a:solidFill>
+          <a:srgbClr val="5DAAB0"/>
+        </a:solidFill>
+        <a:effectLst/>
+      </p:bgPr>
+    </p:bg>
     <p:spTree>
       <p:nvGrpSpPr>
         <p:cNvPr id="1" name=""/>
@@ -20643,18 +22726,18 @@
       </p:grpSpPr>
       <p:sp>
         <p:nvSpPr>
-          <p:cNvPr id="12" name="Title 11">
-            <a:extLst>
-              <a:ext uri="{FF2B5EF4-FFF2-40B4-BE49-F238E27FC236}">
-                <a16:creationId xmlns:a16="http://schemas.microsoft.com/office/drawing/2014/main" id="{13F9A722-C416-4CA0-9E81-3AB439623A87}"/>
-              </a:ext>
-            </a:extLst>
-          </p:cNvPr>
-          <p:cNvSpPr>
-            <a:spLocks noGrp="1"/>
-          </p:cNvSpPr>
-          <p:nvPr>
-            <p:ph type="title"/>
+          <p:cNvPr id="4" name="Text Placeholder 3">
+            <a:extLst>
+              <a:ext uri="{FF2B5EF4-FFF2-40B4-BE49-F238E27FC236}">
+                <a16:creationId xmlns:a16="http://schemas.microsoft.com/office/drawing/2014/main" id="{FD47FBB8-2A87-4FDD-8742-D0C12871A3DD}"/>
+              </a:ext>
+            </a:extLst>
+          </p:cNvPr>
+          <p:cNvSpPr>
+            <a:spLocks noGrp="1"/>
+          </p:cNvSpPr>
+          <p:nvPr>
+            <p:ph type="body" sz="quarter" idx="10"/>
           </p:nvPr>
         </p:nvSpPr>
         <p:spPr/>
@@ -20664,370 +22747,49 @@
           <a:p>
             <a:r>
               <a:rPr lang="en-US" dirty="0">
+                <a:solidFill>
+                  <a:schemeClr val="bg1">
+                    <a:alpha val="20000"/>
+                  </a:schemeClr>
+                </a:solidFill>
                 <a:latin typeface="+mn-lt"/>
               </a:rPr>
-              <a:t>Click to Add Team Slide Title Here </a:t>
-            </a:r>
-          </a:p>
-        </p:txBody>
-      </p:sp>
-      <p:pic>
-        <p:nvPicPr>
-          <p:cNvPr id="25" name="Picture Placeholder 23" descr="Member Photo">
-            <a:extLst>
-              <a:ext uri="{FF2B5EF4-FFF2-40B4-BE49-F238E27FC236}">
-                <a16:creationId xmlns:a16="http://schemas.microsoft.com/office/drawing/2014/main" id="{28471B48-B5D4-4311-8051-3D8458674D12}"/>
-              </a:ext>
-            </a:extLst>
-          </p:cNvPr>
-          <p:cNvPicPr>
-            <a:picLocks noGrp="1" noChangeAspect="1"/>
-          </p:cNvPicPr>
-          <p:nvPr>
-            <p:ph type="pic" sz="quarter" idx="11"/>
-          </p:nvPr>
-        </p:nvPicPr>
-        <p:blipFill>
-          <a:blip r:embed="rId3">
-            <a:grayscl/>
-            <a:extLst>
-              <a:ext uri="{28A0092B-C50C-407E-A947-70E740481C1C}">
-                <a14:useLocalDpi xmlns:a14="http://schemas.microsoft.com/office/drawing/2010/main"/>
-              </a:ext>
-            </a:extLst>
-          </a:blip>
-          <a:srcRect/>
-          <a:stretch>
-            <a:fillRect/>
-          </a:stretch>
-        </p:blipFill>
+              <a:t>2</a:t>
+            </a:r>
+          </a:p>
+        </p:txBody>
+      </p:sp>
+      <p:sp>
+        <p:nvSpPr>
+          <p:cNvPr id="3" name="Title 2">
+            <a:extLst>
+              <a:ext uri="{FF2B5EF4-FFF2-40B4-BE49-F238E27FC236}">
+                <a16:creationId xmlns:a16="http://schemas.microsoft.com/office/drawing/2014/main" id="{F73D75BE-E7AD-49A1-A453-D007D958AC3D}"/>
+              </a:ext>
+            </a:extLst>
+          </p:cNvPr>
+          <p:cNvSpPr>
+            <a:spLocks noGrp="1"/>
+          </p:cNvSpPr>
+          <p:nvPr>
+            <p:ph type="title"/>
+          </p:nvPr>
+        </p:nvSpPr>
         <p:spPr/>
-      </p:pic>
-      <p:pic>
-        <p:nvPicPr>
-          <p:cNvPr id="29" name="Picture Placeholder 25" descr="Member Photo">
-            <a:extLst>
-              <a:ext uri="{FF2B5EF4-FFF2-40B4-BE49-F238E27FC236}">
-                <a16:creationId xmlns:a16="http://schemas.microsoft.com/office/drawing/2014/main" id="{1507C138-F295-471C-A7C2-F827C437DE97}"/>
-              </a:ext>
-            </a:extLst>
-          </p:cNvPr>
-          <p:cNvPicPr>
-            <a:picLocks noGrp="1" noChangeAspect="1"/>
-          </p:cNvPicPr>
-          <p:nvPr>
-            <p:ph type="pic" sz="quarter" idx="12"/>
-          </p:nvPr>
-        </p:nvPicPr>
-        <p:blipFill>
-          <a:blip r:embed="rId4">
-            <a:grayscl/>
-            <a:extLst>
-              <a:ext uri="{28A0092B-C50C-407E-A947-70E740481C1C}">
-                <a14:useLocalDpi xmlns:a14="http://schemas.microsoft.com/office/drawing/2010/main"/>
-              </a:ext>
-            </a:extLst>
-          </a:blip>
-          <a:srcRect/>
-          <a:stretch>
-            <a:fillRect/>
-          </a:stretch>
-        </p:blipFill>
-        <p:spPr/>
-      </p:pic>
-      <p:pic>
-        <p:nvPicPr>
-          <p:cNvPr id="30" name="Picture Placeholder 27" descr="Member Photo">
-            <a:extLst>
-              <a:ext uri="{FF2B5EF4-FFF2-40B4-BE49-F238E27FC236}">
-                <a16:creationId xmlns:a16="http://schemas.microsoft.com/office/drawing/2014/main" id="{10D7B446-4830-437D-90F2-78FF39F842A8}"/>
-              </a:ext>
-            </a:extLst>
-          </p:cNvPr>
-          <p:cNvPicPr>
-            <a:picLocks noGrp="1" noChangeAspect="1"/>
-          </p:cNvPicPr>
-          <p:nvPr>
-            <p:ph type="pic" sz="quarter" idx="13"/>
-          </p:nvPr>
-        </p:nvPicPr>
-        <p:blipFill>
-          <a:blip r:embed="rId5">
-            <a:grayscl/>
-            <a:extLst>
-              <a:ext uri="{28A0092B-C50C-407E-A947-70E740481C1C}">
-                <a14:useLocalDpi xmlns:a14="http://schemas.microsoft.com/office/drawing/2010/main"/>
-              </a:ext>
-            </a:extLst>
-          </a:blip>
-          <a:srcRect/>
-          <a:stretch>
-            <a:fillRect/>
-          </a:stretch>
-        </p:blipFill>
-        <p:spPr/>
-      </p:pic>
-      <p:pic>
-        <p:nvPicPr>
-          <p:cNvPr id="31" name="Picture Placeholder 29" descr="Member Photo">
-            <a:extLst>
-              <a:ext uri="{FF2B5EF4-FFF2-40B4-BE49-F238E27FC236}">
-                <a16:creationId xmlns:a16="http://schemas.microsoft.com/office/drawing/2014/main" id="{7453335E-1D5E-4FDC-8418-75FFB424DE6C}"/>
-              </a:ext>
-            </a:extLst>
-          </p:cNvPr>
-          <p:cNvPicPr>
-            <a:picLocks noGrp="1" noChangeAspect="1"/>
-          </p:cNvPicPr>
-          <p:nvPr>
-            <p:ph type="pic" sz="quarter" idx="14"/>
-          </p:nvPr>
-        </p:nvPicPr>
-        <p:blipFill>
-          <a:blip r:embed="rId6">
-            <a:grayscl/>
-            <a:extLst>
-              <a:ext uri="{28A0092B-C50C-407E-A947-70E740481C1C}">
-                <a14:useLocalDpi xmlns:a14="http://schemas.microsoft.com/office/drawing/2010/main"/>
-              </a:ext>
-            </a:extLst>
-          </a:blip>
-          <a:srcRect/>
-          <a:stretch>
-            <a:fillRect/>
-          </a:stretch>
-        </p:blipFill>
-        <p:spPr/>
-      </p:pic>
-      <p:sp>
-        <p:nvSpPr>
-          <p:cNvPr id="17" name="Text Placeholder 16">
-            <a:extLst>
-              <a:ext uri="{FF2B5EF4-FFF2-40B4-BE49-F238E27FC236}">
-                <a16:creationId xmlns:a16="http://schemas.microsoft.com/office/drawing/2014/main" id="{4E6B8FC3-C6AB-4C05-AB1A-6A425F437168}"/>
-              </a:ext>
-            </a:extLst>
-          </p:cNvPr>
-          <p:cNvSpPr>
-            <a:spLocks noGrp="1"/>
-          </p:cNvSpPr>
-          <p:nvPr>
-            <p:ph type="body" sz="quarter" idx="15"/>
-          </p:nvPr>
-        </p:nvSpPr>
-        <p:spPr/>
-        <p:txBody>
-          <a:bodyPr/>
+        <p:txBody>
+          <a:bodyPr>
+            <a:normAutofit/>
+          </a:bodyPr>
           <a:lstStyle/>
           <a:p>
             <a:r>
-              <a:rPr lang="en-US" dirty="0"/>
-              <a:t>Lorem ipsum dolor sit amet, consectetur adipiscing elit. </a:t>
-            </a:r>
-          </a:p>
-        </p:txBody>
-      </p:sp>
-      <p:sp>
-        <p:nvSpPr>
-          <p:cNvPr id="18" name="Text Placeholder 17">
-            <a:extLst>
-              <a:ext uri="{FF2B5EF4-FFF2-40B4-BE49-F238E27FC236}">
-                <a16:creationId xmlns:a16="http://schemas.microsoft.com/office/drawing/2014/main" id="{6D905B54-BC78-4D3A-98A7-8BF350FAE60E}"/>
-              </a:ext>
-            </a:extLst>
-          </p:cNvPr>
-          <p:cNvSpPr>
-            <a:spLocks noGrp="1"/>
-          </p:cNvSpPr>
-          <p:nvPr>
-            <p:ph type="body" sz="quarter" idx="16"/>
-          </p:nvPr>
-        </p:nvSpPr>
-        <p:spPr/>
-        <p:txBody>
-          <a:bodyPr/>
-          <a:lstStyle/>
-          <a:p>
-            <a:r>
-              <a:rPr lang="en-US" dirty="0"/>
-              <a:t>ADD NAME</a:t>
-            </a:r>
-          </a:p>
-        </p:txBody>
-      </p:sp>
-      <p:sp>
-        <p:nvSpPr>
-          <p:cNvPr id="19" name="Text Placeholder 18">
-            <a:extLst>
-              <a:ext uri="{FF2B5EF4-FFF2-40B4-BE49-F238E27FC236}">
-                <a16:creationId xmlns:a16="http://schemas.microsoft.com/office/drawing/2014/main" id="{35D841AC-77B9-46F0-877E-EDFD058BCBF2}"/>
-              </a:ext>
-            </a:extLst>
-          </p:cNvPr>
-          <p:cNvSpPr>
-            <a:spLocks noGrp="1"/>
-          </p:cNvSpPr>
-          <p:nvPr>
-            <p:ph type="body" sz="quarter" idx="17"/>
-          </p:nvPr>
-        </p:nvSpPr>
-        <p:spPr/>
-        <p:txBody>
-          <a:bodyPr/>
-          <a:lstStyle/>
-          <a:p>
-            <a:r>
-              <a:rPr lang="en-US" dirty="0"/>
-              <a:t>Lorem ipsum dolor sit amet, consectetur adipiscing elit. </a:t>
-            </a:r>
-          </a:p>
-          <a:p>
-            <a:endParaRPr lang="en-US" dirty="0"/>
-          </a:p>
-        </p:txBody>
-      </p:sp>
-      <p:sp>
-        <p:nvSpPr>
-          <p:cNvPr id="20" name="Text Placeholder 19">
-            <a:extLst>
-              <a:ext uri="{FF2B5EF4-FFF2-40B4-BE49-F238E27FC236}">
-                <a16:creationId xmlns:a16="http://schemas.microsoft.com/office/drawing/2014/main" id="{D20F164F-C51A-49BD-BCBB-07C7BED267C0}"/>
-              </a:ext>
-            </a:extLst>
-          </p:cNvPr>
-          <p:cNvSpPr>
-            <a:spLocks noGrp="1"/>
-          </p:cNvSpPr>
-          <p:nvPr>
-            <p:ph type="body" sz="quarter" idx="18"/>
-          </p:nvPr>
-        </p:nvSpPr>
-        <p:spPr/>
-        <p:txBody>
-          <a:bodyPr/>
-          <a:lstStyle/>
-          <a:p>
-            <a:r>
-              <a:rPr lang="en-US" dirty="0"/>
-              <a:t>ADD NAME</a:t>
-            </a:r>
-          </a:p>
-        </p:txBody>
-      </p:sp>
-      <p:sp>
-        <p:nvSpPr>
-          <p:cNvPr id="21" name="Text Placeholder 20">
-            <a:extLst>
-              <a:ext uri="{FF2B5EF4-FFF2-40B4-BE49-F238E27FC236}">
-                <a16:creationId xmlns:a16="http://schemas.microsoft.com/office/drawing/2014/main" id="{F6997EE2-4A7E-42BA-A9A4-CA8914C6CA1F}"/>
-              </a:ext>
-            </a:extLst>
-          </p:cNvPr>
-          <p:cNvSpPr>
-            <a:spLocks noGrp="1"/>
-          </p:cNvSpPr>
-          <p:nvPr>
-            <p:ph type="body" sz="quarter" idx="23"/>
-          </p:nvPr>
-        </p:nvSpPr>
-        <p:spPr/>
-        <p:txBody>
-          <a:bodyPr/>
-          <a:lstStyle/>
-          <a:p>
-            <a:r>
-              <a:rPr lang="en-US" dirty="0"/>
-              <a:t>Lorem ipsum dolor sit amet, consectetur adipiscing elit. </a:t>
-            </a:r>
-          </a:p>
-          <a:p>
-            <a:endParaRPr lang="en-US" dirty="0"/>
-          </a:p>
-        </p:txBody>
-      </p:sp>
-      <p:sp>
-        <p:nvSpPr>
-          <p:cNvPr id="22" name="Text Placeholder 21">
-            <a:extLst>
-              <a:ext uri="{FF2B5EF4-FFF2-40B4-BE49-F238E27FC236}">
-                <a16:creationId xmlns:a16="http://schemas.microsoft.com/office/drawing/2014/main" id="{3604A973-1FC1-4BD3-A8B8-0C46262D77B6}"/>
-              </a:ext>
-            </a:extLst>
-          </p:cNvPr>
-          <p:cNvSpPr>
-            <a:spLocks noGrp="1"/>
-          </p:cNvSpPr>
-          <p:nvPr>
-            <p:ph type="body" sz="quarter" idx="24"/>
-          </p:nvPr>
-        </p:nvSpPr>
-        <p:spPr/>
-        <p:txBody>
-          <a:bodyPr/>
-          <a:lstStyle/>
-          <a:p>
-            <a:r>
-              <a:rPr lang="en-US" dirty="0"/>
-              <a:t>ADD NAME</a:t>
-            </a:r>
-          </a:p>
-        </p:txBody>
-      </p:sp>
-      <p:sp>
-        <p:nvSpPr>
-          <p:cNvPr id="23" name="Text Placeholder 22">
-            <a:extLst>
-              <a:ext uri="{FF2B5EF4-FFF2-40B4-BE49-F238E27FC236}">
-                <a16:creationId xmlns:a16="http://schemas.microsoft.com/office/drawing/2014/main" id="{F71130C1-E2E7-4700-A220-231BB58349DE}"/>
-              </a:ext>
-            </a:extLst>
-          </p:cNvPr>
-          <p:cNvSpPr>
-            <a:spLocks noGrp="1"/>
-          </p:cNvSpPr>
-          <p:nvPr>
-            <p:ph type="body" sz="quarter" idx="25"/>
-          </p:nvPr>
-        </p:nvSpPr>
-        <p:spPr/>
-        <p:txBody>
-          <a:bodyPr/>
-          <a:lstStyle/>
-          <a:p>
-            <a:r>
-              <a:rPr lang="en-US" dirty="0"/>
-              <a:t>Lorem ipsum dolor sit amet, consectetur adipiscing elit. </a:t>
-            </a:r>
-          </a:p>
-          <a:p>
-            <a:endParaRPr lang="en-US" dirty="0"/>
-          </a:p>
-        </p:txBody>
-      </p:sp>
-      <p:sp>
-        <p:nvSpPr>
-          <p:cNvPr id="24" name="Text Placeholder 23">
-            <a:extLst>
-              <a:ext uri="{FF2B5EF4-FFF2-40B4-BE49-F238E27FC236}">
-                <a16:creationId xmlns:a16="http://schemas.microsoft.com/office/drawing/2014/main" id="{DDC5EC52-0B52-4D0E-B00E-8E5EF35BC9CD}"/>
-              </a:ext>
-            </a:extLst>
-          </p:cNvPr>
-          <p:cNvSpPr>
-            <a:spLocks noGrp="1"/>
-          </p:cNvSpPr>
-          <p:nvPr>
-            <p:ph type="body" sz="quarter" idx="26"/>
-          </p:nvPr>
-        </p:nvSpPr>
-        <p:spPr/>
-        <p:txBody>
-          <a:bodyPr/>
-          <a:lstStyle/>
-          <a:p>
-            <a:r>
-              <a:rPr lang="en-US" dirty="0"/>
-              <a:t>ADD NAME</a:t>
+              <a:rPr lang="en-US" dirty="0">
+                <a:solidFill>
+                  <a:schemeClr val="bg1"/>
+                </a:solidFill>
+                <a:latin typeface="+mn-lt"/>
+              </a:rPr>
+              <a:t>AQI Analysis</a:t>
             </a:r>
           </a:p>
         </p:txBody>
@@ -21035,7 +22797,7 @@
     </p:spTree>
     <p:extLst>
       <p:ext uri="{BB962C8B-B14F-4D97-AF65-F5344CB8AC3E}">
-        <p14:creationId xmlns:p14="http://schemas.microsoft.com/office/powerpoint/2010/main" val="1684697404"/>
+        <p14:creationId xmlns:p14="http://schemas.microsoft.com/office/powerpoint/2010/main" val="1155590625"/>
       </p:ext>
     </p:extLst>
   </p:cSld>
@@ -21064,10 +22826,64 @@
       </p:grpSpPr>
       <p:sp>
         <p:nvSpPr>
-          <p:cNvPr id="8" name="Title 7">
-            <a:extLst>
-              <a:ext uri="{FF2B5EF4-FFF2-40B4-BE49-F238E27FC236}">
-                <a16:creationId xmlns:a16="http://schemas.microsoft.com/office/drawing/2014/main" id="{AB58A585-52FA-4A45-B2D0-660EC2D22B31}"/>
+          <p:cNvPr id="2" name="Picture Placeholder 1">
+            <a:extLst>
+              <a:ext uri="{FF2B5EF4-FFF2-40B4-BE49-F238E27FC236}">
+                <a16:creationId xmlns:a16="http://schemas.microsoft.com/office/drawing/2014/main" id="{F3B36882-9218-4CA3-9948-3210693A1432}"/>
+              </a:ext>
+            </a:extLst>
+          </p:cNvPr>
+          <p:cNvSpPr>
+            <a:spLocks noGrp="1"/>
+          </p:cNvSpPr>
+          <p:nvPr>
+            <p:ph type="pic" sz="quarter" idx="13"/>
+          </p:nvPr>
+        </p:nvSpPr>
+        <p:spPr/>
+      </p:sp>
+      <p:sp>
+        <p:nvSpPr>
+          <p:cNvPr id="3" name="Picture Placeholder 2">
+            <a:extLst>
+              <a:ext uri="{FF2B5EF4-FFF2-40B4-BE49-F238E27FC236}">
+                <a16:creationId xmlns:a16="http://schemas.microsoft.com/office/drawing/2014/main" id="{BC8A54E8-F773-4B3D-91E6-15BAEAC7EFFE}"/>
+              </a:ext>
+            </a:extLst>
+          </p:cNvPr>
+          <p:cNvSpPr>
+            <a:spLocks noGrp="1"/>
+          </p:cNvSpPr>
+          <p:nvPr>
+            <p:ph type="pic" sz="quarter" idx="15"/>
+          </p:nvPr>
+        </p:nvSpPr>
+        <p:spPr/>
+      </p:sp>
+      <p:sp>
+        <p:nvSpPr>
+          <p:cNvPr id="4" name="Picture Placeholder 3">
+            <a:extLst>
+              <a:ext uri="{FF2B5EF4-FFF2-40B4-BE49-F238E27FC236}">
+                <a16:creationId xmlns:a16="http://schemas.microsoft.com/office/drawing/2014/main" id="{4AC005F8-A463-49F2-8969-1E9BEBB293EF}"/>
+              </a:ext>
+            </a:extLst>
+          </p:cNvPr>
+          <p:cNvSpPr>
+            <a:spLocks noGrp="1"/>
+          </p:cNvSpPr>
+          <p:nvPr>
+            <p:ph type="pic" sz="quarter" idx="16"/>
+          </p:nvPr>
+        </p:nvSpPr>
+        <p:spPr/>
+      </p:sp>
+      <p:sp>
+        <p:nvSpPr>
+          <p:cNvPr id="5" name="Title 4">
+            <a:extLst>
+              <a:ext uri="{FF2B5EF4-FFF2-40B4-BE49-F238E27FC236}">
+                <a16:creationId xmlns:a16="http://schemas.microsoft.com/office/drawing/2014/main" id="{E870BB1D-96EA-4078-AEC4-04F59C72F156}"/>
               </a:ext>
             </a:extLst>
           </p:cNvPr>
@@ -21084,132 +22900,16 @@
           <a:lstStyle/>
           <a:p>
             <a:r>
-              <a:rPr lang="en-US" dirty="0">
-                <a:latin typeface="+mn-lt"/>
-              </a:rPr>
-              <a:t>Click to Add Chart </a:t>
-            </a:r>
-            <a:r>
-              <a:rPr lang="en-US" dirty="0">
-                <a:solidFill>
-                  <a:srgbClr val="5DAAB0"/>
-                </a:solidFill>
-                <a:latin typeface="+mn-lt"/>
-              </a:rPr>
-              <a:t>Slide Title Here </a:t>
-            </a:r>
-          </a:p>
-        </p:txBody>
-      </p:sp>
-      <p:sp>
-        <p:nvSpPr>
-          <p:cNvPr id="10" name="Text Placeholder 9">
-            <a:extLst>
-              <a:ext uri="{FF2B5EF4-FFF2-40B4-BE49-F238E27FC236}">
-                <a16:creationId xmlns:a16="http://schemas.microsoft.com/office/drawing/2014/main" id="{76C3E0A7-1C3E-0A40-AC21-1EAD4086CBB7}"/>
-              </a:ext>
-            </a:extLst>
-          </p:cNvPr>
-          <p:cNvSpPr>
-            <a:spLocks noGrp="1"/>
-          </p:cNvSpPr>
-          <p:nvPr>
-            <p:ph type="body" sz="quarter" idx="11"/>
-          </p:nvPr>
-        </p:nvSpPr>
-        <p:spPr/>
-        <p:txBody>
-          <a:bodyPr/>
-          <a:lstStyle/>
-          <a:p>
-            <a:pPr lvl="0"/>
-            <a:r>
               <a:rPr lang="en-US" dirty="0"/>
-              <a:t>Lorem ipsum dolor sit amet, consectetur adipiscing elit. Ut gravida eros erat. Proin a tellus sed risus lobortis sagittis eu quis est. Duis ut aliquam nisi. Suspendisse vehicula mi diam, sit amet lacinia massa sodales ac. </a:t>
-            </a:r>
-          </a:p>
-          <a:p>
-            <a:pPr lvl="0"/>
-            <a:r>
-              <a:rPr lang="en-US" dirty="0"/>
-              <a:t>Fusce condimentum egestas nunc a maximus. Quisque et orci purus. Proin dolor mi, ultrices sit amet ipsum placerat, congue mattis turpis. Donec vestibulum eros eget mauris dignissim, ut ultricies dolor viverra. Phasellus efficitur ante nec sem convallis, in ornare est accumsan. </a:t>
-            </a:r>
-          </a:p>
-          <a:p>
-            <a:pPr lvl="0"/>
-            <a:r>
-              <a:rPr lang="en-US" dirty="0"/>
-              <a:t>Lorem ipsum dolor sit amet, consectetur adipiscing elit. Ut gravida eros erat. Proin a tellus sed risus lobortis sagittis eu quis est. </a:t>
-            </a:r>
-          </a:p>
-          <a:p>
-            <a:endParaRPr lang="en-US" dirty="0"/>
-          </a:p>
-        </p:txBody>
-      </p:sp>
-      <p:sp>
-        <p:nvSpPr>
-          <p:cNvPr id="12" name="Text Placeholder 11">
-            <a:extLst>
-              <a:ext uri="{FF2B5EF4-FFF2-40B4-BE49-F238E27FC236}">
-                <a16:creationId xmlns:a16="http://schemas.microsoft.com/office/drawing/2014/main" id="{F82458FA-5D5F-6A41-B047-910858C1E142}"/>
-              </a:ext>
-            </a:extLst>
-          </p:cNvPr>
-          <p:cNvSpPr>
-            <a:spLocks noGrp="1"/>
-          </p:cNvSpPr>
-          <p:nvPr>
-            <p:ph type="body" sz="quarter" idx="12"/>
-          </p:nvPr>
-        </p:nvSpPr>
-        <p:spPr/>
-        <p:txBody>
-          <a:bodyPr/>
-          <a:lstStyle/>
-          <a:p>
-            <a:r>
-              <a:rPr lang="en-US" dirty="0"/>
-              <a:t>SUBTITLE HERE</a:t>
-            </a:r>
-          </a:p>
-        </p:txBody>
-      </p:sp>
-      <p:graphicFrame>
-        <p:nvGraphicFramePr>
-          <p:cNvPr id="16" name="Chart Placeholder 17" descr="Chart">
-            <a:extLst>
-              <a:ext uri="{FF2B5EF4-FFF2-40B4-BE49-F238E27FC236}">
-                <a16:creationId xmlns:a16="http://schemas.microsoft.com/office/drawing/2014/main" id="{8F6D4133-13DB-4D35-AA57-2E241762BC26}"/>
-              </a:ext>
-            </a:extLst>
-          </p:cNvPr>
-          <p:cNvGraphicFramePr>
-            <a:graphicFrameLocks noGrp="1"/>
-          </p:cNvGraphicFramePr>
-          <p:nvPr>
-            <p:ph type="chart" sz="quarter" idx="13"/>
-            <p:extLst>
-              <p:ext uri="{D42A27DB-BD31-4B8C-83A1-F6EECF244321}">
-                <p14:modId xmlns:p14="http://schemas.microsoft.com/office/powerpoint/2010/main" val="998066129"/>
-              </p:ext>
-            </p:extLst>
-          </p:nvPr>
-        </p:nvGraphicFramePr>
-        <p:xfrm>
-          <a:off x="838200" y="2247900"/>
-          <a:ext cx="5619750" cy="3870325"/>
-        </p:xfrm>
-        <a:graphic>
-          <a:graphicData uri="http://schemas.openxmlformats.org/drawingml/2006/chart">
-            <c:chart xmlns:c="http://schemas.openxmlformats.org/drawingml/2006/chart" xmlns:r="http://schemas.openxmlformats.org/officeDocument/2006/relationships" r:id="rId3"/>
-          </a:graphicData>
-        </a:graphic>
-      </p:graphicFrame>
+              <a:t>Backup Slides</a:t>
+            </a:r>
+          </a:p>
+        </p:txBody>
+      </p:sp>
     </p:spTree>
     <p:extLst>
       <p:ext uri="{BB962C8B-B14F-4D97-AF65-F5344CB8AC3E}">
-        <p14:creationId xmlns:p14="http://schemas.microsoft.com/office/powerpoint/2010/main" val="389446795"/>
+        <p14:creationId xmlns:p14="http://schemas.microsoft.com/office/powerpoint/2010/main" val="3909312436"/>
       </p:ext>
     </p:extLst>
   </p:cSld>

</xml_diff>

<commit_message>
updates Elodie 9/19/21 8:37am
</commit_message>
<xml_diff>
--- a/OpenWeather_AQI_Presentation_Draft.pptx
+++ b/OpenWeather_AQI_Presentation_Draft.pptx
@@ -5,10 +5,10 @@
     <p:sldMasterId id="2147483648" r:id="rId1"/>
   </p:sldMasterIdLst>
   <p:notesMasterIdLst>
-    <p:notesMasterId r:id="rId15"/>
+    <p:notesMasterId r:id="rId16"/>
   </p:notesMasterIdLst>
   <p:handoutMasterIdLst>
-    <p:handoutMasterId r:id="rId16"/>
+    <p:handoutMasterId r:id="rId17"/>
   </p:handoutMasterIdLst>
   <p:sldIdLst>
     <p:sldId id="2524" r:id="rId2"/>
@@ -17,13 +17,14 @@
     <p:sldId id="2544" r:id="rId5"/>
     <p:sldId id="2545" r:id="rId6"/>
     <p:sldId id="2583" r:id="rId7"/>
-    <p:sldId id="2582" r:id="rId8"/>
-    <p:sldId id="2589" r:id="rId9"/>
+    <p:sldId id="2589" r:id="rId8"/>
+    <p:sldId id="2590" r:id="rId9"/>
     <p:sldId id="2584" r:id="rId10"/>
-    <p:sldId id="2588" r:id="rId11"/>
-    <p:sldId id="2554" r:id="rId12"/>
-    <p:sldId id="2574" r:id="rId13"/>
-    <p:sldId id="2576" r:id="rId14"/>
+    <p:sldId id="2582" r:id="rId11"/>
+    <p:sldId id="2588" r:id="rId12"/>
+    <p:sldId id="2554" r:id="rId13"/>
+    <p:sldId id="2574" r:id="rId14"/>
+    <p:sldId id="2576" r:id="rId15"/>
   </p:sldIdLst>
   <p:sldSz cx="12192000" cy="6858000"/>
   <p:notesSz cx="6858000" cy="9144000"/>
@@ -153,7 +154,7 @@
 <file path=ppt/revisionInfo.xml><?xml version="1.0" encoding="utf-8"?>
 <p1510:revInfo xmlns:a="http://schemas.openxmlformats.org/drawingml/2006/main" xmlns:r="http://schemas.openxmlformats.org/officeDocument/2006/relationships" xmlns:p1510="http://schemas.microsoft.com/office/powerpoint/2015/10/main">
   <p1510:revLst>
-    <p1510:client id="{B99B3CDB-533B-4AF0-93E0-8041D68B3A02}" v="8" dt="2021-09-18T13:54:48.396"/>
+    <p1510:client id="{B99B3CDB-533B-4AF0-93E0-8041D68B3A02}" v="15" dt="2021-09-19T12:35:51.475"/>
   </p1510:revLst>
 </p1510:revInfo>
 </file>
@@ -162,19 +163,19 @@
 <pc:chgInfo xmlns:a="http://schemas.openxmlformats.org/drawingml/2006/main" xmlns:r="http://schemas.openxmlformats.org/officeDocument/2006/relationships" xmlns:ac="http://schemas.microsoft.com/office/drawing/2013/main/command" xmlns:pc="http://schemas.microsoft.com/office/powerpoint/2013/main/command">
   <pc:docChgLst>
     <pc:chgData name="elodiecslawinski@gmail.com" userId="2d9956b1ce3ed99c" providerId="LiveId" clId="{B99B3CDB-533B-4AF0-93E0-8041D68B3A02}"/>
-    <pc:docChg chg="custSel addSld delSld modSld sldOrd">
-      <pc:chgData name="elodiecslawinski@gmail.com" userId="2d9956b1ce3ed99c" providerId="LiveId" clId="{B99B3CDB-533B-4AF0-93E0-8041D68B3A02}" dt="2021-09-18T13:56:02.582" v="2057" actId="20577"/>
+    <pc:docChg chg="undo redo custSel addSld delSld modSld sldOrd">
+      <pc:chgData name="elodiecslawinski@gmail.com" userId="2d9956b1ce3ed99c" providerId="LiveId" clId="{B99B3CDB-533B-4AF0-93E0-8041D68B3A02}" dt="2021-09-19T12:36:33.391" v="2601" actId="1038"/>
       <pc:docMkLst>
         <pc:docMk/>
       </pc:docMkLst>
       <pc:sldChg chg="addSp modSp mod">
-        <pc:chgData name="elodiecslawinski@gmail.com" userId="2d9956b1ce3ed99c" providerId="LiveId" clId="{B99B3CDB-533B-4AF0-93E0-8041D68B3A02}" dt="2021-09-18T13:29:02.805" v="147" actId="20577"/>
+        <pc:chgData name="elodiecslawinski@gmail.com" userId="2d9956b1ce3ed99c" providerId="LiveId" clId="{B99B3CDB-533B-4AF0-93E0-8041D68B3A02}" dt="2021-09-19T12:22:05.391" v="2064" actId="20577"/>
         <pc:sldMkLst>
           <pc:docMk/>
           <pc:sldMk cId="2439656135" sldId="2524"/>
         </pc:sldMkLst>
         <pc:spChg chg="mod">
-          <ac:chgData name="elodiecslawinski@gmail.com" userId="2d9956b1ce3ed99c" providerId="LiveId" clId="{B99B3CDB-533B-4AF0-93E0-8041D68B3A02}" dt="2021-09-18T13:28:16.615" v="37" actId="20577"/>
+          <ac:chgData name="elodiecslawinski@gmail.com" userId="2d9956b1ce3ed99c" providerId="LiveId" clId="{B99B3CDB-533B-4AF0-93E0-8041D68B3A02}" dt="2021-09-19T12:22:05.391" v="2064" actId="20577"/>
           <ac:spMkLst>
             <pc:docMk/>
             <pc:sldMk cId="2439656135" sldId="2524"/>
@@ -207,7 +208,7 @@
         </pc:picChg>
       </pc:sldChg>
       <pc:sldChg chg="modSp mod">
-        <pc:chgData name="elodiecslawinski@gmail.com" userId="2d9956b1ce3ed99c" providerId="LiveId" clId="{B99B3CDB-533B-4AF0-93E0-8041D68B3A02}" dt="2021-09-18T13:32:08.923" v="332" actId="20577"/>
+        <pc:chgData name="elodiecslawinski@gmail.com" userId="2d9956b1ce3ed99c" providerId="LiveId" clId="{B99B3CDB-533B-4AF0-93E0-8041D68B3A02}" dt="2021-09-19T12:23:01.264" v="2082" actId="20577"/>
         <pc:sldMkLst>
           <pc:docMk/>
           <pc:sldMk cId="3073952723" sldId="2542"/>
@@ -229,7 +230,7 @@
           </ac:spMkLst>
         </pc:spChg>
         <pc:spChg chg="mod">
-          <ac:chgData name="elodiecslawinski@gmail.com" userId="2d9956b1ce3ed99c" providerId="LiveId" clId="{B99B3CDB-533B-4AF0-93E0-8041D68B3A02}" dt="2021-09-18T13:31:49.446" v="315" actId="20577"/>
+          <ac:chgData name="elodiecslawinski@gmail.com" userId="2d9956b1ce3ed99c" providerId="LiveId" clId="{B99B3CDB-533B-4AF0-93E0-8041D68B3A02}" dt="2021-09-19T12:22:58.064" v="2081" actId="20577"/>
           <ac:spMkLst>
             <pc:docMk/>
             <pc:sldMk cId="3073952723" sldId="2542"/>
@@ -245,7 +246,7 @@
           </ac:spMkLst>
         </pc:spChg>
         <pc:spChg chg="mod">
-          <ac:chgData name="elodiecslawinski@gmail.com" userId="2d9956b1ce3ed99c" providerId="LiveId" clId="{B99B3CDB-533B-4AF0-93E0-8041D68B3A02}" dt="2021-09-18T13:31:57.373" v="331" actId="20577"/>
+          <ac:chgData name="elodiecslawinski@gmail.com" userId="2d9956b1ce3ed99c" providerId="LiveId" clId="{B99B3CDB-533B-4AF0-93E0-8041D68B3A02}" dt="2021-09-19T12:23:01.264" v="2082" actId="20577"/>
           <ac:spMkLst>
             <pc:docMk/>
             <pc:sldMk cId="3073952723" sldId="2542"/>
@@ -372,13 +373,13 @@
         </pc:picChg>
       </pc:sldChg>
       <pc:sldChg chg="modSp mod ord">
-        <pc:chgData name="elodiecslawinski@gmail.com" userId="2d9956b1ce3ed99c" providerId="LiveId" clId="{B99B3CDB-533B-4AF0-93E0-8041D68B3A02}" dt="2021-09-18T13:55:59.102" v="2055" actId="20577"/>
+        <pc:chgData name="elodiecslawinski@gmail.com" userId="2d9956b1ce3ed99c" providerId="LiveId" clId="{B99B3CDB-533B-4AF0-93E0-8041D68B3A02}" dt="2021-09-19T12:23:19.768" v="2101" actId="20577"/>
         <pc:sldMkLst>
           <pc:docMk/>
           <pc:sldMk cId="954333892" sldId="2552"/>
         </pc:sldMkLst>
         <pc:spChg chg="mod">
-          <ac:chgData name="elodiecslawinski@gmail.com" userId="2d9956b1ce3ed99c" providerId="LiveId" clId="{B99B3CDB-533B-4AF0-93E0-8041D68B3A02}" dt="2021-09-18T13:55:42.989" v="2047" actId="20577"/>
+          <ac:chgData name="elodiecslawinski@gmail.com" userId="2d9956b1ce3ed99c" providerId="LiveId" clId="{B99B3CDB-533B-4AF0-93E0-8041D68B3A02}" dt="2021-09-19T12:23:19.768" v="2101" actId="20577"/>
           <ac:spMkLst>
             <pc:docMk/>
             <pc:sldMk cId="954333892" sldId="2552"/>
@@ -393,6 +394,13 @@
             <ac:spMk id="4" creationId="{FD47FBB8-2A87-4FDD-8742-D0C12871A3DD}"/>
           </ac:spMkLst>
         </pc:spChg>
+      </pc:sldChg>
+      <pc:sldChg chg="ord">
+        <pc:chgData name="elodiecslawinski@gmail.com" userId="2d9956b1ce3ed99c" providerId="LiveId" clId="{B99B3CDB-533B-4AF0-93E0-8041D68B3A02}" dt="2021-09-19T12:33:41.109" v="2574"/>
+        <pc:sldMkLst>
+          <pc:docMk/>
+          <pc:sldMk cId="202479834" sldId="2582"/>
+        </pc:sldMkLst>
       </pc:sldChg>
       <pc:sldChg chg="modSp add del mod">
         <pc:chgData name="elodiecslawinski@gmail.com" userId="2d9956b1ce3ed99c" providerId="LiveId" clId="{B99B3CDB-533B-4AF0-93E0-8041D68B3A02}" dt="2021-09-18T13:39:57.976" v="934" actId="47"/>
@@ -409,12 +417,28 @@
           </ac:spMkLst>
         </pc:spChg>
       </pc:sldChg>
-      <pc:sldChg chg="modSp add mod">
-        <pc:chgData name="elodiecslawinski@gmail.com" userId="2d9956b1ce3ed99c" providerId="LiveId" clId="{B99B3CDB-533B-4AF0-93E0-8041D68B3A02}" dt="2021-09-18T13:53:32.565" v="1922" actId="20577"/>
+      <pc:sldChg chg="addSp delSp modSp add mod">
+        <pc:chgData name="elodiecslawinski@gmail.com" userId="2d9956b1ce3ed99c" providerId="LiveId" clId="{B99B3CDB-533B-4AF0-93E0-8041D68B3A02}" dt="2021-09-19T12:36:33.391" v="2601" actId="1038"/>
         <pc:sldMkLst>
           <pc:docMk/>
           <pc:sldMk cId="2962108432" sldId="2583"/>
         </pc:sldMkLst>
+        <pc:spChg chg="add del mod">
+          <ac:chgData name="elodiecslawinski@gmail.com" userId="2d9956b1ce3ed99c" providerId="LiveId" clId="{B99B3CDB-533B-4AF0-93E0-8041D68B3A02}" dt="2021-09-19T12:35:36.326" v="2580" actId="931"/>
+          <ac:spMkLst>
+            <pc:docMk/>
+            <pc:sldMk cId="2962108432" sldId="2583"/>
+            <ac:spMk id="3" creationId="{E5D5B535-7375-4CB1-8233-5768ED03A693}"/>
+          </ac:spMkLst>
+        </pc:spChg>
+        <pc:spChg chg="add del mod">
+          <ac:chgData name="elodiecslawinski@gmail.com" userId="2d9956b1ce3ed99c" providerId="LiveId" clId="{B99B3CDB-533B-4AF0-93E0-8041D68B3A02}" dt="2021-09-19T12:35:43.191" v="2584" actId="478"/>
+          <ac:spMkLst>
+            <pc:docMk/>
+            <pc:sldMk cId="2962108432" sldId="2583"/>
+            <ac:spMk id="8" creationId="{F2B97FEF-13C6-4B4A-A744-7F551F055940}"/>
+          </ac:spMkLst>
+        </pc:spChg>
         <pc:spChg chg="mod">
           <ac:chgData name="elodiecslawinski@gmail.com" userId="2d9956b1ce3ed99c" providerId="LiveId" clId="{B99B3CDB-533B-4AF0-93E0-8041D68B3A02}" dt="2021-09-18T13:47:25.355" v="1550" actId="20577"/>
           <ac:spMkLst>
@@ -431,6 +455,30 @@
             <ac:spMk id="11" creationId="{B59FCEF3-B015-47B8-8D8F-7C0C90D275EB}"/>
           </ac:spMkLst>
         </pc:spChg>
+        <pc:picChg chg="del">
+          <ac:chgData name="elodiecslawinski@gmail.com" userId="2d9956b1ce3ed99c" providerId="LiveId" clId="{B99B3CDB-533B-4AF0-93E0-8041D68B3A02}" dt="2021-09-19T12:35:25.237" v="2579" actId="478"/>
+          <ac:picMkLst>
+            <pc:docMk/>
+            <pc:sldMk cId="2962108432" sldId="2583"/>
+            <ac:picMk id="5" creationId="{46D415C9-7299-415E-BB1A-8D05E98FAB58}"/>
+          </ac:picMkLst>
+        </pc:picChg>
+        <pc:picChg chg="add del mod">
+          <ac:chgData name="elodiecslawinski@gmail.com" userId="2d9956b1ce3ed99c" providerId="LiveId" clId="{B99B3CDB-533B-4AF0-93E0-8041D68B3A02}" dt="2021-09-19T12:35:40.409" v="2583" actId="478"/>
+          <ac:picMkLst>
+            <pc:docMk/>
+            <pc:sldMk cId="2962108432" sldId="2583"/>
+            <ac:picMk id="6" creationId="{A49B2248-98F9-42D6-A7E1-E90642D95905}"/>
+          </ac:picMkLst>
+        </pc:picChg>
+        <pc:picChg chg="add mod">
+          <ac:chgData name="elodiecslawinski@gmail.com" userId="2d9956b1ce3ed99c" providerId="LiveId" clId="{B99B3CDB-533B-4AF0-93E0-8041D68B3A02}" dt="2021-09-19T12:36:33.391" v="2601" actId="1038"/>
+          <ac:picMkLst>
+            <pc:docMk/>
+            <pc:sldMk cId="2962108432" sldId="2583"/>
+            <ac:picMk id="13" creationId="{770B7D5E-D6F4-4582-9374-9F37481901A8}"/>
+          </ac:picMkLst>
+        </pc:picChg>
       </pc:sldChg>
       <pc:sldChg chg="modSp new mod">
         <pc:chgData name="elodiecslawinski@gmail.com" userId="2d9956b1ce3ed99c" providerId="LiveId" clId="{B99B3CDB-533B-4AF0-93E0-8041D68B3A02}" dt="2021-09-18T13:53:45.591" v="1936" actId="20577"/>
@@ -492,13 +540,13 @@
         </pc:sldMkLst>
       </pc:sldChg>
       <pc:sldChg chg="modSp add mod ord">
-        <pc:chgData name="elodiecslawinski@gmail.com" userId="2d9956b1ce3ed99c" providerId="LiveId" clId="{B99B3CDB-533B-4AF0-93E0-8041D68B3A02}" dt="2021-09-18T13:56:02.582" v="2057" actId="20577"/>
+        <pc:chgData name="elodiecslawinski@gmail.com" userId="2d9956b1ce3ed99c" providerId="LiveId" clId="{B99B3CDB-533B-4AF0-93E0-8041D68B3A02}" dt="2021-09-19T12:23:34.040" v="2112" actId="20577"/>
         <pc:sldMkLst>
           <pc:docMk/>
           <pc:sldMk cId="1155590625" sldId="2589"/>
         </pc:sldMkLst>
         <pc:spChg chg="mod">
-          <ac:chgData name="elodiecslawinski@gmail.com" userId="2d9956b1ce3ed99c" providerId="LiveId" clId="{B99B3CDB-533B-4AF0-93E0-8041D68B3A02}" dt="2021-09-18T13:55:48.716" v="2051" actId="20577"/>
+          <ac:chgData name="elodiecslawinski@gmail.com" userId="2d9956b1ce3ed99c" providerId="LiveId" clId="{B99B3CDB-533B-4AF0-93E0-8041D68B3A02}" dt="2021-09-19T12:23:34.040" v="2112" actId="20577"/>
           <ac:spMkLst>
             <pc:docMk/>
             <pc:sldMk cId="1155590625" sldId="2589"/>
@@ -513,6 +561,91 @@
             <ac:spMk id="4" creationId="{FD47FBB8-2A87-4FDD-8742-D0C12871A3DD}"/>
           </ac:spMkLst>
         </pc:spChg>
+      </pc:sldChg>
+      <pc:sldChg chg="addSp delSp modSp add mod">
+        <pc:chgData name="elodiecslawinski@gmail.com" userId="2d9956b1ce3ed99c" providerId="LiveId" clId="{B99B3CDB-533B-4AF0-93E0-8041D68B3A02}" dt="2021-09-19T12:32:44.040" v="2563" actId="20577"/>
+        <pc:sldMkLst>
+          <pc:docMk/>
+          <pc:sldMk cId="2606572195" sldId="2590"/>
+        </pc:sldMkLst>
+        <pc:spChg chg="add del mod">
+          <ac:chgData name="elodiecslawinski@gmail.com" userId="2d9956b1ce3ed99c" providerId="LiveId" clId="{B99B3CDB-533B-4AF0-93E0-8041D68B3A02}" dt="2021-09-19T12:29:53.727" v="2300" actId="478"/>
+          <ac:spMkLst>
+            <pc:docMk/>
+            <pc:sldMk cId="2606572195" sldId="2590"/>
+            <ac:spMk id="4" creationId="{EE2852FB-8DAE-4EAE-A094-E3F261745B53}"/>
+          </ac:spMkLst>
+        </pc:spChg>
+        <pc:spChg chg="mod">
+          <ac:chgData name="elodiecslawinski@gmail.com" userId="2d9956b1ce3ed99c" providerId="LiveId" clId="{B99B3CDB-533B-4AF0-93E0-8041D68B3A02}" dt="2021-09-19T12:32:44.040" v="2563" actId="20577"/>
+          <ac:spMkLst>
+            <pc:docMk/>
+            <pc:sldMk cId="2606572195" sldId="2590"/>
+            <ac:spMk id="8" creationId="{AB58A585-52FA-4A45-B2D0-660EC2D22B31}"/>
+          </ac:spMkLst>
+        </pc:spChg>
+        <pc:spChg chg="mod">
+          <ac:chgData name="elodiecslawinski@gmail.com" userId="2d9956b1ce3ed99c" providerId="LiveId" clId="{B99B3CDB-533B-4AF0-93E0-8041D68B3A02}" dt="2021-09-19T12:32:05.249" v="2551" actId="20577"/>
+          <ac:spMkLst>
+            <pc:docMk/>
+            <pc:sldMk cId="2606572195" sldId="2590"/>
+            <ac:spMk id="10" creationId="{76C3E0A7-1C3E-0A40-AC21-1EAD4086CBB7}"/>
+          </ac:spMkLst>
+        </pc:spChg>
+        <pc:spChg chg="mod">
+          <ac:chgData name="elodiecslawinski@gmail.com" userId="2d9956b1ce3ed99c" providerId="LiveId" clId="{B99B3CDB-533B-4AF0-93E0-8041D68B3A02}" dt="2021-09-19T12:26:35.624" v="2149" actId="20577"/>
+          <ac:spMkLst>
+            <pc:docMk/>
+            <pc:sldMk cId="2606572195" sldId="2590"/>
+            <ac:spMk id="12" creationId="{F82458FA-5D5F-6A41-B047-910858C1E142}"/>
+          </ac:spMkLst>
+        </pc:spChg>
+        <pc:graphicFrameChg chg="add mod">
+          <ac:chgData name="elodiecslawinski@gmail.com" userId="2d9956b1ce3ed99c" providerId="LiveId" clId="{B99B3CDB-533B-4AF0-93E0-8041D68B3A02}" dt="2021-09-19T12:30:02.351" v="2302" actId="14100"/>
+          <ac:graphicFrameMkLst>
+            <pc:docMk/>
+            <pc:sldMk cId="2606572195" sldId="2590"/>
+            <ac:graphicFrameMk id="2" creationId="{7416791D-D9C9-4A2B-9D07-BE3B723D1B7E}"/>
+          </ac:graphicFrameMkLst>
+        </pc:graphicFrameChg>
+        <pc:graphicFrameChg chg="del">
+          <ac:chgData name="elodiecslawinski@gmail.com" userId="2d9956b1ce3ed99c" providerId="LiveId" clId="{B99B3CDB-533B-4AF0-93E0-8041D68B3A02}" dt="2021-09-19T12:28:14.531" v="2294" actId="478"/>
+          <ac:graphicFrameMkLst>
+            <pc:docMk/>
+            <pc:sldMk cId="2606572195" sldId="2590"/>
+            <ac:graphicFrameMk id="16" creationId="{8F6D4133-13DB-4D35-AA57-2E241762BC26}"/>
+          </ac:graphicFrameMkLst>
+        </pc:graphicFrameChg>
+      </pc:sldChg>
+      <pc:sldChg chg="modSp add del mod">
+        <pc:chgData name="elodiecslawinski@gmail.com" userId="2d9956b1ce3ed99c" providerId="LiveId" clId="{B99B3CDB-533B-4AF0-93E0-8041D68B3A02}" dt="2021-09-19T12:33:37.645" v="2572" actId="47"/>
+        <pc:sldMkLst>
+          <pc:docMk/>
+          <pc:sldMk cId="800853875" sldId="2591"/>
+        </pc:sldMkLst>
+        <pc:spChg chg="mod">
+          <ac:chgData name="elodiecslawinski@gmail.com" userId="2d9956b1ce3ed99c" providerId="LiveId" clId="{B99B3CDB-533B-4AF0-93E0-8041D68B3A02}" dt="2021-09-19T12:32:50.071" v="2568" actId="5793"/>
+          <ac:spMkLst>
+            <pc:docMk/>
+            <pc:sldMk cId="800853875" sldId="2591"/>
+            <ac:spMk id="8" creationId="{AB58A585-52FA-4A45-B2D0-660EC2D22B31}"/>
+          </ac:spMkLst>
+        </pc:spChg>
+        <pc:spChg chg="mod">
+          <ac:chgData name="elodiecslawinski@gmail.com" userId="2d9956b1ce3ed99c" providerId="LiveId" clId="{B99B3CDB-533B-4AF0-93E0-8041D68B3A02}" dt="2021-09-19T12:32:53.399" v="2571" actId="20577"/>
+          <ac:spMkLst>
+            <pc:docMk/>
+            <pc:sldMk cId="800853875" sldId="2591"/>
+            <ac:spMk id="10" creationId="{76C3E0A7-1C3E-0A40-AC21-1EAD4086CBB7}"/>
+          </ac:spMkLst>
+        </pc:spChg>
+      </pc:sldChg>
+      <pc:sldChg chg="add del setBg">
+        <pc:chgData name="elodiecslawinski@gmail.com" userId="2d9956b1ce3ed99c" providerId="LiveId" clId="{B99B3CDB-533B-4AF0-93E0-8041D68B3A02}" dt="2021-09-19T12:34:04.157" v="2578" actId="47"/>
+        <pc:sldMkLst>
+          <pc:docMk/>
+          <pc:sldMk cId="1438106619" sldId="2591"/>
+        </pc:sldMkLst>
       </pc:sldChg>
     </pc:docChg>
   </pc:docChgLst>
@@ -2094,7 +2227,7 @@
           <a:p>
             <a:fld id="{0248B25D-8766-427E-8C9E-4845048D8DFC}" type="datetimeFigureOut">
               <a:rPr lang="en-US" smtClean="0"/>
-              <a:t>9/18/2021</a:t>
+              <a:t>9/19/2021</a:t>
             </a:fld>
             <a:endParaRPr lang="en-US" dirty="0"/>
           </a:p>
@@ -2271,7 +2404,7 @@
           <a:p>
             <a:fld id="{426F439B-391B-4B41-826A-951FCF412C34}" type="datetimeFigureOut">
               <a:rPr lang="en-US" smtClean="0"/>
-              <a:t>9/18/2021</a:t>
+              <a:t>9/19/2021</a:t>
             </a:fld>
             <a:endParaRPr lang="en-US" dirty="0"/>
           </a:p>
@@ -2678,7 +2811,7 @@
     </p:spTree>
     <p:extLst>
       <p:ext uri="{BB962C8B-B14F-4D97-AF65-F5344CB8AC3E}">
-        <p14:creationId xmlns:p14="http://schemas.microsoft.com/office/powerpoint/2010/main" val="2663438760"/>
+        <p14:creationId xmlns:p14="http://schemas.microsoft.com/office/powerpoint/2010/main" val="2704731012"/>
       </p:ext>
     </p:extLst>
   </p:cSld>
@@ -2762,7 +2895,7 @@
     </p:spTree>
     <p:extLst>
       <p:ext uri="{BB962C8B-B14F-4D97-AF65-F5344CB8AC3E}">
-        <p14:creationId xmlns:p14="http://schemas.microsoft.com/office/powerpoint/2010/main" val="3243940069"/>
+        <p14:creationId xmlns:p14="http://schemas.microsoft.com/office/powerpoint/2010/main" val="2663438760"/>
       </p:ext>
     </p:extLst>
   </p:cSld>
@@ -2838,6 +2971,90 @@
             <a:fld id="{3CFA0038-7055-434C-B6C4-B8C69565C600}" type="slidenum">
               <a:rPr lang="en-US" smtClean="0"/>
               <a:t>13</a:t>
+            </a:fld>
+            <a:endParaRPr lang="en-US" dirty="0"/>
+          </a:p>
+        </p:txBody>
+      </p:sp>
+    </p:spTree>
+    <p:extLst>
+      <p:ext uri="{BB962C8B-B14F-4D97-AF65-F5344CB8AC3E}">
+        <p14:creationId xmlns:p14="http://schemas.microsoft.com/office/powerpoint/2010/main" val="3243940069"/>
+      </p:ext>
+    </p:extLst>
+  </p:cSld>
+  <p:clrMapOvr>
+    <a:masterClrMapping/>
+  </p:clrMapOvr>
+</p:notes>
+</file>
+
+<file path=ppt/notesSlides/notesSlide13.xml><?xml version="1.0" encoding="utf-8"?>
+<p:notes xmlns:a="http://schemas.openxmlformats.org/drawingml/2006/main" xmlns:r="http://schemas.openxmlformats.org/officeDocument/2006/relationships" xmlns:p="http://schemas.openxmlformats.org/presentationml/2006/main">
+  <p:cSld>
+    <p:spTree>
+      <p:nvGrpSpPr>
+        <p:cNvPr id="1" name=""/>
+        <p:cNvGrpSpPr/>
+        <p:nvPr/>
+      </p:nvGrpSpPr>
+      <p:grpSpPr>
+        <a:xfrm>
+          <a:off x="0" y="0"/>
+          <a:ext cx="0" cy="0"/>
+          <a:chOff x="0" y="0"/>
+          <a:chExt cx="0" cy="0"/>
+        </a:xfrm>
+      </p:grpSpPr>
+      <p:sp>
+        <p:nvSpPr>
+          <p:cNvPr id="2" name="Slide Image Placeholder 1"/>
+          <p:cNvSpPr>
+            <a:spLocks noGrp="1" noRot="1" noChangeAspect="1"/>
+          </p:cNvSpPr>
+          <p:nvPr>
+            <p:ph type="sldImg"/>
+          </p:nvPr>
+        </p:nvSpPr>
+        <p:spPr/>
+      </p:sp>
+      <p:sp>
+        <p:nvSpPr>
+          <p:cNvPr id="3" name="Notes Placeholder 2"/>
+          <p:cNvSpPr>
+            <a:spLocks noGrp="1"/>
+          </p:cNvSpPr>
+          <p:nvPr>
+            <p:ph type="body" idx="1"/>
+          </p:nvPr>
+        </p:nvSpPr>
+        <p:spPr/>
+        <p:txBody>
+          <a:bodyPr/>
+          <a:lstStyle/>
+          <a:p>
+            <a:endParaRPr lang="en-US" dirty="0"/>
+          </a:p>
+        </p:txBody>
+      </p:sp>
+      <p:sp>
+        <p:nvSpPr>
+          <p:cNvPr id="4" name="Slide Number Placeholder 3"/>
+          <p:cNvSpPr>
+            <a:spLocks noGrp="1"/>
+          </p:cNvSpPr>
+          <p:nvPr>
+            <p:ph type="sldNum" sz="quarter" idx="5"/>
+          </p:nvPr>
+        </p:nvSpPr>
+        <p:spPr/>
+        <p:txBody>
+          <a:bodyPr/>
+          <a:lstStyle/>
+          <a:p>
+            <a:fld id="{3CFA0038-7055-434C-B6C4-B8C69565C600}" type="slidenum">
+              <a:rPr lang="en-US" smtClean="0"/>
+              <a:t>14</a:t>
             </a:fld>
             <a:endParaRPr lang="en-US" dirty="0"/>
           </a:p>
@@ -3350,7 +3567,7 @@
     </p:spTree>
     <p:extLst>
       <p:ext uri="{BB962C8B-B14F-4D97-AF65-F5344CB8AC3E}">
-        <p14:creationId xmlns:p14="http://schemas.microsoft.com/office/powerpoint/2010/main" val="400531086"/>
+        <p14:creationId xmlns:p14="http://schemas.microsoft.com/office/powerpoint/2010/main" val="2379141903"/>
       </p:ext>
     </p:extLst>
   </p:cSld>
@@ -3434,7 +3651,7 @@
     </p:spTree>
     <p:extLst>
       <p:ext uri="{BB962C8B-B14F-4D97-AF65-F5344CB8AC3E}">
-        <p14:creationId xmlns:p14="http://schemas.microsoft.com/office/powerpoint/2010/main" val="2379141903"/>
+        <p14:creationId xmlns:p14="http://schemas.microsoft.com/office/powerpoint/2010/main" val="3074437219"/>
       </p:ext>
     </p:extLst>
   </p:cSld>
@@ -3518,7 +3735,7 @@
     </p:spTree>
     <p:extLst>
       <p:ext uri="{BB962C8B-B14F-4D97-AF65-F5344CB8AC3E}">
-        <p14:creationId xmlns:p14="http://schemas.microsoft.com/office/powerpoint/2010/main" val="2704731012"/>
+        <p14:creationId xmlns:p14="http://schemas.microsoft.com/office/powerpoint/2010/main" val="400531086"/>
       </p:ext>
     </p:extLst>
   </p:cSld>
@@ -19778,7 +19995,9 @@
         </p:nvSpPr>
         <p:spPr/>
         <p:txBody>
-          <a:bodyPr/>
+          <a:bodyPr>
+            <a:normAutofit fontScale="90000"/>
+          </a:bodyPr>
           <a:lstStyle/>
           <a:p>
             <a:r>
@@ -19788,7 +20007,7 @@
                 </a:solidFill>
                 <a:latin typeface="+mn-lt"/>
               </a:rPr>
-              <a:t>OpenWeather Air Quality Index Analysis</a:t>
+              <a:t>OpenWeather Air Quality Index (AQI) Analysis</a:t>
             </a:r>
           </a:p>
         </p:txBody>
@@ -20088,6 +20307,160 @@
 </file>
 
 <file path=ppt/slides/slide10.xml><?xml version="1.0" encoding="utf-8"?>
+<p:sld xmlns:a="http://schemas.openxmlformats.org/drawingml/2006/main" xmlns:r="http://schemas.openxmlformats.org/officeDocument/2006/relationships" xmlns:p="http://schemas.openxmlformats.org/presentationml/2006/main">
+  <p:cSld>
+    <p:spTree>
+      <p:nvGrpSpPr>
+        <p:cNvPr id="1" name=""/>
+        <p:cNvGrpSpPr/>
+        <p:nvPr/>
+      </p:nvGrpSpPr>
+      <p:grpSpPr>
+        <a:xfrm>
+          <a:off x="0" y="0"/>
+          <a:ext cx="0" cy="0"/>
+          <a:chOff x="0" y="0"/>
+          <a:chExt cx="0" cy="0"/>
+        </a:xfrm>
+      </p:grpSpPr>
+      <p:pic>
+        <p:nvPicPr>
+          <p:cNvPr id="10" name="Picture Placeholder 13" descr="Two people standing in front of a window&#10; ">
+            <a:extLst>
+              <a:ext uri="{FF2B5EF4-FFF2-40B4-BE49-F238E27FC236}">
+                <a16:creationId xmlns:a16="http://schemas.microsoft.com/office/drawing/2014/main" id="{CF497EBA-3F02-4AFE-A2E1-05410BF6A4C0}"/>
+              </a:ext>
+            </a:extLst>
+          </p:cNvPr>
+          <p:cNvPicPr>
+            <a:picLocks noGrp="1" noChangeAspect="1"/>
+          </p:cNvPicPr>
+          <p:nvPr>
+            <p:ph type="pic" sz="quarter" idx="13"/>
+          </p:nvPr>
+        </p:nvPicPr>
+        <p:blipFill rotWithShape="1">
+          <a:blip r:embed="rId3" cstate="screen">
+            <a:extLst>
+              <a:ext uri="{28A0092B-C50C-407E-A947-70E740481C1C}">
+                <a14:useLocalDpi xmlns:a14="http://schemas.microsoft.com/office/drawing/2010/main"/>
+              </a:ext>
+            </a:extLst>
+          </a:blip>
+          <a:srcRect l="26219" r="26219"/>
+          <a:stretch/>
+        </p:blipFill>
+        <p:spPr/>
+      </p:pic>
+      <p:pic>
+        <p:nvPicPr>
+          <p:cNvPr id="13" name="Picture Placeholder 12" descr="A person standing on a table&#10; ">
+            <a:extLst>
+              <a:ext uri="{FF2B5EF4-FFF2-40B4-BE49-F238E27FC236}">
+                <a16:creationId xmlns:a16="http://schemas.microsoft.com/office/drawing/2014/main" id="{A4B6015D-7E4F-478A-B264-E70A90F082D8}"/>
+              </a:ext>
+            </a:extLst>
+          </p:cNvPr>
+          <p:cNvPicPr>
+            <a:picLocks noGrp="1" noChangeAspect="1"/>
+          </p:cNvPicPr>
+          <p:nvPr>
+            <p:ph type="pic" sz="quarter" idx="15"/>
+          </p:nvPr>
+        </p:nvPicPr>
+        <p:blipFill>
+          <a:blip r:embed="rId4" cstate="screen">
+            <a:extLst>
+              <a:ext uri="{28A0092B-C50C-407E-A947-70E740481C1C}">
+                <a14:useLocalDpi xmlns:a14="http://schemas.microsoft.com/office/drawing/2010/main"/>
+              </a:ext>
+            </a:extLst>
+          </a:blip>
+          <a:srcRect l="14435" r="14435"/>
+          <a:stretch>
+            <a:fillRect/>
+          </a:stretch>
+        </p:blipFill>
+        <p:spPr/>
+      </p:pic>
+      <p:pic>
+        <p:nvPicPr>
+          <p:cNvPr id="11" name="Picture Placeholder 13" descr="3 ladies in discussion">
+            <a:extLst>
+              <a:ext uri="{FF2B5EF4-FFF2-40B4-BE49-F238E27FC236}">
+                <a16:creationId xmlns:a16="http://schemas.microsoft.com/office/drawing/2014/main" id="{FD7B103C-B5B8-46F9-B225-3C5D1DF400E3}"/>
+              </a:ext>
+              <a:ext uri="{C183D7F6-B498-43B3-948B-1728B52AA6E4}">
+                <adec:decorative xmlns:adec="http://schemas.microsoft.com/office/drawing/2017/decorative" val="0"/>
+              </a:ext>
+            </a:extLst>
+          </p:cNvPr>
+          <p:cNvPicPr>
+            <a:picLocks noGrp="1" noChangeAspect="1"/>
+          </p:cNvPicPr>
+          <p:nvPr>
+            <p:ph type="pic" sz="quarter" idx="16"/>
+          </p:nvPr>
+        </p:nvPicPr>
+        <p:blipFill>
+          <a:blip r:embed="rId5" cstate="screen">
+            <a:extLst>
+              <a:ext uri="{28A0092B-C50C-407E-A947-70E740481C1C}">
+                <a14:useLocalDpi xmlns:a14="http://schemas.microsoft.com/office/drawing/2010/main"/>
+              </a:ext>
+            </a:extLst>
+          </a:blip>
+          <a:srcRect t="5646" b="5646"/>
+          <a:stretch>
+            <a:fillRect/>
+          </a:stretch>
+        </p:blipFill>
+        <p:spPr/>
+      </p:pic>
+      <p:sp>
+        <p:nvSpPr>
+          <p:cNvPr id="6" name="Title 5">
+            <a:extLst>
+              <a:ext uri="{FF2B5EF4-FFF2-40B4-BE49-F238E27FC236}">
+                <a16:creationId xmlns:a16="http://schemas.microsoft.com/office/drawing/2014/main" id="{AD8CD555-AB49-4CAE-998F-97A85F59AD6D}"/>
+              </a:ext>
+            </a:extLst>
+          </p:cNvPr>
+          <p:cNvSpPr>
+            <a:spLocks noGrp="1"/>
+          </p:cNvSpPr>
+          <p:nvPr>
+            <p:ph type="title"/>
+          </p:nvPr>
+        </p:nvSpPr>
+        <p:spPr/>
+        <p:txBody>
+          <a:bodyPr/>
+          <a:lstStyle/>
+          <a:p>
+            <a:r>
+              <a:rPr lang="en-US" dirty="0">
+                <a:latin typeface="+mn-lt"/>
+              </a:rPr>
+              <a:t>Click to Add Slide Title Here</a:t>
+            </a:r>
+          </a:p>
+        </p:txBody>
+      </p:sp>
+    </p:spTree>
+    <p:extLst>
+      <p:ext uri="{BB962C8B-B14F-4D97-AF65-F5344CB8AC3E}">
+        <p14:creationId xmlns:p14="http://schemas.microsoft.com/office/powerpoint/2010/main" val="202479834"/>
+      </p:ext>
+    </p:extLst>
+  </p:cSld>
+  <p:clrMapOvr>
+    <a:masterClrMapping/>
+  </p:clrMapOvr>
+</p:sld>
+</file>
+
+<file path=ppt/slides/slide11.xml><?xml version="1.0" encoding="utf-8"?>
 <p:sld xmlns:a="http://schemas.openxmlformats.org/drawingml/2006/main" xmlns:r="http://schemas.openxmlformats.org/officeDocument/2006/relationships" xmlns:p="http://schemas.openxmlformats.org/presentationml/2006/main">
   <p:cSld>
     <p:bg>
@@ -20186,437 +20559,6 @@
     <p:extLst>
       <p:ext uri="{BB962C8B-B14F-4D97-AF65-F5344CB8AC3E}">
         <p14:creationId xmlns:p14="http://schemas.microsoft.com/office/powerpoint/2010/main" val="3341258257"/>
-      </p:ext>
-    </p:extLst>
-  </p:cSld>
-  <p:clrMapOvr>
-    <a:masterClrMapping/>
-  </p:clrMapOvr>
-</p:sld>
-</file>
-
-<file path=ppt/slides/slide11.xml><?xml version="1.0" encoding="utf-8"?>
-<p:sld xmlns:a="http://schemas.openxmlformats.org/drawingml/2006/main" xmlns:r="http://schemas.openxmlformats.org/officeDocument/2006/relationships" xmlns:p="http://schemas.openxmlformats.org/presentationml/2006/main">
-  <p:cSld>
-    <p:spTree>
-      <p:nvGrpSpPr>
-        <p:cNvPr id="1" name=""/>
-        <p:cNvGrpSpPr/>
-        <p:nvPr/>
-      </p:nvGrpSpPr>
-      <p:grpSpPr>
-        <a:xfrm>
-          <a:off x="0" y="0"/>
-          <a:ext cx="0" cy="0"/>
-          <a:chOff x="0" y="0"/>
-          <a:chExt cx="0" cy="0"/>
-        </a:xfrm>
-      </p:grpSpPr>
-      <p:sp>
-        <p:nvSpPr>
-          <p:cNvPr id="5" name="Title 4">
-            <a:extLst>
-              <a:ext uri="{FF2B5EF4-FFF2-40B4-BE49-F238E27FC236}">
-                <a16:creationId xmlns:a16="http://schemas.microsoft.com/office/drawing/2014/main" id="{96DBE169-BA91-4B17-9AF2-4BAD528BEE06}"/>
-              </a:ext>
-            </a:extLst>
-          </p:cNvPr>
-          <p:cNvSpPr>
-            <a:spLocks noGrp="1"/>
-          </p:cNvSpPr>
-          <p:nvPr>
-            <p:ph type="title"/>
-          </p:nvPr>
-        </p:nvSpPr>
-        <p:spPr/>
-        <p:txBody>
-          <a:bodyPr>
-            <a:normAutofit fontScale="90000"/>
-          </a:bodyPr>
-          <a:lstStyle/>
-          <a:p>
-            <a:r>
-              <a:rPr lang="en-US" dirty="0"/>
-              <a:t>Click to Add Icon </a:t>
-            </a:r>
-            <a:r>
-              <a:rPr lang="en-US" dirty="0">
-                <a:solidFill>
-                  <a:srgbClr val="5DAAB0"/>
-                </a:solidFill>
-              </a:rPr>
-              <a:t>Slide Title Here </a:t>
-            </a:r>
-          </a:p>
-        </p:txBody>
-      </p:sp>
-      <p:sp>
-        <p:nvSpPr>
-          <p:cNvPr id="8" name="Text Placeholder 7">
-            <a:extLst>
-              <a:ext uri="{FF2B5EF4-FFF2-40B4-BE49-F238E27FC236}">
-                <a16:creationId xmlns:a16="http://schemas.microsoft.com/office/drawing/2014/main" id="{D9C2EAA8-D3C6-403B-B439-F95C60D0B3B9}"/>
-              </a:ext>
-            </a:extLst>
-          </p:cNvPr>
-          <p:cNvSpPr>
-            <a:spLocks noGrp="1"/>
-          </p:cNvSpPr>
-          <p:nvPr>
-            <p:ph type="body" sz="quarter" idx="12"/>
-          </p:nvPr>
-        </p:nvSpPr>
-        <p:spPr/>
-        <p:txBody>
-          <a:bodyPr/>
-          <a:lstStyle/>
-          <a:p>
-            <a:r>
-              <a:rPr lang="en-US" dirty="0"/>
-              <a:t>SUBTITLE GOES HERE</a:t>
-            </a:r>
-          </a:p>
-        </p:txBody>
-      </p:sp>
-      <p:pic>
-        <p:nvPicPr>
-          <p:cNvPr id="46" name="Picture Placeholder 45">
-            <a:extLst>
-              <a:ext uri="{FF2B5EF4-FFF2-40B4-BE49-F238E27FC236}">
-                <a16:creationId xmlns:a16="http://schemas.microsoft.com/office/drawing/2014/main" id="{6263CE43-D410-4BF8-8529-41197F401002}"/>
-              </a:ext>
-              <a:ext uri="{C183D7F6-B498-43B3-948B-1728B52AA6E4}">
-                <adec:decorative xmlns:adec="http://schemas.microsoft.com/office/drawing/2017/decorative" val="1"/>
-              </a:ext>
-            </a:extLst>
-          </p:cNvPr>
-          <p:cNvPicPr>
-            <a:picLocks noGrp="1" noChangeAspect="1"/>
-          </p:cNvPicPr>
-          <p:nvPr>
-            <p:ph type="pic" sz="quarter" idx="13"/>
-          </p:nvPr>
-        </p:nvPicPr>
-        <p:blipFill rotWithShape="1">
-          <a:blip r:embed="rId3" cstate="screen">
-            <a:extLst>
-              <a:ext uri="{28A0092B-C50C-407E-A947-70E740481C1C}">
-                <a14:useLocalDpi xmlns:a14="http://schemas.microsoft.com/office/drawing/2010/main"/>
-              </a:ext>
-              <a:ext uri="{96DAC541-7B7A-43D3-8B79-37D633B846F1}">
-                <asvg:svgBlip xmlns:asvg="http://schemas.microsoft.com/office/drawing/2016/SVG/main" r:embed="rId4"/>
-              </a:ext>
-            </a:extLst>
-          </a:blip>
-          <a:srcRect l="-29560" t="-29716" r="-29560" b="-29716"/>
-          <a:stretch/>
-        </p:blipFill>
-        <p:spPr>
-          <a:xfrm>
-            <a:off x="6687422" y="1038724"/>
-            <a:ext cx="804759" cy="804759"/>
-          </a:xfrm>
-        </p:spPr>
-      </p:pic>
-      <p:pic>
-        <p:nvPicPr>
-          <p:cNvPr id="50" name="Picture Placeholder 49">
-            <a:extLst>
-              <a:ext uri="{FF2B5EF4-FFF2-40B4-BE49-F238E27FC236}">
-                <a16:creationId xmlns:a16="http://schemas.microsoft.com/office/drawing/2014/main" id="{44B7CF38-0B19-41D9-8D37-6D59A3F3E045}"/>
-              </a:ext>
-              <a:ext uri="{C183D7F6-B498-43B3-948B-1728B52AA6E4}">
-                <adec:decorative xmlns:adec="http://schemas.microsoft.com/office/drawing/2017/decorative" val="1"/>
-              </a:ext>
-            </a:extLst>
-          </p:cNvPr>
-          <p:cNvPicPr>
-            <a:picLocks noGrp="1" noChangeAspect="1"/>
-          </p:cNvPicPr>
-          <p:nvPr>
-            <p:ph type="pic" sz="quarter" idx="14"/>
-          </p:nvPr>
-        </p:nvPicPr>
-        <p:blipFill rotWithShape="1">
-          <a:blip r:embed="rId5" cstate="screen">
-            <a:extLst>
-              <a:ext uri="{28A0092B-C50C-407E-A947-70E740481C1C}">
-                <a14:useLocalDpi xmlns:a14="http://schemas.microsoft.com/office/drawing/2010/main"/>
-              </a:ext>
-              <a:ext uri="{96DAC541-7B7A-43D3-8B79-37D633B846F1}">
-                <asvg:svgBlip xmlns:asvg="http://schemas.microsoft.com/office/drawing/2016/SVG/main" r:embed="rId6"/>
-              </a:ext>
-            </a:extLst>
-          </a:blip>
-          <a:srcRect l="-22179" t="-22322" r="-22179" b="-22322"/>
-          <a:stretch/>
-        </p:blipFill>
-        <p:spPr>
-          <a:xfrm>
-            <a:off x="6687422" y="2330235"/>
-            <a:ext cx="804759" cy="804759"/>
-          </a:xfrm>
-        </p:spPr>
-      </p:pic>
-      <p:pic>
-        <p:nvPicPr>
-          <p:cNvPr id="52" name="Picture Placeholder 51">
-            <a:extLst>
-              <a:ext uri="{FF2B5EF4-FFF2-40B4-BE49-F238E27FC236}">
-                <a16:creationId xmlns:a16="http://schemas.microsoft.com/office/drawing/2014/main" id="{26AA0551-AA74-4E7E-80AF-5D856020D1F8}"/>
-              </a:ext>
-              <a:ext uri="{C183D7F6-B498-43B3-948B-1728B52AA6E4}">
-                <adec:decorative xmlns:adec="http://schemas.microsoft.com/office/drawing/2017/decorative" val="1"/>
-              </a:ext>
-            </a:extLst>
-          </p:cNvPr>
-          <p:cNvPicPr>
-            <a:picLocks noGrp="1" noChangeAspect="1"/>
-          </p:cNvPicPr>
-          <p:nvPr>
-            <p:ph type="pic" sz="quarter" idx="15"/>
-          </p:nvPr>
-        </p:nvPicPr>
-        <p:blipFill rotWithShape="1">
-          <a:blip r:embed="rId7" cstate="screen">
-            <a:extLst>
-              <a:ext uri="{28A0092B-C50C-407E-A947-70E740481C1C}">
-                <a14:useLocalDpi xmlns:a14="http://schemas.microsoft.com/office/drawing/2010/main"/>
-              </a:ext>
-              <a:ext uri="{96DAC541-7B7A-43D3-8B79-37D633B846F1}">
-                <asvg:svgBlip xmlns:asvg="http://schemas.microsoft.com/office/drawing/2016/SVG/main" r:embed="rId8"/>
-              </a:ext>
-            </a:extLst>
-          </a:blip>
-          <a:srcRect l="-27274" t="-27427" r="-27274" b="-27427"/>
-          <a:stretch/>
-        </p:blipFill>
-        <p:spPr>
-          <a:xfrm>
-            <a:off x="6687422" y="3621746"/>
-            <a:ext cx="804759" cy="804759"/>
-          </a:xfrm>
-        </p:spPr>
-      </p:pic>
-      <p:pic>
-        <p:nvPicPr>
-          <p:cNvPr id="54" name="Picture Placeholder 53">
-            <a:extLst>
-              <a:ext uri="{FF2B5EF4-FFF2-40B4-BE49-F238E27FC236}">
-                <a16:creationId xmlns:a16="http://schemas.microsoft.com/office/drawing/2014/main" id="{21139392-74B8-43B3-BFDF-58CAC133651E}"/>
-              </a:ext>
-              <a:ext uri="{C183D7F6-B498-43B3-948B-1728B52AA6E4}">
-                <adec:decorative xmlns:adec="http://schemas.microsoft.com/office/drawing/2017/decorative" val="1"/>
-              </a:ext>
-            </a:extLst>
-          </p:cNvPr>
-          <p:cNvPicPr>
-            <a:picLocks noGrp="1" noChangeAspect="1"/>
-          </p:cNvPicPr>
-          <p:nvPr>
-            <p:ph type="pic" sz="quarter" idx="16"/>
-          </p:nvPr>
-        </p:nvPicPr>
-        <p:blipFill rotWithShape="1">
-          <a:blip r:embed="rId9" cstate="screen">
-            <a:extLst>
-              <a:ext uri="{28A0092B-C50C-407E-A947-70E740481C1C}">
-                <a14:useLocalDpi xmlns:a14="http://schemas.microsoft.com/office/drawing/2010/main"/>
-              </a:ext>
-              <a:ext uri="{96DAC541-7B7A-43D3-8B79-37D633B846F1}">
-                <asvg:svgBlip xmlns:asvg="http://schemas.microsoft.com/office/drawing/2016/SVG/main" r:embed="rId10"/>
-              </a:ext>
-            </a:extLst>
-          </a:blip>
-          <a:srcRect l="-30855" t="-31015" r="-30855" b="-31015"/>
-          <a:stretch/>
-        </p:blipFill>
-        <p:spPr>
-          <a:xfrm>
-            <a:off x="6687422" y="4913257"/>
-            <a:ext cx="804759" cy="804759"/>
-          </a:xfrm>
-        </p:spPr>
-      </p:pic>
-      <p:sp>
-        <p:nvSpPr>
-          <p:cNvPr id="7" name="Text Placeholder 6">
-            <a:extLst>
-              <a:ext uri="{FF2B5EF4-FFF2-40B4-BE49-F238E27FC236}">
-                <a16:creationId xmlns:a16="http://schemas.microsoft.com/office/drawing/2014/main" id="{87FCC6D1-213C-4A86-A2D0-742E15438C09}"/>
-              </a:ext>
-            </a:extLst>
-          </p:cNvPr>
-          <p:cNvSpPr>
-            <a:spLocks noGrp="1"/>
-          </p:cNvSpPr>
-          <p:nvPr>
-            <p:ph type="body" sz="quarter" idx="17"/>
-          </p:nvPr>
-        </p:nvSpPr>
-        <p:spPr/>
-        <p:txBody>
-          <a:bodyPr>
-            <a:normAutofit/>
-          </a:bodyPr>
-          <a:lstStyle/>
-          <a:p>
-            <a:r>
-              <a:rPr lang="en-US" dirty="0"/>
-              <a:t>Lorem ipsum dolor sit amet, consectetur adipiscing elit. Phasellus auctor efficitur </a:t>
-            </a:r>
-            <a:br>
-              <a:rPr lang="en-US" dirty="0"/>
-            </a:br>
-            <a:r>
-              <a:rPr lang="en-US" dirty="0"/>
-              <a:t>duiet facilisis. </a:t>
-            </a:r>
-          </a:p>
-        </p:txBody>
-      </p:sp>
-      <p:sp>
-        <p:nvSpPr>
-          <p:cNvPr id="20" name="Text Placeholder 19">
-            <a:extLst>
-              <a:ext uri="{FF2B5EF4-FFF2-40B4-BE49-F238E27FC236}">
-                <a16:creationId xmlns:a16="http://schemas.microsoft.com/office/drawing/2014/main" id="{82414D74-66D2-4C65-A48E-39F723FB2B2F}"/>
-              </a:ext>
-            </a:extLst>
-          </p:cNvPr>
-          <p:cNvSpPr>
-            <a:spLocks noGrp="1"/>
-          </p:cNvSpPr>
-          <p:nvPr>
-            <p:ph type="body" sz="quarter" idx="18"/>
-          </p:nvPr>
-        </p:nvSpPr>
-        <p:spPr/>
-        <p:txBody>
-          <a:bodyPr/>
-          <a:lstStyle/>
-          <a:p>
-            <a:r>
-              <a:rPr lang="en-US" dirty="0"/>
-              <a:t>Lorem ipsum dolor sit amet, consectetur adipiscing elit. Phasellus auctor efficitur </a:t>
-            </a:r>
-            <a:br>
-              <a:rPr lang="en-US" dirty="0"/>
-            </a:br>
-            <a:r>
-              <a:rPr lang="en-US" dirty="0"/>
-              <a:t>duiet facilisis. </a:t>
-            </a:r>
-          </a:p>
-        </p:txBody>
-      </p:sp>
-      <p:sp>
-        <p:nvSpPr>
-          <p:cNvPr id="21" name="Text Placeholder 20">
-            <a:extLst>
-              <a:ext uri="{FF2B5EF4-FFF2-40B4-BE49-F238E27FC236}">
-                <a16:creationId xmlns:a16="http://schemas.microsoft.com/office/drawing/2014/main" id="{E4D7EF6E-37B1-4694-B769-3DDEC29D8381}"/>
-              </a:ext>
-            </a:extLst>
-          </p:cNvPr>
-          <p:cNvSpPr>
-            <a:spLocks noGrp="1"/>
-          </p:cNvSpPr>
-          <p:nvPr>
-            <p:ph type="body" sz="quarter" idx="19"/>
-          </p:nvPr>
-        </p:nvSpPr>
-        <p:spPr/>
-        <p:txBody>
-          <a:bodyPr/>
-          <a:lstStyle/>
-          <a:p>
-            <a:r>
-              <a:rPr lang="en-US" dirty="0"/>
-              <a:t>Lorem ipsum dolor sit amet, consectetur adipiscing elit. Phasellus auctor efficitur </a:t>
-            </a:r>
-            <a:br>
-              <a:rPr lang="en-US" dirty="0"/>
-            </a:br>
-            <a:r>
-              <a:rPr lang="en-US" dirty="0"/>
-              <a:t>duiet facilisis. </a:t>
-            </a:r>
-          </a:p>
-        </p:txBody>
-      </p:sp>
-      <p:sp>
-        <p:nvSpPr>
-          <p:cNvPr id="22" name="Text Placeholder 21">
-            <a:extLst>
-              <a:ext uri="{FF2B5EF4-FFF2-40B4-BE49-F238E27FC236}">
-                <a16:creationId xmlns:a16="http://schemas.microsoft.com/office/drawing/2014/main" id="{ABF89FBA-20AC-4FD7-833B-ADA0EEFFCADC}"/>
-              </a:ext>
-            </a:extLst>
-          </p:cNvPr>
-          <p:cNvSpPr>
-            <a:spLocks noGrp="1"/>
-          </p:cNvSpPr>
-          <p:nvPr>
-            <p:ph type="body" sz="quarter" idx="20"/>
-          </p:nvPr>
-        </p:nvSpPr>
-        <p:spPr/>
-        <p:txBody>
-          <a:bodyPr/>
-          <a:lstStyle/>
-          <a:p>
-            <a:r>
-              <a:rPr lang="en-US" dirty="0"/>
-              <a:t>Lorem ipsum dolor sit amet, consectetur adipiscing elit. Phasellus auctor efficitur </a:t>
-            </a:r>
-            <a:br>
-              <a:rPr lang="en-US" dirty="0"/>
-            </a:br>
-            <a:r>
-              <a:rPr lang="en-US" dirty="0"/>
-              <a:t>duiet facilisis. </a:t>
-            </a:r>
-          </a:p>
-        </p:txBody>
-      </p:sp>
-      <p:sp>
-        <p:nvSpPr>
-          <p:cNvPr id="66" name="Text Placeholder 65">
-            <a:extLst>
-              <a:ext uri="{FF2B5EF4-FFF2-40B4-BE49-F238E27FC236}">
-                <a16:creationId xmlns:a16="http://schemas.microsoft.com/office/drawing/2014/main" id="{1AEF3ED8-A75C-4318-877C-139C98C0007D}"/>
-              </a:ext>
-            </a:extLst>
-          </p:cNvPr>
-          <p:cNvSpPr>
-            <a:spLocks noGrp="1"/>
-          </p:cNvSpPr>
-          <p:nvPr>
-            <p:ph type="body" sz="quarter" idx="11"/>
-          </p:nvPr>
-        </p:nvSpPr>
-        <p:spPr/>
-        <p:txBody>
-          <a:bodyPr/>
-          <a:lstStyle/>
-          <a:p>
-            <a:pPr>
-              <a:lnSpc>
-                <a:spcPct val="100000"/>
-              </a:lnSpc>
-            </a:pPr>
-            <a:r>
-              <a:rPr lang="en-US" dirty="0"/>
-              <a:t>Lorem ipsum dolor sit amet, consectetur adipiscing elit. Phasellus auctor efficitur dui et facilisis. Pellentesque habitant morbi tristique senectus et netus et malesuada fames ac turpis egestas. Etiam molestie in quam ac viverra. Cras consequat gravida aliquam. Maecenas cursus eleifend risus, in vulputate velit imperdiet non. Aenean tincidunt euismod ultricies. Fusce tempor dui ipsum, nec ultricies ante eleifend vel curabitur.</a:t>
-            </a:r>
-          </a:p>
-        </p:txBody>
-      </p:sp>
-    </p:spTree>
-    <p:extLst>
-      <p:ext uri="{BB962C8B-B14F-4D97-AF65-F5344CB8AC3E}">
-        <p14:creationId xmlns:p14="http://schemas.microsoft.com/office/powerpoint/2010/main" val="226842063"/>
       </p:ext>
     </p:extLst>
   </p:cSld>
@@ -20645,6 +20587,437 @@
       </p:grpSpPr>
       <p:sp>
         <p:nvSpPr>
+          <p:cNvPr id="5" name="Title 4">
+            <a:extLst>
+              <a:ext uri="{FF2B5EF4-FFF2-40B4-BE49-F238E27FC236}">
+                <a16:creationId xmlns:a16="http://schemas.microsoft.com/office/drawing/2014/main" id="{96DBE169-BA91-4B17-9AF2-4BAD528BEE06}"/>
+              </a:ext>
+            </a:extLst>
+          </p:cNvPr>
+          <p:cNvSpPr>
+            <a:spLocks noGrp="1"/>
+          </p:cNvSpPr>
+          <p:nvPr>
+            <p:ph type="title"/>
+          </p:nvPr>
+        </p:nvSpPr>
+        <p:spPr/>
+        <p:txBody>
+          <a:bodyPr>
+            <a:normAutofit fontScale="90000"/>
+          </a:bodyPr>
+          <a:lstStyle/>
+          <a:p>
+            <a:r>
+              <a:rPr lang="en-US" dirty="0"/>
+              <a:t>Click to Add Icon </a:t>
+            </a:r>
+            <a:r>
+              <a:rPr lang="en-US" dirty="0">
+                <a:solidFill>
+                  <a:srgbClr val="5DAAB0"/>
+                </a:solidFill>
+              </a:rPr>
+              <a:t>Slide Title Here </a:t>
+            </a:r>
+          </a:p>
+        </p:txBody>
+      </p:sp>
+      <p:sp>
+        <p:nvSpPr>
+          <p:cNvPr id="8" name="Text Placeholder 7">
+            <a:extLst>
+              <a:ext uri="{FF2B5EF4-FFF2-40B4-BE49-F238E27FC236}">
+                <a16:creationId xmlns:a16="http://schemas.microsoft.com/office/drawing/2014/main" id="{D9C2EAA8-D3C6-403B-B439-F95C60D0B3B9}"/>
+              </a:ext>
+            </a:extLst>
+          </p:cNvPr>
+          <p:cNvSpPr>
+            <a:spLocks noGrp="1"/>
+          </p:cNvSpPr>
+          <p:nvPr>
+            <p:ph type="body" sz="quarter" idx="12"/>
+          </p:nvPr>
+        </p:nvSpPr>
+        <p:spPr/>
+        <p:txBody>
+          <a:bodyPr/>
+          <a:lstStyle/>
+          <a:p>
+            <a:r>
+              <a:rPr lang="en-US" dirty="0"/>
+              <a:t>SUBTITLE GOES HERE</a:t>
+            </a:r>
+          </a:p>
+        </p:txBody>
+      </p:sp>
+      <p:pic>
+        <p:nvPicPr>
+          <p:cNvPr id="46" name="Picture Placeholder 45">
+            <a:extLst>
+              <a:ext uri="{FF2B5EF4-FFF2-40B4-BE49-F238E27FC236}">
+                <a16:creationId xmlns:a16="http://schemas.microsoft.com/office/drawing/2014/main" id="{6263CE43-D410-4BF8-8529-41197F401002}"/>
+              </a:ext>
+              <a:ext uri="{C183D7F6-B498-43B3-948B-1728B52AA6E4}">
+                <adec:decorative xmlns:adec="http://schemas.microsoft.com/office/drawing/2017/decorative" val="1"/>
+              </a:ext>
+            </a:extLst>
+          </p:cNvPr>
+          <p:cNvPicPr>
+            <a:picLocks noGrp="1" noChangeAspect="1"/>
+          </p:cNvPicPr>
+          <p:nvPr>
+            <p:ph type="pic" sz="quarter" idx="13"/>
+          </p:nvPr>
+        </p:nvPicPr>
+        <p:blipFill rotWithShape="1">
+          <a:blip r:embed="rId3" cstate="screen">
+            <a:extLst>
+              <a:ext uri="{28A0092B-C50C-407E-A947-70E740481C1C}">
+                <a14:useLocalDpi xmlns:a14="http://schemas.microsoft.com/office/drawing/2010/main"/>
+              </a:ext>
+              <a:ext uri="{96DAC541-7B7A-43D3-8B79-37D633B846F1}">
+                <asvg:svgBlip xmlns:asvg="http://schemas.microsoft.com/office/drawing/2016/SVG/main" r:embed="rId4"/>
+              </a:ext>
+            </a:extLst>
+          </a:blip>
+          <a:srcRect l="-29560" t="-29716" r="-29560" b="-29716"/>
+          <a:stretch/>
+        </p:blipFill>
+        <p:spPr>
+          <a:xfrm>
+            <a:off x="6687422" y="1038724"/>
+            <a:ext cx="804759" cy="804759"/>
+          </a:xfrm>
+        </p:spPr>
+      </p:pic>
+      <p:pic>
+        <p:nvPicPr>
+          <p:cNvPr id="50" name="Picture Placeholder 49">
+            <a:extLst>
+              <a:ext uri="{FF2B5EF4-FFF2-40B4-BE49-F238E27FC236}">
+                <a16:creationId xmlns:a16="http://schemas.microsoft.com/office/drawing/2014/main" id="{44B7CF38-0B19-41D9-8D37-6D59A3F3E045}"/>
+              </a:ext>
+              <a:ext uri="{C183D7F6-B498-43B3-948B-1728B52AA6E4}">
+                <adec:decorative xmlns:adec="http://schemas.microsoft.com/office/drawing/2017/decorative" val="1"/>
+              </a:ext>
+            </a:extLst>
+          </p:cNvPr>
+          <p:cNvPicPr>
+            <a:picLocks noGrp="1" noChangeAspect="1"/>
+          </p:cNvPicPr>
+          <p:nvPr>
+            <p:ph type="pic" sz="quarter" idx="14"/>
+          </p:nvPr>
+        </p:nvPicPr>
+        <p:blipFill rotWithShape="1">
+          <a:blip r:embed="rId5" cstate="screen">
+            <a:extLst>
+              <a:ext uri="{28A0092B-C50C-407E-A947-70E740481C1C}">
+                <a14:useLocalDpi xmlns:a14="http://schemas.microsoft.com/office/drawing/2010/main"/>
+              </a:ext>
+              <a:ext uri="{96DAC541-7B7A-43D3-8B79-37D633B846F1}">
+                <asvg:svgBlip xmlns:asvg="http://schemas.microsoft.com/office/drawing/2016/SVG/main" r:embed="rId6"/>
+              </a:ext>
+            </a:extLst>
+          </a:blip>
+          <a:srcRect l="-22179" t="-22322" r="-22179" b="-22322"/>
+          <a:stretch/>
+        </p:blipFill>
+        <p:spPr>
+          <a:xfrm>
+            <a:off x="6687422" y="2330235"/>
+            <a:ext cx="804759" cy="804759"/>
+          </a:xfrm>
+        </p:spPr>
+      </p:pic>
+      <p:pic>
+        <p:nvPicPr>
+          <p:cNvPr id="52" name="Picture Placeholder 51">
+            <a:extLst>
+              <a:ext uri="{FF2B5EF4-FFF2-40B4-BE49-F238E27FC236}">
+                <a16:creationId xmlns:a16="http://schemas.microsoft.com/office/drawing/2014/main" id="{26AA0551-AA74-4E7E-80AF-5D856020D1F8}"/>
+              </a:ext>
+              <a:ext uri="{C183D7F6-B498-43B3-948B-1728B52AA6E4}">
+                <adec:decorative xmlns:adec="http://schemas.microsoft.com/office/drawing/2017/decorative" val="1"/>
+              </a:ext>
+            </a:extLst>
+          </p:cNvPr>
+          <p:cNvPicPr>
+            <a:picLocks noGrp="1" noChangeAspect="1"/>
+          </p:cNvPicPr>
+          <p:nvPr>
+            <p:ph type="pic" sz="quarter" idx="15"/>
+          </p:nvPr>
+        </p:nvPicPr>
+        <p:blipFill rotWithShape="1">
+          <a:blip r:embed="rId7" cstate="screen">
+            <a:extLst>
+              <a:ext uri="{28A0092B-C50C-407E-A947-70E740481C1C}">
+                <a14:useLocalDpi xmlns:a14="http://schemas.microsoft.com/office/drawing/2010/main"/>
+              </a:ext>
+              <a:ext uri="{96DAC541-7B7A-43D3-8B79-37D633B846F1}">
+                <asvg:svgBlip xmlns:asvg="http://schemas.microsoft.com/office/drawing/2016/SVG/main" r:embed="rId8"/>
+              </a:ext>
+            </a:extLst>
+          </a:blip>
+          <a:srcRect l="-27274" t="-27427" r="-27274" b="-27427"/>
+          <a:stretch/>
+        </p:blipFill>
+        <p:spPr>
+          <a:xfrm>
+            <a:off x="6687422" y="3621746"/>
+            <a:ext cx="804759" cy="804759"/>
+          </a:xfrm>
+        </p:spPr>
+      </p:pic>
+      <p:pic>
+        <p:nvPicPr>
+          <p:cNvPr id="54" name="Picture Placeholder 53">
+            <a:extLst>
+              <a:ext uri="{FF2B5EF4-FFF2-40B4-BE49-F238E27FC236}">
+                <a16:creationId xmlns:a16="http://schemas.microsoft.com/office/drawing/2014/main" id="{21139392-74B8-43B3-BFDF-58CAC133651E}"/>
+              </a:ext>
+              <a:ext uri="{C183D7F6-B498-43B3-948B-1728B52AA6E4}">
+                <adec:decorative xmlns:adec="http://schemas.microsoft.com/office/drawing/2017/decorative" val="1"/>
+              </a:ext>
+            </a:extLst>
+          </p:cNvPr>
+          <p:cNvPicPr>
+            <a:picLocks noGrp="1" noChangeAspect="1"/>
+          </p:cNvPicPr>
+          <p:nvPr>
+            <p:ph type="pic" sz="quarter" idx="16"/>
+          </p:nvPr>
+        </p:nvPicPr>
+        <p:blipFill rotWithShape="1">
+          <a:blip r:embed="rId9" cstate="screen">
+            <a:extLst>
+              <a:ext uri="{28A0092B-C50C-407E-A947-70E740481C1C}">
+                <a14:useLocalDpi xmlns:a14="http://schemas.microsoft.com/office/drawing/2010/main"/>
+              </a:ext>
+              <a:ext uri="{96DAC541-7B7A-43D3-8B79-37D633B846F1}">
+                <asvg:svgBlip xmlns:asvg="http://schemas.microsoft.com/office/drawing/2016/SVG/main" r:embed="rId10"/>
+              </a:ext>
+            </a:extLst>
+          </a:blip>
+          <a:srcRect l="-30855" t="-31015" r="-30855" b="-31015"/>
+          <a:stretch/>
+        </p:blipFill>
+        <p:spPr>
+          <a:xfrm>
+            <a:off x="6687422" y="4913257"/>
+            <a:ext cx="804759" cy="804759"/>
+          </a:xfrm>
+        </p:spPr>
+      </p:pic>
+      <p:sp>
+        <p:nvSpPr>
+          <p:cNvPr id="7" name="Text Placeholder 6">
+            <a:extLst>
+              <a:ext uri="{FF2B5EF4-FFF2-40B4-BE49-F238E27FC236}">
+                <a16:creationId xmlns:a16="http://schemas.microsoft.com/office/drawing/2014/main" id="{87FCC6D1-213C-4A86-A2D0-742E15438C09}"/>
+              </a:ext>
+            </a:extLst>
+          </p:cNvPr>
+          <p:cNvSpPr>
+            <a:spLocks noGrp="1"/>
+          </p:cNvSpPr>
+          <p:nvPr>
+            <p:ph type="body" sz="quarter" idx="17"/>
+          </p:nvPr>
+        </p:nvSpPr>
+        <p:spPr/>
+        <p:txBody>
+          <a:bodyPr>
+            <a:normAutofit/>
+          </a:bodyPr>
+          <a:lstStyle/>
+          <a:p>
+            <a:r>
+              <a:rPr lang="en-US" dirty="0"/>
+              <a:t>Lorem ipsum dolor sit amet, consectetur adipiscing elit. Phasellus auctor efficitur </a:t>
+            </a:r>
+            <a:br>
+              <a:rPr lang="en-US" dirty="0"/>
+            </a:br>
+            <a:r>
+              <a:rPr lang="en-US" dirty="0"/>
+              <a:t>duiet facilisis. </a:t>
+            </a:r>
+          </a:p>
+        </p:txBody>
+      </p:sp>
+      <p:sp>
+        <p:nvSpPr>
+          <p:cNvPr id="20" name="Text Placeholder 19">
+            <a:extLst>
+              <a:ext uri="{FF2B5EF4-FFF2-40B4-BE49-F238E27FC236}">
+                <a16:creationId xmlns:a16="http://schemas.microsoft.com/office/drawing/2014/main" id="{82414D74-66D2-4C65-A48E-39F723FB2B2F}"/>
+              </a:ext>
+            </a:extLst>
+          </p:cNvPr>
+          <p:cNvSpPr>
+            <a:spLocks noGrp="1"/>
+          </p:cNvSpPr>
+          <p:nvPr>
+            <p:ph type="body" sz="quarter" idx="18"/>
+          </p:nvPr>
+        </p:nvSpPr>
+        <p:spPr/>
+        <p:txBody>
+          <a:bodyPr/>
+          <a:lstStyle/>
+          <a:p>
+            <a:r>
+              <a:rPr lang="en-US" dirty="0"/>
+              <a:t>Lorem ipsum dolor sit amet, consectetur adipiscing elit. Phasellus auctor efficitur </a:t>
+            </a:r>
+            <a:br>
+              <a:rPr lang="en-US" dirty="0"/>
+            </a:br>
+            <a:r>
+              <a:rPr lang="en-US" dirty="0"/>
+              <a:t>duiet facilisis. </a:t>
+            </a:r>
+          </a:p>
+        </p:txBody>
+      </p:sp>
+      <p:sp>
+        <p:nvSpPr>
+          <p:cNvPr id="21" name="Text Placeholder 20">
+            <a:extLst>
+              <a:ext uri="{FF2B5EF4-FFF2-40B4-BE49-F238E27FC236}">
+                <a16:creationId xmlns:a16="http://schemas.microsoft.com/office/drawing/2014/main" id="{E4D7EF6E-37B1-4694-B769-3DDEC29D8381}"/>
+              </a:ext>
+            </a:extLst>
+          </p:cNvPr>
+          <p:cNvSpPr>
+            <a:spLocks noGrp="1"/>
+          </p:cNvSpPr>
+          <p:nvPr>
+            <p:ph type="body" sz="quarter" idx="19"/>
+          </p:nvPr>
+        </p:nvSpPr>
+        <p:spPr/>
+        <p:txBody>
+          <a:bodyPr/>
+          <a:lstStyle/>
+          <a:p>
+            <a:r>
+              <a:rPr lang="en-US" dirty="0"/>
+              <a:t>Lorem ipsum dolor sit amet, consectetur adipiscing elit. Phasellus auctor efficitur </a:t>
+            </a:r>
+            <a:br>
+              <a:rPr lang="en-US" dirty="0"/>
+            </a:br>
+            <a:r>
+              <a:rPr lang="en-US" dirty="0"/>
+              <a:t>duiet facilisis. </a:t>
+            </a:r>
+          </a:p>
+        </p:txBody>
+      </p:sp>
+      <p:sp>
+        <p:nvSpPr>
+          <p:cNvPr id="22" name="Text Placeholder 21">
+            <a:extLst>
+              <a:ext uri="{FF2B5EF4-FFF2-40B4-BE49-F238E27FC236}">
+                <a16:creationId xmlns:a16="http://schemas.microsoft.com/office/drawing/2014/main" id="{ABF89FBA-20AC-4FD7-833B-ADA0EEFFCADC}"/>
+              </a:ext>
+            </a:extLst>
+          </p:cNvPr>
+          <p:cNvSpPr>
+            <a:spLocks noGrp="1"/>
+          </p:cNvSpPr>
+          <p:nvPr>
+            <p:ph type="body" sz="quarter" idx="20"/>
+          </p:nvPr>
+        </p:nvSpPr>
+        <p:spPr/>
+        <p:txBody>
+          <a:bodyPr/>
+          <a:lstStyle/>
+          <a:p>
+            <a:r>
+              <a:rPr lang="en-US" dirty="0"/>
+              <a:t>Lorem ipsum dolor sit amet, consectetur adipiscing elit. Phasellus auctor efficitur </a:t>
+            </a:r>
+            <a:br>
+              <a:rPr lang="en-US" dirty="0"/>
+            </a:br>
+            <a:r>
+              <a:rPr lang="en-US" dirty="0"/>
+              <a:t>duiet facilisis. </a:t>
+            </a:r>
+          </a:p>
+        </p:txBody>
+      </p:sp>
+      <p:sp>
+        <p:nvSpPr>
+          <p:cNvPr id="66" name="Text Placeholder 65">
+            <a:extLst>
+              <a:ext uri="{FF2B5EF4-FFF2-40B4-BE49-F238E27FC236}">
+                <a16:creationId xmlns:a16="http://schemas.microsoft.com/office/drawing/2014/main" id="{1AEF3ED8-A75C-4318-877C-139C98C0007D}"/>
+              </a:ext>
+            </a:extLst>
+          </p:cNvPr>
+          <p:cNvSpPr>
+            <a:spLocks noGrp="1"/>
+          </p:cNvSpPr>
+          <p:nvPr>
+            <p:ph type="body" sz="quarter" idx="11"/>
+          </p:nvPr>
+        </p:nvSpPr>
+        <p:spPr/>
+        <p:txBody>
+          <a:bodyPr/>
+          <a:lstStyle/>
+          <a:p>
+            <a:pPr>
+              <a:lnSpc>
+                <a:spcPct val="100000"/>
+              </a:lnSpc>
+            </a:pPr>
+            <a:r>
+              <a:rPr lang="en-US" dirty="0"/>
+              <a:t>Lorem ipsum dolor sit amet, consectetur adipiscing elit. Phasellus auctor efficitur dui et facilisis. Pellentesque habitant morbi tristique senectus et netus et malesuada fames ac turpis egestas. Etiam molestie in quam ac viverra. Cras consequat gravida aliquam. Maecenas cursus eleifend risus, in vulputate velit imperdiet non. Aenean tincidunt euismod ultricies. Fusce tempor dui ipsum, nec ultricies ante eleifend vel curabitur.</a:t>
+            </a:r>
+          </a:p>
+        </p:txBody>
+      </p:sp>
+    </p:spTree>
+    <p:extLst>
+      <p:ext uri="{BB962C8B-B14F-4D97-AF65-F5344CB8AC3E}">
+        <p14:creationId xmlns:p14="http://schemas.microsoft.com/office/powerpoint/2010/main" val="226842063"/>
+      </p:ext>
+    </p:extLst>
+  </p:cSld>
+  <p:clrMapOvr>
+    <a:masterClrMapping/>
+  </p:clrMapOvr>
+</p:sld>
+</file>
+
+<file path=ppt/slides/slide13.xml><?xml version="1.0" encoding="utf-8"?>
+<p:sld xmlns:a="http://schemas.openxmlformats.org/drawingml/2006/main" xmlns:r="http://schemas.openxmlformats.org/officeDocument/2006/relationships" xmlns:p="http://schemas.openxmlformats.org/presentationml/2006/main">
+  <p:cSld>
+    <p:spTree>
+      <p:nvGrpSpPr>
+        <p:cNvPr id="1" name=""/>
+        <p:cNvGrpSpPr/>
+        <p:nvPr/>
+      </p:nvGrpSpPr>
+      <p:grpSpPr>
+        <a:xfrm>
+          <a:off x="0" y="0"/>
+          <a:ext cx="0" cy="0"/>
+          <a:chOff x="0" y="0"/>
+          <a:chExt cx="0" cy="0"/>
+        </a:xfrm>
+      </p:grpSpPr>
+      <p:sp>
+        <p:nvSpPr>
           <p:cNvPr id="12" name="Title 11">
             <a:extLst>
               <a:ext uri="{FF2B5EF4-FFF2-40B4-BE49-F238E27FC236}">
@@ -21047,7 +21420,7 @@
 </p:sld>
 </file>
 
-<file path=ppt/slides/slide13.xml><?xml version="1.0" encoding="utf-8"?>
+<file path=ppt/slides/slide14.xml><?xml version="1.0" encoding="utf-8"?>
 <p:sld xmlns:a="http://schemas.openxmlformats.org/drawingml/2006/main" xmlns:r="http://schemas.openxmlformats.org/officeDocument/2006/relationships" xmlns:p="http://schemas.openxmlformats.org/presentationml/2006/main">
   <p:cSld>
     <p:spTree>
@@ -21358,7 +21731,7 @@
           <a:p>
             <a:r>
               <a:rPr lang="en-US" sz="1600" b="1" dirty="0"/>
-              <a:t>4. Data Exploration</a:t>
+              <a:t>4. Analysis Phases</a:t>
             </a:r>
           </a:p>
         </p:txBody>
@@ -21416,10 +21789,7 @@
           </a:bodyPr>
           <a:lstStyle/>
           <a:p>
-            <a:r>
-              <a:rPr lang="en-US" sz="1600" b="1" dirty="0"/>
-              <a:t>5. Data Analysis</a:t>
-            </a:r>
+            <a:endParaRPr lang="en-US" sz="1600" b="1" dirty="0"/>
           </a:p>
         </p:txBody>
       </p:sp>
@@ -21557,7 +21927,7 @@
                 </a:solidFill>
                 <a:latin typeface="+mn-lt"/>
               </a:rPr>
-              <a:t>Hypothesis</a:t>
+              <a:t>Analysis Overview</a:t>
             </a:r>
           </a:p>
         </p:txBody>
@@ -22262,34 +22632,6 @@
           <a:chExt cx="0" cy="0"/>
         </a:xfrm>
       </p:grpSpPr>
-      <p:pic>
-        <p:nvPicPr>
-          <p:cNvPr id="5" name="Picture Placeholder 4" descr="A picture containing diagram&#10;&#10;Description automatically generated">
-            <a:extLst>
-              <a:ext uri="{FF2B5EF4-FFF2-40B4-BE49-F238E27FC236}">
-                <a16:creationId xmlns:a16="http://schemas.microsoft.com/office/drawing/2014/main" id="{46D415C9-7299-415E-BB1A-8D05E98FAB58}"/>
-              </a:ext>
-            </a:extLst>
-          </p:cNvPr>
-          <p:cNvPicPr>
-            <a:picLocks noGrp="1" noChangeAspect="1"/>
-          </p:cNvPicPr>
-          <p:nvPr>
-            <p:ph type="pic" sz="quarter" idx="10"/>
-          </p:nvPr>
-        </p:nvPicPr>
-        <p:blipFill rotWithShape="1">
-          <a:blip r:embed="rId3"/>
-          <a:srcRect l="755" t="14912" r="-755" b="17163"/>
-          <a:stretch/>
-        </p:blipFill>
-        <p:spPr>
-          <a:xfrm>
-            <a:off x="838200" y="3179380"/>
-            <a:ext cx="8077200" cy="3657600"/>
-          </a:xfrm>
-        </p:spPr>
-      </p:pic>
       <p:sp>
         <p:nvSpPr>
           <p:cNvPr id="9" name="Title 8">
@@ -22532,6 +22874,36 @@
           </a:p>
         </p:txBody>
       </p:sp>
+      <p:pic>
+        <p:nvPicPr>
+          <p:cNvPr id="13" name="Picture 12" descr="A picture containing icon&#10;&#10;Description automatically generated">
+            <a:extLst>
+              <a:ext uri="{FF2B5EF4-FFF2-40B4-BE49-F238E27FC236}">
+                <a16:creationId xmlns:a16="http://schemas.microsoft.com/office/drawing/2014/main" id="{770B7D5E-D6F4-4582-9374-9F37481901A8}"/>
+              </a:ext>
+            </a:extLst>
+          </p:cNvPr>
+          <p:cNvPicPr>
+            <a:picLocks noChangeAspect="1"/>
+          </p:cNvPicPr>
+          <p:nvPr/>
+        </p:nvPicPr>
+        <p:blipFill>
+          <a:blip r:embed="rId3"/>
+          <a:stretch>
+            <a:fillRect/>
+          </a:stretch>
+        </p:blipFill>
+        <p:spPr>
+          <a:xfrm>
+            <a:off x="1013012" y="3093886"/>
+            <a:ext cx="6454588" cy="3657600"/>
+          </a:xfrm>
+          <a:prstGeom prst="rect">
+            <a:avLst/>
+          </a:prstGeom>
+        </p:spPr>
+      </p:pic>
     </p:spTree>
     <p:extLst>
       <p:ext uri="{BB962C8B-B14F-4D97-AF65-F5344CB8AC3E}">
@@ -22546,160 +22918,6 @@
 </file>
 
 <file path=ppt/slides/slide7.xml><?xml version="1.0" encoding="utf-8"?>
-<p:sld xmlns:a="http://schemas.openxmlformats.org/drawingml/2006/main" xmlns:r="http://schemas.openxmlformats.org/officeDocument/2006/relationships" xmlns:p="http://schemas.openxmlformats.org/presentationml/2006/main">
-  <p:cSld>
-    <p:spTree>
-      <p:nvGrpSpPr>
-        <p:cNvPr id="1" name=""/>
-        <p:cNvGrpSpPr/>
-        <p:nvPr/>
-      </p:nvGrpSpPr>
-      <p:grpSpPr>
-        <a:xfrm>
-          <a:off x="0" y="0"/>
-          <a:ext cx="0" cy="0"/>
-          <a:chOff x="0" y="0"/>
-          <a:chExt cx="0" cy="0"/>
-        </a:xfrm>
-      </p:grpSpPr>
-      <p:pic>
-        <p:nvPicPr>
-          <p:cNvPr id="10" name="Picture Placeholder 13" descr="Two people standing in front of a window&#10; ">
-            <a:extLst>
-              <a:ext uri="{FF2B5EF4-FFF2-40B4-BE49-F238E27FC236}">
-                <a16:creationId xmlns:a16="http://schemas.microsoft.com/office/drawing/2014/main" id="{CF497EBA-3F02-4AFE-A2E1-05410BF6A4C0}"/>
-              </a:ext>
-            </a:extLst>
-          </p:cNvPr>
-          <p:cNvPicPr>
-            <a:picLocks noGrp="1" noChangeAspect="1"/>
-          </p:cNvPicPr>
-          <p:nvPr>
-            <p:ph type="pic" sz="quarter" idx="13"/>
-          </p:nvPr>
-        </p:nvPicPr>
-        <p:blipFill rotWithShape="1">
-          <a:blip r:embed="rId3" cstate="screen">
-            <a:extLst>
-              <a:ext uri="{28A0092B-C50C-407E-A947-70E740481C1C}">
-                <a14:useLocalDpi xmlns:a14="http://schemas.microsoft.com/office/drawing/2010/main"/>
-              </a:ext>
-            </a:extLst>
-          </a:blip>
-          <a:srcRect l="26219" r="26219"/>
-          <a:stretch/>
-        </p:blipFill>
-        <p:spPr/>
-      </p:pic>
-      <p:pic>
-        <p:nvPicPr>
-          <p:cNvPr id="13" name="Picture Placeholder 12" descr="A person standing on a table&#10; ">
-            <a:extLst>
-              <a:ext uri="{FF2B5EF4-FFF2-40B4-BE49-F238E27FC236}">
-                <a16:creationId xmlns:a16="http://schemas.microsoft.com/office/drawing/2014/main" id="{A4B6015D-7E4F-478A-B264-E70A90F082D8}"/>
-              </a:ext>
-            </a:extLst>
-          </p:cNvPr>
-          <p:cNvPicPr>
-            <a:picLocks noGrp="1" noChangeAspect="1"/>
-          </p:cNvPicPr>
-          <p:nvPr>
-            <p:ph type="pic" sz="quarter" idx="15"/>
-          </p:nvPr>
-        </p:nvPicPr>
-        <p:blipFill>
-          <a:blip r:embed="rId4" cstate="screen">
-            <a:extLst>
-              <a:ext uri="{28A0092B-C50C-407E-A947-70E740481C1C}">
-                <a14:useLocalDpi xmlns:a14="http://schemas.microsoft.com/office/drawing/2010/main"/>
-              </a:ext>
-            </a:extLst>
-          </a:blip>
-          <a:srcRect l="14435" r="14435"/>
-          <a:stretch>
-            <a:fillRect/>
-          </a:stretch>
-        </p:blipFill>
-        <p:spPr/>
-      </p:pic>
-      <p:pic>
-        <p:nvPicPr>
-          <p:cNvPr id="11" name="Picture Placeholder 13" descr="3 ladies in discussion">
-            <a:extLst>
-              <a:ext uri="{FF2B5EF4-FFF2-40B4-BE49-F238E27FC236}">
-                <a16:creationId xmlns:a16="http://schemas.microsoft.com/office/drawing/2014/main" id="{FD7B103C-B5B8-46F9-B225-3C5D1DF400E3}"/>
-              </a:ext>
-              <a:ext uri="{C183D7F6-B498-43B3-948B-1728B52AA6E4}">
-                <adec:decorative xmlns:adec="http://schemas.microsoft.com/office/drawing/2017/decorative" val="0"/>
-              </a:ext>
-            </a:extLst>
-          </p:cNvPr>
-          <p:cNvPicPr>
-            <a:picLocks noGrp="1" noChangeAspect="1"/>
-          </p:cNvPicPr>
-          <p:nvPr>
-            <p:ph type="pic" sz="quarter" idx="16"/>
-          </p:nvPr>
-        </p:nvPicPr>
-        <p:blipFill>
-          <a:blip r:embed="rId5" cstate="screen">
-            <a:extLst>
-              <a:ext uri="{28A0092B-C50C-407E-A947-70E740481C1C}">
-                <a14:useLocalDpi xmlns:a14="http://schemas.microsoft.com/office/drawing/2010/main"/>
-              </a:ext>
-            </a:extLst>
-          </a:blip>
-          <a:srcRect t="5646" b="5646"/>
-          <a:stretch>
-            <a:fillRect/>
-          </a:stretch>
-        </p:blipFill>
-        <p:spPr/>
-      </p:pic>
-      <p:sp>
-        <p:nvSpPr>
-          <p:cNvPr id="6" name="Title 5">
-            <a:extLst>
-              <a:ext uri="{FF2B5EF4-FFF2-40B4-BE49-F238E27FC236}">
-                <a16:creationId xmlns:a16="http://schemas.microsoft.com/office/drawing/2014/main" id="{AD8CD555-AB49-4CAE-998F-97A85F59AD6D}"/>
-              </a:ext>
-            </a:extLst>
-          </p:cNvPr>
-          <p:cNvSpPr>
-            <a:spLocks noGrp="1"/>
-          </p:cNvSpPr>
-          <p:nvPr>
-            <p:ph type="title"/>
-          </p:nvPr>
-        </p:nvSpPr>
-        <p:spPr/>
-        <p:txBody>
-          <a:bodyPr/>
-          <a:lstStyle/>
-          <a:p>
-            <a:r>
-              <a:rPr lang="en-US" dirty="0">
-                <a:latin typeface="+mn-lt"/>
-              </a:rPr>
-              <a:t>Click to Add Slide Title Here</a:t>
-            </a:r>
-          </a:p>
-        </p:txBody>
-      </p:sp>
-    </p:spTree>
-    <p:extLst>
-      <p:ext uri="{BB962C8B-B14F-4D97-AF65-F5344CB8AC3E}">
-        <p14:creationId xmlns:p14="http://schemas.microsoft.com/office/powerpoint/2010/main" val="202479834"/>
-      </p:ext>
-    </p:extLst>
-  </p:cSld>
-  <p:clrMapOvr>
-    <a:masterClrMapping/>
-  </p:clrMapOvr>
-</p:sld>
-</file>
-
-<file path=ppt/slides/slide8.xml><?xml version="1.0" encoding="utf-8"?>
 <p:sld xmlns:a="http://schemas.openxmlformats.org/drawingml/2006/main" xmlns:r="http://schemas.openxmlformats.org/officeDocument/2006/relationships" xmlns:p="http://schemas.openxmlformats.org/presentationml/2006/main">
   <p:cSld>
     <p:bg>
@@ -22778,7 +22996,7 @@
         <p:spPr/>
         <p:txBody>
           <a:bodyPr>
-            <a:normAutofit/>
+            <a:normAutofit fontScale="90000"/>
           </a:bodyPr>
           <a:lstStyle/>
           <a:p>
@@ -22789,7 +23007,7 @@
                 </a:solidFill>
                 <a:latin typeface="+mn-lt"/>
               </a:rPr>
-              <a:t>AQI Analysis</a:t>
+              <a:t>AQI Analysis Summary</a:t>
             </a:r>
           </a:p>
         </p:txBody>
@@ -22798,6 +23016,229 @@
     <p:extLst>
       <p:ext uri="{BB962C8B-B14F-4D97-AF65-F5344CB8AC3E}">
         <p14:creationId xmlns:p14="http://schemas.microsoft.com/office/powerpoint/2010/main" val="1155590625"/>
+      </p:ext>
+    </p:extLst>
+  </p:cSld>
+  <p:clrMapOvr>
+    <a:masterClrMapping/>
+  </p:clrMapOvr>
+</p:sld>
+</file>
+
+<file path=ppt/slides/slide8.xml><?xml version="1.0" encoding="utf-8"?>
+<p:sld xmlns:a="http://schemas.openxmlformats.org/drawingml/2006/main" xmlns:r="http://schemas.openxmlformats.org/officeDocument/2006/relationships" xmlns:p="http://schemas.openxmlformats.org/presentationml/2006/main">
+  <p:cSld>
+    <p:spTree>
+      <p:nvGrpSpPr>
+        <p:cNvPr id="1" name=""/>
+        <p:cNvGrpSpPr/>
+        <p:nvPr/>
+      </p:nvGrpSpPr>
+      <p:grpSpPr>
+        <a:xfrm>
+          <a:off x="0" y="0"/>
+          <a:ext cx="0" cy="0"/>
+          <a:chOff x="0" y="0"/>
+          <a:chExt cx="0" cy="0"/>
+        </a:xfrm>
+      </p:grpSpPr>
+      <p:sp>
+        <p:nvSpPr>
+          <p:cNvPr id="8" name="Title 7">
+            <a:extLst>
+              <a:ext uri="{FF2B5EF4-FFF2-40B4-BE49-F238E27FC236}">
+                <a16:creationId xmlns:a16="http://schemas.microsoft.com/office/drawing/2014/main" id="{AB58A585-52FA-4A45-B2D0-660EC2D22B31}"/>
+              </a:ext>
+            </a:extLst>
+          </p:cNvPr>
+          <p:cNvSpPr>
+            <a:spLocks noGrp="1"/>
+          </p:cNvSpPr>
+          <p:nvPr>
+            <p:ph type="title"/>
+          </p:nvPr>
+        </p:nvSpPr>
+        <p:spPr/>
+        <p:txBody>
+          <a:bodyPr/>
+          <a:lstStyle/>
+          <a:p>
+            <a:pPr algn="ctr"/>
+            <a:r>
+              <a:rPr lang="en-US" sz="4400" dirty="0">
+                <a:solidFill>
+                  <a:srgbClr val="5DAAB0"/>
+                </a:solidFill>
+                <a:latin typeface="+mn-lt"/>
+              </a:rPr>
+              <a:t>1</a:t>
+            </a:r>
+            <a:r>
+              <a:rPr lang="en-US" sz="4400" baseline="30000" dirty="0">
+                <a:solidFill>
+                  <a:srgbClr val="5DAAB0"/>
+                </a:solidFill>
+                <a:latin typeface="+mn-lt"/>
+              </a:rPr>
+              <a:t>st</a:t>
+            </a:r>
+            <a:r>
+              <a:rPr lang="en-US" sz="4400" dirty="0">
+                <a:solidFill>
+                  <a:srgbClr val="5DAAB0"/>
+                </a:solidFill>
+                <a:latin typeface="+mn-lt"/>
+              </a:rPr>
+              <a:t> Draft  Visualization</a:t>
+            </a:r>
+          </a:p>
+        </p:txBody>
+      </p:sp>
+      <p:sp>
+        <p:nvSpPr>
+          <p:cNvPr id="10" name="Text Placeholder 9">
+            <a:extLst>
+              <a:ext uri="{FF2B5EF4-FFF2-40B4-BE49-F238E27FC236}">
+                <a16:creationId xmlns:a16="http://schemas.microsoft.com/office/drawing/2014/main" id="{76C3E0A7-1C3E-0A40-AC21-1EAD4086CBB7}"/>
+              </a:ext>
+            </a:extLst>
+          </p:cNvPr>
+          <p:cNvSpPr>
+            <a:spLocks noGrp="1"/>
+          </p:cNvSpPr>
+          <p:nvPr>
+            <p:ph type="body" sz="quarter" idx="11"/>
+          </p:nvPr>
+        </p:nvSpPr>
+        <p:spPr/>
+        <p:txBody>
+          <a:bodyPr/>
+          <a:lstStyle/>
+          <a:p>
+            <a:pPr lvl="0"/>
+            <a:r>
+              <a:rPr lang="en-US" dirty="0"/>
+              <a:t>This visualization summarizes the Air Quality Index (AQI) score by month and by state since November 2020.</a:t>
+            </a:r>
+          </a:p>
+          <a:p>
+            <a:pPr lvl="0"/>
+            <a:r>
+              <a:rPr lang="en-US" dirty="0"/>
+              <a:t>Average AQIs have been steady between November 2020 and July 2021, with a significant increase in August 2021, particularly in California (that is likely due to the fire activity across the state in the summer of 2021).</a:t>
+            </a:r>
+          </a:p>
+          <a:p>
+            <a:pPr lvl="0"/>
+            <a:endParaRPr lang="en-US" dirty="0"/>
+          </a:p>
+          <a:p>
+            <a:pPr lvl="0"/>
+            <a:endParaRPr lang="en-US" dirty="0"/>
+          </a:p>
+          <a:p>
+            <a:endParaRPr lang="en-US" dirty="0"/>
+          </a:p>
+        </p:txBody>
+      </p:sp>
+      <p:sp>
+        <p:nvSpPr>
+          <p:cNvPr id="12" name="Text Placeholder 11">
+            <a:extLst>
+              <a:ext uri="{FF2B5EF4-FFF2-40B4-BE49-F238E27FC236}">
+                <a16:creationId xmlns:a16="http://schemas.microsoft.com/office/drawing/2014/main" id="{F82458FA-5D5F-6A41-B047-910858C1E142}"/>
+              </a:ext>
+            </a:extLst>
+          </p:cNvPr>
+          <p:cNvSpPr>
+            <a:spLocks noGrp="1"/>
+          </p:cNvSpPr>
+          <p:nvPr>
+            <p:ph type="body" sz="quarter" idx="12"/>
+          </p:nvPr>
+        </p:nvSpPr>
+        <p:spPr/>
+        <p:txBody>
+          <a:bodyPr/>
+          <a:lstStyle/>
+          <a:p>
+            <a:r>
+              <a:rPr lang="en-US" dirty="0"/>
+              <a:t>USING TABLEAU</a:t>
+            </a:r>
+          </a:p>
+        </p:txBody>
+      </p:sp>
+      <mc:AlternateContent xmlns:mc="http://schemas.openxmlformats.org/markup-compatibility/2006">
+        <mc:Choice xmlns:we="http://schemas.microsoft.com/office/webextensions/webextension/2010/11" xmlns:pca="http://schemas.microsoft.com/office/powerpoint/2013/contentapp" Requires="we pca">
+          <p:graphicFrame>
+            <p:nvGraphicFramePr>
+              <p:cNvPr id="2" name="Add-in 1" title="Web Viewer">
+                <a:extLst>
+                  <a:ext uri="{FF2B5EF4-FFF2-40B4-BE49-F238E27FC236}">
+                    <a16:creationId xmlns:a16="http://schemas.microsoft.com/office/drawing/2014/main" id="{7416791D-D9C9-4A2B-9D07-BE3B723D1B7E}"/>
+                  </a:ext>
+                </a:extLst>
+              </p:cNvPr>
+              <p:cNvGraphicFramePr>
+                <a:graphicFrameLocks noGrp="1"/>
+              </p:cNvGraphicFramePr>
+              <p:nvPr>
+                <p:extLst>
+                  <p:ext uri="{D42A27DB-BD31-4B8C-83A1-F6EECF244321}">
+                    <p14:modId xmlns:p14="http://schemas.microsoft.com/office/powerpoint/2010/main" val="573296294"/>
+                  </p:ext>
+                </p:extLst>
+              </p:nvPr>
+            </p:nvGraphicFramePr>
+            <p:xfrm>
+              <a:off x="152400" y="1066800"/>
+              <a:ext cx="6477000" cy="5062455"/>
+            </p:xfrm>
+            <a:graphic>
+              <a:graphicData uri="http://schemas.microsoft.com/office/webextensions/webextension/2010/11">
+                <we:webextensionref xmlns:we="http://schemas.microsoft.com/office/webextensions/webextension/2010/11" xmlns:r="http://schemas.openxmlformats.org/officeDocument/2006/relationships" r:id="rId3"/>
+              </a:graphicData>
+            </a:graphic>
+          </p:graphicFrame>
+        </mc:Choice>
+        <mc:Fallback>
+          <p:pic>
+            <p:nvPicPr>
+              <p:cNvPr id="2" name="Add-in 1" title="Web Viewer">
+                <a:extLst>
+                  <a:ext uri="{FF2B5EF4-FFF2-40B4-BE49-F238E27FC236}">
+                    <a16:creationId xmlns:a16="http://schemas.microsoft.com/office/drawing/2014/main" id="{7416791D-D9C9-4A2B-9D07-BE3B723D1B7E}"/>
+                  </a:ext>
+                </a:extLst>
+              </p:cNvPr>
+              <p:cNvPicPr>
+                <a:picLocks noGrp="1" noRot="1" noChangeAspect="1" noMove="1" noResize="1" noEditPoints="1" noAdjustHandles="1" noChangeArrowheads="1" noChangeShapeType="1"/>
+              </p:cNvPicPr>
+              <p:nvPr/>
+            </p:nvPicPr>
+            <p:blipFill>
+              <a:blip r:embed="rId4"/>
+              <a:stretch>
+                <a:fillRect/>
+              </a:stretch>
+            </p:blipFill>
+            <p:spPr>
+              <a:xfrm>
+                <a:off x="152400" y="1066800"/>
+                <a:ext cx="6477000" cy="5062455"/>
+              </a:xfrm>
+              <a:prstGeom prst="rect">
+                <a:avLst/>
+              </a:prstGeom>
+            </p:spPr>
+          </p:pic>
+        </mc:Fallback>
+      </mc:AlternateContent>
+    </p:spTree>
+    <p:extLst>
+      <p:ext uri="{BB962C8B-B14F-4D97-AF65-F5344CB8AC3E}">
+        <p14:creationId xmlns:p14="http://schemas.microsoft.com/office/powerpoint/2010/main" val="2606572195"/>
       </p:ext>
     </p:extLst>
   </p:cSld>
@@ -23708,4 +24149,18 @@
     </a:ext>
   </a:extLst>
 </a:theme>
+</file>
+
+<file path=ppt/webextensions/webextension1.xml><?xml version="1.0" encoding="utf-8"?>
+<we:webextension xmlns:we="http://schemas.microsoft.com/office/webextensions/webextension/2010/11" id="{AC0FAECC-0174-4A0B-A7B4-C716969D7076}">
+  <we:reference id="wa104295828" version="1.9.0.0" store="en-US" storeType="OMEX"/>
+  <we:alternateReferences>
+    <we:reference id="wa104295828" version="1.9.0.0" store="wa104295828" storeType="OMEX"/>
+  </we:alternateReferences>
+  <we:properties>
+    <we:property name="__labs__" value="{&quot;configuration&quot;:{&quot;appVersion&quot;:{&quot;major&quot;:1,&quot;minor&quot;:0},&quot;components&quot;:[{&quot;type&quot;:&quot;Labs.Components.ActivityComponent&quot;,&quot;name&quot;:&quot;public.tableau.com/views/Final_Project_Tab1/AvgAQIbyStatebyMonth?:language=en-US&amp;:display_count=n&amp;:origin=viz_share_link&quot;,&quot;values&quot;:{},&quot;data&quot;:{&quot;uri&quot;:&quot;public.tableau.com/views/Final_Project_Tab1/AvgAQIbyStatebyMonth?:language=en-US&amp;:display_count=n&amp;:origin=viz_share_link&quot;},&quot;secure&quot;:false}],&quot;name&quot;:&quot;public.tableau.com/views/Final_Project_Tab1/AvgAQIbyStatebyMonth?:language=en-US&amp;:display_count=n&amp;:origin=viz_share_link&quot;,&quot;timeline&quot;:null,&quot;analytics&quot;:null},&quot;hostVersion&quot;:{&quot;major&quot;:0,&quot;minor&quot;:1}}"/>
+  </we:properties>
+  <we:bindings/>
+  <we:snapshot xmlns:r="http://schemas.openxmlformats.org/officeDocument/2006/relationships" r:embed="rId1"/>
+</we:webextension>
 </file>
</xml_diff>

<commit_message>
updates Elodie 9/19/21 4:46pm
</commit_message>
<xml_diff>
--- a/OpenWeather_AQI_Presentation_Draft.pptx
+++ b/OpenWeather_AQI_Presentation_Draft.pptx
@@ -5,10 +5,10 @@
     <p:sldMasterId id="2147483648" r:id="rId1"/>
   </p:sldMasterIdLst>
   <p:notesMasterIdLst>
-    <p:notesMasterId r:id="rId16"/>
+    <p:notesMasterId r:id="rId17"/>
   </p:notesMasterIdLst>
   <p:handoutMasterIdLst>
-    <p:handoutMasterId r:id="rId17"/>
+    <p:handoutMasterId r:id="rId18"/>
   </p:handoutMasterIdLst>
   <p:sldIdLst>
     <p:sldId id="2524" r:id="rId2"/>
@@ -19,12 +19,13 @@
     <p:sldId id="2583" r:id="rId7"/>
     <p:sldId id="2589" r:id="rId8"/>
     <p:sldId id="2590" r:id="rId9"/>
-    <p:sldId id="2584" r:id="rId10"/>
-    <p:sldId id="2582" r:id="rId11"/>
-    <p:sldId id="2588" r:id="rId12"/>
-    <p:sldId id="2554" r:id="rId13"/>
-    <p:sldId id="2574" r:id="rId14"/>
-    <p:sldId id="2576" r:id="rId15"/>
+    <p:sldId id="2591" r:id="rId10"/>
+    <p:sldId id="2584" r:id="rId11"/>
+    <p:sldId id="2582" r:id="rId12"/>
+    <p:sldId id="2588" r:id="rId13"/>
+    <p:sldId id="2554" r:id="rId14"/>
+    <p:sldId id="2574" r:id="rId15"/>
+    <p:sldId id="2576" r:id="rId16"/>
   </p:sldIdLst>
   <p:sldSz cx="12192000" cy="6858000"/>
   <p:notesSz cx="6858000" cy="9144000"/>
@@ -154,7 +155,7 @@
 <file path=ppt/revisionInfo.xml><?xml version="1.0" encoding="utf-8"?>
 <p1510:revInfo xmlns:a="http://schemas.openxmlformats.org/drawingml/2006/main" xmlns:r="http://schemas.openxmlformats.org/officeDocument/2006/relationships" xmlns:p1510="http://schemas.microsoft.com/office/powerpoint/2015/10/main">
   <p1510:revLst>
-    <p1510:client id="{B99B3CDB-533B-4AF0-93E0-8041D68B3A02}" v="15" dt="2021-09-19T12:35:51.475"/>
+    <p1510:client id="{B99B3CDB-533B-4AF0-93E0-8041D68B3A02}" v="27" dt="2021-09-19T12:52:54.445"/>
   </p1510:revLst>
 </p1510:revInfo>
 </file>
@@ -164,7 +165,7 @@
   <pc:docChgLst>
     <pc:chgData name="elodiecslawinski@gmail.com" userId="2d9956b1ce3ed99c" providerId="LiveId" clId="{B99B3CDB-533B-4AF0-93E0-8041D68B3A02}"/>
     <pc:docChg chg="undo redo custSel addSld delSld modSld sldOrd">
-      <pc:chgData name="elodiecslawinski@gmail.com" userId="2d9956b1ce3ed99c" providerId="LiveId" clId="{B99B3CDB-533B-4AF0-93E0-8041D68B3A02}" dt="2021-09-19T12:36:33.391" v="2601" actId="1038"/>
+      <pc:chgData name="elodiecslawinski@gmail.com" userId="2d9956b1ce3ed99c" providerId="LiveId" clId="{B99B3CDB-533B-4AF0-93E0-8041D68B3A02}" dt="2021-09-19T12:53:20.946" v="2671" actId="14100"/>
       <pc:docMkLst>
         <pc:docMk/>
       </pc:docMkLst>
@@ -614,6 +615,37 @@
             <pc:docMk/>
             <pc:sldMk cId="2606572195" sldId="2590"/>
             <ac:graphicFrameMk id="16" creationId="{8F6D4133-13DB-4D35-AA57-2E241762BC26}"/>
+          </ac:graphicFrameMkLst>
+        </pc:graphicFrameChg>
+      </pc:sldChg>
+      <pc:sldChg chg="modSp add mod">
+        <pc:chgData name="elodiecslawinski@gmail.com" userId="2d9956b1ce3ed99c" providerId="LiveId" clId="{B99B3CDB-533B-4AF0-93E0-8041D68B3A02}" dt="2021-09-19T12:53:20.946" v="2671" actId="14100"/>
+        <pc:sldMkLst>
+          <pc:docMk/>
+          <pc:sldMk cId="261165440" sldId="2591"/>
+        </pc:sldMkLst>
+        <pc:spChg chg="mod">
+          <ac:chgData name="elodiecslawinski@gmail.com" userId="2d9956b1ce3ed99c" providerId="LiveId" clId="{B99B3CDB-533B-4AF0-93E0-8041D68B3A02}" dt="2021-09-19T12:52:11.791" v="2608" actId="20577"/>
+          <ac:spMkLst>
+            <pc:docMk/>
+            <pc:sldMk cId="261165440" sldId="2591"/>
+            <ac:spMk id="8" creationId="{AB58A585-52FA-4A45-B2D0-660EC2D22B31}"/>
+          </ac:spMkLst>
+        </pc:spChg>
+        <pc:spChg chg="mod">
+          <ac:chgData name="elodiecslawinski@gmail.com" userId="2d9956b1ce3ed99c" providerId="LiveId" clId="{B99B3CDB-533B-4AF0-93E0-8041D68B3A02}" dt="2021-09-19T12:52:37.997" v="2669" actId="20577"/>
+          <ac:spMkLst>
+            <pc:docMk/>
+            <pc:sldMk cId="261165440" sldId="2591"/>
+            <ac:spMk id="10" creationId="{76C3E0A7-1C3E-0A40-AC21-1EAD4086CBB7}"/>
+          </ac:spMkLst>
+        </pc:spChg>
+        <pc:graphicFrameChg chg="mod">
+          <ac:chgData name="elodiecslawinski@gmail.com" userId="2d9956b1ce3ed99c" providerId="LiveId" clId="{B99B3CDB-533B-4AF0-93E0-8041D68B3A02}" dt="2021-09-19T12:53:20.946" v="2671" actId="14100"/>
+          <ac:graphicFrameMkLst>
+            <pc:docMk/>
+            <pc:sldMk cId="261165440" sldId="2591"/>
+            <ac:graphicFrameMk id="2" creationId="{7416791D-D9C9-4A2B-9D07-BE3B723D1B7E}"/>
           </ac:graphicFrameMkLst>
         </pc:graphicFrameChg>
       </pc:sldChg>
@@ -2811,7 +2843,7 @@
     </p:spTree>
     <p:extLst>
       <p:ext uri="{BB962C8B-B14F-4D97-AF65-F5344CB8AC3E}">
-        <p14:creationId xmlns:p14="http://schemas.microsoft.com/office/powerpoint/2010/main" val="2704731012"/>
+        <p14:creationId xmlns:p14="http://schemas.microsoft.com/office/powerpoint/2010/main" val="400531086"/>
       </p:ext>
     </p:extLst>
   </p:cSld>
@@ -2895,7 +2927,7 @@
     </p:spTree>
     <p:extLst>
       <p:ext uri="{BB962C8B-B14F-4D97-AF65-F5344CB8AC3E}">
-        <p14:creationId xmlns:p14="http://schemas.microsoft.com/office/powerpoint/2010/main" val="2663438760"/>
+        <p14:creationId xmlns:p14="http://schemas.microsoft.com/office/powerpoint/2010/main" val="2704731012"/>
       </p:ext>
     </p:extLst>
   </p:cSld>
@@ -2979,7 +3011,7 @@
     </p:spTree>
     <p:extLst>
       <p:ext uri="{BB962C8B-B14F-4D97-AF65-F5344CB8AC3E}">
-        <p14:creationId xmlns:p14="http://schemas.microsoft.com/office/powerpoint/2010/main" val="3243940069"/>
+        <p14:creationId xmlns:p14="http://schemas.microsoft.com/office/powerpoint/2010/main" val="2663438760"/>
       </p:ext>
     </p:extLst>
   </p:cSld>
@@ -3055,6 +3087,90 @@
             <a:fld id="{3CFA0038-7055-434C-B6C4-B8C69565C600}" type="slidenum">
               <a:rPr lang="en-US" smtClean="0"/>
               <a:t>14</a:t>
+            </a:fld>
+            <a:endParaRPr lang="en-US" dirty="0"/>
+          </a:p>
+        </p:txBody>
+      </p:sp>
+    </p:spTree>
+    <p:extLst>
+      <p:ext uri="{BB962C8B-B14F-4D97-AF65-F5344CB8AC3E}">
+        <p14:creationId xmlns:p14="http://schemas.microsoft.com/office/powerpoint/2010/main" val="3243940069"/>
+      </p:ext>
+    </p:extLst>
+  </p:cSld>
+  <p:clrMapOvr>
+    <a:masterClrMapping/>
+  </p:clrMapOvr>
+</p:notes>
+</file>
+
+<file path=ppt/notesSlides/notesSlide14.xml><?xml version="1.0" encoding="utf-8"?>
+<p:notes xmlns:a="http://schemas.openxmlformats.org/drawingml/2006/main" xmlns:r="http://schemas.openxmlformats.org/officeDocument/2006/relationships" xmlns:p="http://schemas.openxmlformats.org/presentationml/2006/main">
+  <p:cSld>
+    <p:spTree>
+      <p:nvGrpSpPr>
+        <p:cNvPr id="1" name=""/>
+        <p:cNvGrpSpPr/>
+        <p:nvPr/>
+      </p:nvGrpSpPr>
+      <p:grpSpPr>
+        <a:xfrm>
+          <a:off x="0" y="0"/>
+          <a:ext cx="0" cy="0"/>
+          <a:chOff x="0" y="0"/>
+          <a:chExt cx="0" cy="0"/>
+        </a:xfrm>
+      </p:grpSpPr>
+      <p:sp>
+        <p:nvSpPr>
+          <p:cNvPr id="2" name="Slide Image Placeholder 1"/>
+          <p:cNvSpPr>
+            <a:spLocks noGrp="1" noRot="1" noChangeAspect="1"/>
+          </p:cNvSpPr>
+          <p:nvPr>
+            <p:ph type="sldImg"/>
+          </p:nvPr>
+        </p:nvSpPr>
+        <p:spPr/>
+      </p:sp>
+      <p:sp>
+        <p:nvSpPr>
+          <p:cNvPr id="3" name="Notes Placeholder 2"/>
+          <p:cNvSpPr>
+            <a:spLocks noGrp="1"/>
+          </p:cNvSpPr>
+          <p:nvPr>
+            <p:ph type="body" idx="1"/>
+          </p:nvPr>
+        </p:nvSpPr>
+        <p:spPr/>
+        <p:txBody>
+          <a:bodyPr/>
+          <a:lstStyle/>
+          <a:p>
+            <a:endParaRPr lang="en-US" dirty="0"/>
+          </a:p>
+        </p:txBody>
+      </p:sp>
+      <p:sp>
+        <p:nvSpPr>
+          <p:cNvPr id="4" name="Slide Number Placeholder 3"/>
+          <p:cNvSpPr>
+            <a:spLocks noGrp="1"/>
+          </p:cNvSpPr>
+          <p:nvPr>
+            <p:ph type="sldNum" sz="quarter" idx="5"/>
+          </p:nvPr>
+        </p:nvSpPr>
+        <p:spPr/>
+        <p:txBody>
+          <a:bodyPr/>
+          <a:lstStyle/>
+          <a:p>
+            <a:fld id="{3CFA0038-7055-434C-B6C4-B8C69565C600}" type="slidenum">
+              <a:rPr lang="en-US" smtClean="0"/>
+              <a:t>15</a:t>
             </a:fld>
             <a:endParaRPr lang="en-US" dirty="0"/>
           </a:p>
@@ -3726,7 +3842,7 @@
           <a:p>
             <a:fld id="{3CFA0038-7055-434C-B6C4-B8C69565C600}" type="slidenum">
               <a:rPr lang="en-US" smtClean="0"/>
-              <a:t>10</a:t>
+              <a:t>9</a:t>
             </a:fld>
             <a:endParaRPr lang="en-US" dirty="0"/>
           </a:p>
@@ -3735,7 +3851,7 @@
     </p:spTree>
     <p:extLst>
       <p:ext uri="{BB962C8B-B14F-4D97-AF65-F5344CB8AC3E}">
-        <p14:creationId xmlns:p14="http://schemas.microsoft.com/office/powerpoint/2010/main" val="400531086"/>
+        <p14:creationId xmlns:p14="http://schemas.microsoft.com/office/powerpoint/2010/main" val="3241954593"/>
       </p:ext>
     </p:extLst>
   </p:cSld>
@@ -20323,6 +20439,118 @@
           <a:chExt cx="0" cy="0"/>
         </a:xfrm>
       </p:grpSpPr>
+      <p:sp>
+        <p:nvSpPr>
+          <p:cNvPr id="2" name="Picture Placeholder 1">
+            <a:extLst>
+              <a:ext uri="{FF2B5EF4-FFF2-40B4-BE49-F238E27FC236}">
+                <a16:creationId xmlns:a16="http://schemas.microsoft.com/office/drawing/2014/main" id="{F3B36882-9218-4CA3-9948-3210693A1432}"/>
+              </a:ext>
+            </a:extLst>
+          </p:cNvPr>
+          <p:cNvSpPr>
+            <a:spLocks noGrp="1"/>
+          </p:cNvSpPr>
+          <p:nvPr>
+            <p:ph type="pic" sz="quarter" idx="13"/>
+          </p:nvPr>
+        </p:nvSpPr>
+        <p:spPr/>
+      </p:sp>
+      <p:sp>
+        <p:nvSpPr>
+          <p:cNvPr id="3" name="Picture Placeholder 2">
+            <a:extLst>
+              <a:ext uri="{FF2B5EF4-FFF2-40B4-BE49-F238E27FC236}">
+                <a16:creationId xmlns:a16="http://schemas.microsoft.com/office/drawing/2014/main" id="{BC8A54E8-F773-4B3D-91E6-15BAEAC7EFFE}"/>
+              </a:ext>
+            </a:extLst>
+          </p:cNvPr>
+          <p:cNvSpPr>
+            <a:spLocks noGrp="1"/>
+          </p:cNvSpPr>
+          <p:nvPr>
+            <p:ph type="pic" sz="quarter" idx="15"/>
+          </p:nvPr>
+        </p:nvSpPr>
+        <p:spPr/>
+      </p:sp>
+      <p:sp>
+        <p:nvSpPr>
+          <p:cNvPr id="4" name="Picture Placeholder 3">
+            <a:extLst>
+              <a:ext uri="{FF2B5EF4-FFF2-40B4-BE49-F238E27FC236}">
+                <a16:creationId xmlns:a16="http://schemas.microsoft.com/office/drawing/2014/main" id="{4AC005F8-A463-49F2-8969-1E9BEBB293EF}"/>
+              </a:ext>
+            </a:extLst>
+          </p:cNvPr>
+          <p:cNvSpPr>
+            <a:spLocks noGrp="1"/>
+          </p:cNvSpPr>
+          <p:nvPr>
+            <p:ph type="pic" sz="quarter" idx="16"/>
+          </p:nvPr>
+        </p:nvSpPr>
+        <p:spPr/>
+      </p:sp>
+      <p:sp>
+        <p:nvSpPr>
+          <p:cNvPr id="5" name="Title 4">
+            <a:extLst>
+              <a:ext uri="{FF2B5EF4-FFF2-40B4-BE49-F238E27FC236}">
+                <a16:creationId xmlns:a16="http://schemas.microsoft.com/office/drawing/2014/main" id="{E870BB1D-96EA-4078-AEC4-04F59C72F156}"/>
+              </a:ext>
+            </a:extLst>
+          </p:cNvPr>
+          <p:cNvSpPr>
+            <a:spLocks noGrp="1"/>
+          </p:cNvSpPr>
+          <p:nvPr>
+            <p:ph type="title"/>
+          </p:nvPr>
+        </p:nvSpPr>
+        <p:spPr/>
+        <p:txBody>
+          <a:bodyPr/>
+          <a:lstStyle/>
+          <a:p>
+            <a:r>
+              <a:rPr lang="en-US" dirty="0"/>
+              <a:t>Backup Slides</a:t>
+            </a:r>
+          </a:p>
+        </p:txBody>
+      </p:sp>
+    </p:spTree>
+    <p:extLst>
+      <p:ext uri="{BB962C8B-B14F-4D97-AF65-F5344CB8AC3E}">
+        <p14:creationId xmlns:p14="http://schemas.microsoft.com/office/powerpoint/2010/main" val="3909312436"/>
+      </p:ext>
+    </p:extLst>
+  </p:cSld>
+  <p:clrMapOvr>
+    <a:masterClrMapping/>
+  </p:clrMapOvr>
+</p:sld>
+</file>
+
+<file path=ppt/slides/slide11.xml><?xml version="1.0" encoding="utf-8"?>
+<p:sld xmlns:a="http://schemas.openxmlformats.org/drawingml/2006/main" xmlns:r="http://schemas.openxmlformats.org/officeDocument/2006/relationships" xmlns:p="http://schemas.openxmlformats.org/presentationml/2006/main">
+  <p:cSld>
+    <p:spTree>
+      <p:nvGrpSpPr>
+        <p:cNvPr id="1" name=""/>
+        <p:cNvGrpSpPr/>
+        <p:nvPr/>
+      </p:nvGrpSpPr>
+      <p:grpSpPr>
+        <a:xfrm>
+          <a:off x="0" y="0"/>
+          <a:ext cx="0" cy="0"/>
+          <a:chOff x="0" y="0"/>
+          <a:chExt cx="0" cy="0"/>
+        </a:xfrm>
+      </p:grpSpPr>
       <p:pic>
         <p:nvPicPr>
           <p:cNvPr id="10" name="Picture Placeholder 13" descr="Two people standing in front of a window&#10; ">
@@ -20460,7 +20688,7 @@
 </p:sld>
 </file>
 
-<file path=ppt/slides/slide11.xml><?xml version="1.0" encoding="utf-8"?>
+<file path=ppt/slides/slide12.xml><?xml version="1.0" encoding="utf-8"?>
 <p:sld xmlns:a="http://schemas.openxmlformats.org/drawingml/2006/main" xmlns:r="http://schemas.openxmlformats.org/officeDocument/2006/relationships" xmlns:p="http://schemas.openxmlformats.org/presentationml/2006/main">
   <p:cSld>
     <p:bg>
@@ -20559,437 +20787,6 @@
     <p:extLst>
       <p:ext uri="{BB962C8B-B14F-4D97-AF65-F5344CB8AC3E}">
         <p14:creationId xmlns:p14="http://schemas.microsoft.com/office/powerpoint/2010/main" val="3341258257"/>
-      </p:ext>
-    </p:extLst>
-  </p:cSld>
-  <p:clrMapOvr>
-    <a:masterClrMapping/>
-  </p:clrMapOvr>
-</p:sld>
-</file>
-
-<file path=ppt/slides/slide12.xml><?xml version="1.0" encoding="utf-8"?>
-<p:sld xmlns:a="http://schemas.openxmlformats.org/drawingml/2006/main" xmlns:r="http://schemas.openxmlformats.org/officeDocument/2006/relationships" xmlns:p="http://schemas.openxmlformats.org/presentationml/2006/main">
-  <p:cSld>
-    <p:spTree>
-      <p:nvGrpSpPr>
-        <p:cNvPr id="1" name=""/>
-        <p:cNvGrpSpPr/>
-        <p:nvPr/>
-      </p:nvGrpSpPr>
-      <p:grpSpPr>
-        <a:xfrm>
-          <a:off x="0" y="0"/>
-          <a:ext cx="0" cy="0"/>
-          <a:chOff x="0" y="0"/>
-          <a:chExt cx="0" cy="0"/>
-        </a:xfrm>
-      </p:grpSpPr>
-      <p:sp>
-        <p:nvSpPr>
-          <p:cNvPr id="5" name="Title 4">
-            <a:extLst>
-              <a:ext uri="{FF2B5EF4-FFF2-40B4-BE49-F238E27FC236}">
-                <a16:creationId xmlns:a16="http://schemas.microsoft.com/office/drawing/2014/main" id="{96DBE169-BA91-4B17-9AF2-4BAD528BEE06}"/>
-              </a:ext>
-            </a:extLst>
-          </p:cNvPr>
-          <p:cNvSpPr>
-            <a:spLocks noGrp="1"/>
-          </p:cNvSpPr>
-          <p:nvPr>
-            <p:ph type="title"/>
-          </p:nvPr>
-        </p:nvSpPr>
-        <p:spPr/>
-        <p:txBody>
-          <a:bodyPr>
-            <a:normAutofit fontScale="90000"/>
-          </a:bodyPr>
-          <a:lstStyle/>
-          <a:p>
-            <a:r>
-              <a:rPr lang="en-US" dirty="0"/>
-              <a:t>Click to Add Icon </a:t>
-            </a:r>
-            <a:r>
-              <a:rPr lang="en-US" dirty="0">
-                <a:solidFill>
-                  <a:srgbClr val="5DAAB0"/>
-                </a:solidFill>
-              </a:rPr>
-              <a:t>Slide Title Here </a:t>
-            </a:r>
-          </a:p>
-        </p:txBody>
-      </p:sp>
-      <p:sp>
-        <p:nvSpPr>
-          <p:cNvPr id="8" name="Text Placeholder 7">
-            <a:extLst>
-              <a:ext uri="{FF2B5EF4-FFF2-40B4-BE49-F238E27FC236}">
-                <a16:creationId xmlns:a16="http://schemas.microsoft.com/office/drawing/2014/main" id="{D9C2EAA8-D3C6-403B-B439-F95C60D0B3B9}"/>
-              </a:ext>
-            </a:extLst>
-          </p:cNvPr>
-          <p:cNvSpPr>
-            <a:spLocks noGrp="1"/>
-          </p:cNvSpPr>
-          <p:nvPr>
-            <p:ph type="body" sz="quarter" idx="12"/>
-          </p:nvPr>
-        </p:nvSpPr>
-        <p:spPr/>
-        <p:txBody>
-          <a:bodyPr/>
-          <a:lstStyle/>
-          <a:p>
-            <a:r>
-              <a:rPr lang="en-US" dirty="0"/>
-              <a:t>SUBTITLE GOES HERE</a:t>
-            </a:r>
-          </a:p>
-        </p:txBody>
-      </p:sp>
-      <p:pic>
-        <p:nvPicPr>
-          <p:cNvPr id="46" name="Picture Placeholder 45">
-            <a:extLst>
-              <a:ext uri="{FF2B5EF4-FFF2-40B4-BE49-F238E27FC236}">
-                <a16:creationId xmlns:a16="http://schemas.microsoft.com/office/drawing/2014/main" id="{6263CE43-D410-4BF8-8529-41197F401002}"/>
-              </a:ext>
-              <a:ext uri="{C183D7F6-B498-43B3-948B-1728B52AA6E4}">
-                <adec:decorative xmlns:adec="http://schemas.microsoft.com/office/drawing/2017/decorative" val="1"/>
-              </a:ext>
-            </a:extLst>
-          </p:cNvPr>
-          <p:cNvPicPr>
-            <a:picLocks noGrp="1" noChangeAspect="1"/>
-          </p:cNvPicPr>
-          <p:nvPr>
-            <p:ph type="pic" sz="quarter" idx="13"/>
-          </p:nvPr>
-        </p:nvPicPr>
-        <p:blipFill rotWithShape="1">
-          <a:blip r:embed="rId3" cstate="screen">
-            <a:extLst>
-              <a:ext uri="{28A0092B-C50C-407E-A947-70E740481C1C}">
-                <a14:useLocalDpi xmlns:a14="http://schemas.microsoft.com/office/drawing/2010/main"/>
-              </a:ext>
-              <a:ext uri="{96DAC541-7B7A-43D3-8B79-37D633B846F1}">
-                <asvg:svgBlip xmlns:asvg="http://schemas.microsoft.com/office/drawing/2016/SVG/main" r:embed="rId4"/>
-              </a:ext>
-            </a:extLst>
-          </a:blip>
-          <a:srcRect l="-29560" t="-29716" r="-29560" b="-29716"/>
-          <a:stretch/>
-        </p:blipFill>
-        <p:spPr>
-          <a:xfrm>
-            <a:off x="6687422" y="1038724"/>
-            <a:ext cx="804759" cy="804759"/>
-          </a:xfrm>
-        </p:spPr>
-      </p:pic>
-      <p:pic>
-        <p:nvPicPr>
-          <p:cNvPr id="50" name="Picture Placeholder 49">
-            <a:extLst>
-              <a:ext uri="{FF2B5EF4-FFF2-40B4-BE49-F238E27FC236}">
-                <a16:creationId xmlns:a16="http://schemas.microsoft.com/office/drawing/2014/main" id="{44B7CF38-0B19-41D9-8D37-6D59A3F3E045}"/>
-              </a:ext>
-              <a:ext uri="{C183D7F6-B498-43B3-948B-1728B52AA6E4}">
-                <adec:decorative xmlns:adec="http://schemas.microsoft.com/office/drawing/2017/decorative" val="1"/>
-              </a:ext>
-            </a:extLst>
-          </p:cNvPr>
-          <p:cNvPicPr>
-            <a:picLocks noGrp="1" noChangeAspect="1"/>
-          </p:cNvPicPr>
-          <p:nvPr>
-            <p:ph type="pic" sz="quarter" idx="14"/>
-          </p:nvPr>
-        </p:nvPicPr>
-        <p:blipFill rotWithShape="1">
-          <a:blip r:embed="rId5" cstate="screen">
-            <a:extLst>
-              <a:ext uri="{28A0092B-C50C-407E-A947-70E740481C1C}">
-                <a14:useLocalDpi xmlns:a14="http://schemas.microsoft.com/office/drawing/2010/main"/>
-              </a:ext>
-              <a:ext uri="{96DAC541-7B7A-43D3-8B79-37D633B846F1}">
-                <asvg:svgBlip xmlns:asvg="http://schemas.microsoft.com/office/drawing/2016/SVG/main" r:embed="rId6"/>
-              </a:ext>
-            </a:extLst>
-          </a:blip>
-          <a:srcRect l="-22179" t="-22322" r="-22179" b="-22322"/>
-          <a:stretch/>
-        </p:blipFill>
-        <p:spPr>
-          <a:xfrm>
-            <a:off x="6687422" y="2330235"/>
-            <a:ext cx="804759" cy="804759"/>
-          </a:xfrm>
-        </p:spPr>
-      </p:pic>
-      <p:pic>
-        <p:nvPicPr>
-          <p:cNvPr id="52" name="Picture Placeholder 51">
-            <a:extLst>
-              <a:ext uri="{FF2B5EF4-FFF2-40B4-BE49-F238E27FC236}">
-                <a16:creationId xmlns:a16="http://schemas.microsoft.com/office/drawing/2014/main" id="{26AA0551-AA74-4E7E-80AF-5D856020D1F8}"/>
-              </a:ext>
-              <a:ext uri="{C183D7F6-B498-43B3-948B-1728B52AA6E4}">
-                <adec:decorative xmlns:adec="http://schemas.microsoft.com/office/drawing/2017/decorative" val="1"/>
-              </a:ext>
-            </a:extLst>
-          </p:cNvPr>
-          <p:cNvPicPr>
-            <a:picLocks noGrp="1" noChangeAspect="1"/>
-          </p:cNvPicPr>
-          <p:nvPr>
-            <p:ph type="pic" sz="quarter" idx="15"/>
-          </p:nvPr>
-        </p:nvPicPr>
-        <p:blipFill rotWithShape="1">
-          <a:blip r:embed="rId7" cstate="screen">
-            <a:extLst>
-              <a:ext uri="{28A0092B-C50C-407E-A947-70E740481C1C}">
-                <a14:useLocalDpi xmlns:a14="http://schemas.microsoft.com/office/drawing/2010/main"/>
-              </a:ext>
-              <a:ext uri="{96DAC541-7B7A-43D3-8B79-37D633B846F1}">
-                <asvg:svgBlip xmlns:asvg="http://schemas.microsoft.com/office/drawing/2016/SVG/main" r:embed="rId8"/>
-              </a:ext>
-            </a:extLst>
-          </a:blip>
-          <a:srcRect l="-27274" t="-27427" r="-27274" b="-27427"/>
-          <a:stretch/>
-        </p:blipFill>
-        <p:spPr>
-          <a:xfrm>
-            <a:off x="6687422" y="3621746"/>
-            <a:ext cx="804759" cy="804759"/>
-          </a:xfrm>
-        </p:spPr>
-      </p:pic>
-      <p:pic>
-        <p:nvPicPr>
-          <p:cNvPr id="54" name="Picture Placeholder 53">
-            <a:extLst>
-              <a:ext uri="{FF2B5EF4-FFF2-40B4-BE49-F238E27FC236}">
-                <a16:creationId xmlns:a16="http://schemas.microsoft.com/office/drawing/2014/main" id="{21139392-74B8-43B3-BFDF-58CAC133651E}"/>
-              </a:ext>
-              <a:ext uri="{C183D7F6-B498-43B3-948B-1728B52AA6E4}">
-                <adec:decorative xmlns:adec="http://schemas.microsoft.com/office/drawing/2017/decorative" val="1"/>
-              </a:ext>
-            </a:extLst>
-          </p:cNvPr>
-          <p:cNvPicPr>
-            <a:picLocks noGrp="1" noChangeAspect="1"/>
-          </p:cNvPicPr>
-          <p:nvPr>
-            <p:ph type="pic" sz="quarter" idx="16"/>
-          </p:nvPr>
-        </p:nvPicPr>
-        <p:blipFill rotWithShape="1">
-          <a:blip r:embed="rId9" cstate="screen">
-            <a:extLst>
-              <a:ext uri="{28A0092B-C50C-407E-A947-70E740481C1C}">
-                <a14:useLocalDpi xmlns:a14="http://schemas.microsoft.com/office/drawing/2010/main"/>
-              </a:ext>
-              <a:ext uri="{96DAC541-7B7A-43D3-8B79-37D633B846F1}">
-                <asvg:svgBlip xmlns:asvg="http://schemas.microsoft.com/office/drawing/2016/SVG/main" r:embed="rId10"/>
-              </a:ext>
-            </a:extLst>
-          </a:blip>
-          <a:srcRect l="-30855" t="-31015" r="-30855" b="-31015"/>
-          <a:stretch/>
-        </p:blipFill>
-        <p:spPr>
-          <a:xfrm>
-            <a:off x="6687422" y="4913257"/>
-            <a:ext cx="804759" cy="804759"/>
-          </a:xfrm>
-        </p:spPr>
-      </p:pic>
-      <p:sp>
-        <p:nvSpPr>
-          <p:cNvPr id="7" name="Text Placeholder 6">
-            <a:extLst>
-              <a:ext uri="{FF2B5EF4-FFF2-40B4-BE49-F238E27FC236}">
-                <a16:creationId xmlns:a16="http://schemas.microsoft.com/office/drawing/2014/main" id="{87FCC6D1-213C-4A86-A2D0-742E15438C09}"/>
-              </a:ext>
-            </a:extLst>
-          </p:cNvPr>
-          <p:cNvSpPr>
-            <a:spLocks noGrp="1"/>
-          </p:cNvSpPr>
-          <p:nvPr>
-            <p:ph type="body" sz="quarter" idx="17"/>
-          </p:nvPr>
-        </p:nvSpPr>
-        <p:spPr/>
-        <p:txBody>
-          <a:bodyPr>
-            <a:normAutofit/>
-          </a:bodyPr>
-          <a:lstStyle/>
-          <a:p>
-            <a:r>
-              <a:rPr lang="en-US" dirty="0"/>
-              <a:t>Lorem ipsum dolor sit amet, consectetur adipiscing elit. Phasellus auctor efficitur </a:t>
-            </a:r>
-            <a:br>
-              <a:rPr lang="en-US" dirty="0"/>
-            </a:br>
-            <a:r>
-              <a:rPr lang="en-US" dirty="0"/>
-              <a:t>duiet facilisis. </a:t>
-            </a:r>
-          </a:p>
-        </p:txBody>
-      </p:sp>
-      <p:sp>
-        <p:nvSpPr>
-          <p:cNvPr id="20" name="Text Placeholder 19">
-            <a:extLst>
-              <a:ext uri="{FF2B5EF4-FFF2-40B4-BE49-F238E27FC236}">
-                <a16:creationId xmlns:a16="http://schemas.microsoft.com/office/drawing/2014/main" id="{82414D74-66D2-4C65-A48E-39F723FB2B2F}"/>
-              </a:ext>
-            </a:extLst>
-          </p:cNvPr>
-          <p:cNvSpPr>
-            <a:spLocks noGrp="1"/>
-          </p:cNvSpPr>
-          <p:nvPr>
-            <p:ph type="body" sz="quarter" idx="18"/>
-          </p:nvPr>
-        </p:nvSpPr>
-        <p:spPr/>
-        <p:txBody>
-          <a:bodyPr/>
-          <a:lstStyle/>
-          <a:p>
-            <a:r>
-              <a:rPr lang="en-US" dirty="0"/>
-              <a:t>Lorem ipsum dolor sit amet, consectetur adipiscing elit. Phasellus auctor efficitur </a:t>
-            </a:r>
-            <a:br>
-              <a:rPr lang="en-US" dirty="0"/>
-            </a:br>
-            <a:r>
-              <a:rPr lang="en-US" dirty="0"/>
-              <a:t>duiet facilisis. </a:t>
-            </a:r>
-          </a:p>
-        </p:txBody>
-      </p:sp>
-      <p:sp>
-        <p:nvSpPr>
-          <p:cNvPr id="21" name="Text Placeholder 20">
-            <a:extLst>
-              <a:ext uri="{FF2B5EF4-FFF2-40B4-BE49-F238E27FC236}">
-                <a16:creationId xmlns:a16="http://schemas.microsoft.com/office/drawing/2014/main" id="{E4D7EF6E-37B1-4694-B769-3DDEC29D8381}"/>
-              </a:ext>
-            </a:extLst>
-          </p:cNvPr>
-          <p:cNvSpPr>
-            <a:spLocks noGrp="1"/>
-          </p:cNvSpPr>
-          <p:nvPr>
-            <p:ph type="body" sz="quarter" idx="19"/>
-          </p:nvPr>
-        </p:nvSpPr>
-        <p:spPr/>
-        <p:txBody>
-          <a:bodyPr/>
-          <a:lstStyle/>
-          <a:p>
-            <a:r>
-              <a:rPr lang="en-US" dirty="0"/>
-              <a:t>Lorem ipsum dolor sit amet, consectetur adipiscing elit. Phasellus auctor efficitur </a:t>
-            </a:r>
-            <a:br>
-              <a:rPr lang="en-US" dirty="0"/>
-            </a:br>
-            <a:r>
-              <a:rPr lang="en-US" dirty="0"/>
-              <a:t>duiet facilisis. </a:t>
-            </a:r>
-          </a:p>
-        </p:txBody>
-      </p:sp>
-      <p:sp>
-        <p:nvSpPr>
-          <p:cNvPr id="22" name="Text Placeholder 21">
-            <a:extLst>
-              <a:ext uri="{FF2B5EF4-FFF2-40B4-BE49-F238E27FC236}">
-                <a16:creationId xmlns:a16="http://schemas.microsoft.com/office/drawing/2014/main" id="{ABF89FBA-20AC-4FD7-833B-ADA0EEFFCADC}"/>
-              </a:ext>
-            </a:extLst>
-          </p:cNvPr>
-          <p:cNvSpPr>
-            <a:spLocks noGrp="1"/>
-          </p:cNvSpPr>
-          <p:nvPr>
-            <p:ph type="body" sz="quarter" idx="20"/>
-          </p:nvPr>
-        </p:nvSpPr>
-        <p:spPr/>
-        <p:txBody>
-          <a:bodyPr/>
-          <a:lstStyle/>
-          <a:p>
-            <a:r>
-              <a:rPr lang="en-US" dirty="0"/>
-              <a:t>Lorem ipsum dolor sit amet, consectetur adipiscing elit. Phasellus auctor efficitur </a:t>
-            </a:r>
-            <a:br>
-              <a:rPr lang="en-US" dirty="0"/>
-            </a:br>
-            <a:r>
-              <a:rPr lang="en-US" dirty="0"/>
-              <a:t>duiet facilisis. </a:t>
-            </a:r>
-          </a:p>
-        </p:txBody>
-      </p:sp>
-      <p:sp>
-        <p:nvSpPr>
-          <p:cNvPr id="66" name="Text Placeholder 65">
-            <a:extLst>
-              <a:ext uri="{FF2B5EF4-FFF2-40B4-BE49-F238E27FC236}">
-                <a16:creationId xmlns:a16="http://schemas.microsoft.com/office/drawing/2014/main" id="{1AEF3ED8-A75C-4318-877C-139C98C0007D}"/>
-              </a:ext>
-            </a:extLst>
-          </p:cNvPr>
-          <p:cNvSpPr>
-            <a:spLocks noGrp="1"/>
-          </p:cNvSpPr>
-          <p:nvPr>
-            <p:ph type="body" sz="quarter" idx="11"/>
-          </p:nvPr>
-        </p:nvSpPr>
-        <p:spPr/>
-        <p:txBody>
-          <a:bodyPr/>
-          <a:lstStyle/>
-          <a:p>
-            <a:pPr>
-              <a:lnSpc>
-                <a:spcPct val="100000"/>
-              </a:lnSpc>
-            </a:pPr>
-            <a:r>
-              <a:rPr lang="en-US" dirty="0"/>
-              <a:t>Lorem ipsum dolor sit amet, consectetur adipiscing elit. Phasellus auctor efficitur dui et facilisis. Pellentesque habitant morbi tristique senectus et netus et malesuada fames ac turpis egestas. Etiam molestie in quam ac viverra. Cras consequat gravida aliquam. Maecenas cursus eleifend risus, in vulputate velit imperdiet non. Aenean tincidunt euismod ultricies. Fusce tempor dui ipsum, nec ultricies ante eleifend vel curabitur.</a:t>
-            </a:r>
-          </a:p>
-        </p:txBody>
-      </p:sp>
-    </p:spTree>
-    <p:extLst>
-      <p:ext uri="{BB962C8B-B14F-4D97-AF65-F5344CB8AC3E}">
-        <p14:creationId xmlns:p14="http://schemas.microsoft.com/office/powerpoint/2010/main" val="226842063"/>
       </p:ext>
     </p:extLst>
   </p:cSld>
@@ -21018,6 +20815,437 @@
       </p:grpSpPr>
       <p:sp>
         <p:nvSpPr>
+          <p:cNvPr id="5" name="Title 4">
+            <a:extLst>
+              <a:ext uri="{FF2B5EF4-FFF2-40B4-BE49-F238E27FC236}">
+                <a16:creationId xmlns:a16="http://schemas.microsoft.com/office/drawing/2014/main" id="{96DBE169-BA91-4B17-9AF2-4BAD528BEE06}"/>
+              </a:ext>
+            </a:extLst>
+          </p:cNvPr>
+          <p:cNvSpPr>
+            <a:spLocks noGrp="1"/>
+          </p:cNvSpPr>
+          <p:nvPr>
+            <p:ph type="title"/>
+          </p:nvPr>
+        </p:nvSpPr>
+        <p:spPr/>
+        <p:txBody>
+          <a:bodyPr>
+            <a:normAutofit fontScale="90000"/>
+          </a:bodyPr>
+          <a:lstStyle/>
+          <a:p>
+            <a:r>
+              <a:rPr lang="en-US" dirty="0"/>
+              <a:t>Click to Add Icon </a:t>
+            </a:r>
+            <a:r>
+              <a:rPr lang="en-US" dirty="0">
+                <a:solidFill>
+                  <a:srgbClr val="5DAAB0"/>
+                </a:solidFill>
+              </a:rPr>
+              <a:t>Slide Title Here </a:t>
+            </a:r>
+          </a:p>
+        </p:txBody>
+      </p:sp>
+      <p:sp>
+        <p:nvSpPr>
+          <p:cNvPr id="8" name="Text Placeholder 7">
+            <a:extLst>
+              <a:ext uri="{FF2B5EF4-FFF2-40B4-BE49-F238E27FC236}">
+                <a16:creationId xmlns:a16="http://schemas.microsoft.com/office/drawing/2014/main" id="{D9C2EAA8-D3C6-403B-B439-F95C60D0B3B9}"/>
+              </a:ext>
+            </a:extLst>
+          </p:cNvPr>
+          <p:cNvSpPr>
+            <a:spLocks noGrp="1"/>
+          </p:cNvSpPr>
+          <p:nvPr>
+            <p:ph type="body" sz="quarter" idx="12"/>
+          </p:nvPr>
+        </p:nvSpPr>
+        <p:spPr/>
+        <p:txBody>
+          <a:bodyPr/>
+          <a:lstStyle/>
+          <a:p>
+            <a:r>
+              <a:rPr lang="en-US" dirty="0"/>
+              <a:t>SUBTITLE GOES HERE</a:t>
+            </a:r>
+          </a:p>
+        </p:txBody>
+      </p:sp>
+      <p:pic>
+        <p:nvPicPr>
+          <p:cNvPr id="46" name="Picture Placeholder 45">
+            <a:extLst>
+              <a:ext uri="{FF2B5EF4-FFF2-40B4-BE49-F238E27FC236}">
+                <a16:creationId xmlns:a16="http://schemas.microsoft.com/office/drawing/2014/main" id="{6263CE43-D410-4BF8-8529-41197F401002}"/>
+              </a:ext>
+              <a:ext uri="{C183D7F6-B498-43B3-948B-1728B52AA6E4}">
+                <adec:decorative xmlns:adec="http://schemas.microsoft.com/office/drawing/2017/decorative" val="1"/>
+              </a:ext>
+            </a:extLst>
+          </p:cNvPr>
+          <p:cNvPicPr>
+            <a:picLocks noGrp="1" noChangeAspect="1"/>
+          </p:cNvPicPr>
+          <p:nvPr>
+            <p:ph type="pic" sz="quarter" idx="13"/>
+          </p:nvPr>
+        </p:nvPicPr>
+        <p:blipFill rotWithShape="1">
+          <a:blip r:embed="rId3" cstate="screen">
+            <a:extLst>
+              <a:ext uri="{28A0092B-C50C-407E-A947-70E740481C1C}">
+                <a14:useLocalDpi xmlns:a14="http://schemas.microsoft.com/office/drawing/2010/main"/>
+              </a:ext>
+              <a:ext uri="{96DAC541-7B7A-43D3-8B79-37D633B846F1}">
+                <asvg:svgBlip xmlns:asvg="http://schemas.microsoft.com/office/drawing/2016/SVG/main" r:embed="rId4"/>
+              </a:ext>
+            </a:extLst>
+          </a:blip>
+          <a:srcRect l="-29560" t="-29716" r="-29560" b="-29716"/>
+          <a:stretch/>
+        </p:blipFill>
+        <p:spPr>
+          <a:xfrm>
+            <a:off x="6687422" y="1038724"/>
+            <a:ext cx="804759" cy="804759"/>
+          </a:xfrm>
+        </p:spPr>
+      </p:pic>
+      <p:pic>
+        <p:nvPicPr>
+          <p:cNvPr id="50" name="Picture Placeholder 49">
+            <a:extLst>
+              <a:ext uri="{FF2B5EF4-FFF2-40B4-BE49-F238E27FC236}">
+                <a16:creationId xmlns:a16="http://schemas.microsoft.com/office/drawing/2014/main" id="{44B7CF38-0B19-41D9-8D37-6D59A3F3E045}"/>
+              </a:ext>
+              <a:ext uri="{C183D7F6-B498-43B3-948B-1728B52AA6E4}">
+                <adec:decorative xmlns:adec="http://schemas.microsoft.com/office/drawing/2017/decorative" val="1"/>
+              </a:ext>
+            </a:extLst>
+          </p:cNvPr>
+          <p:cNvPicPr>
+            <a:picLocks noGrp="1" noChangeAspect="1"/>
+          </p:cNvPicPr>
+          <p:nvPr>
+            <p:ph type="pic" sz="quarter" idx="14"/>
+          </p:nvPr>
+        </p:nvPicPr>
+        <p:blipFill rotWithShape="1">
+          <a:blip r:embed="rId5" cstate="screen">
+            <a:extLst>
+              <a:ext uri="{28A0092B-C50C-407E-A947-70E740481C1C}">
+                <a14:useLocalDpi xmlns:a14="http://schemas.microsoft.com/office/drawing/2010/main"/>
+              </a:ext>
+              <a:ext uri="{96DAC541-7B7A-43D3-8B79-37D633B846F1}">
+                <asvg:svgBlip xmlns:asvg="http://schemas.microsoft.com/office/drawing/2016/SVG/main" r:embed="rId6"/>
+              </a:ext>
+            </a:extLst>
+          </a:blip>
+          <a:srcRect l="-22179" t="-22322" r="-22179" b="-22322"/>
+          <a:stretch/>
+        </p:blipFill>
+        <p:spPr>
+          <a:xfrm>
+            <a:off x="6687422" y="2330235"/>
+            <a:ext cx="804759" cy="804759"/>
+          </a:xfrm>
+        </p:spPr>
+      </p:pic>
+      <p:pic>
+        <p:nvPicPr>
+          <p:cNvPr id="52" name="Picture Placeholder 51">
+            <a:extLst>
+              <a:ext uri="{FF2B5EF4-FFF2-40B4-BE49-F238E27FC236}">
+                <a16:creationId xmlns:a16="http://schemas.microsoft.com/office/drawing/2014/main" id="{26AA0551-AA74-4E7E-80AF-5D856020D1F8}"/>
+              </a:ext>
+              <a:ext uri="{C183D7F6-B498-43B3-948B-1728B52AA6E4}">
+                <adec:decorative xmlns:adec="http://schemas.microsoft.com/office/drawing/2017/decorative" val="1"/>
+              </a:ext>
+            </a:extLst>
+          </p:cNvPr>
+          <p:cNvPicPr>
+            <a:picLocks noGrp="1" noChangeAspect="1"/>
+          </p:cNvPicPr>
+          <p:nvPr>
+            <p:ph type="pic" sz="quarter" idx="15"/>
+          </p:nvPr>
+        </p:nvPicPr>
+        <p:blipFill rotWithShape="1">
+          <a:blip r:embed="rId7" cstate="screen">
+            <a:extLst>
+              <a:ext uri="{28A0092B-C50C-407E-A947-70E740481C1C}">
+                <a14:useLocalDpi xmlns:a14="http://schemas.microsoft.com/office/drawing/2010/main"/>
+              </a:ext>
+              <a:ext uri="{96DAC541-7B7A-43D3-8B79-37D633B846F1}">
+                <asvg:svgBlip xmlns:asvg="http://schemas.microsoft.com/office/drawing/2016/SVG/main" r:embed="rId8"/>
+              </a:ext>
+            </a:extLst>
+          </a:blip>
+          <a:srcRect l="-27274" t="-27427" r="-27274" b="-27427"/>
+          <a:stretch/>
+        </p:blipFill>
+        <p:spPr>
+          <a:xfrm>
+            <a:off x="6687422" y="3621746"/>
+            <a:ext cx="804759" cy="804759"/>
+          </a:xfrm>
+        </p:spPr>
+      </p:pic>
+      <p:pic>
+        <p:nvPicPr>
+          <p:cNvPr id="54" name="Picture Placeholder 53">
+            <a:extLst>
+              <a:ext uri="{FF2B5EF4-FFF2-40B4-BE49-F238E27FC236}">
+                <a16:creationId xmlns:a16="http://schemas.microsoft.com/office/drawing/2014/main" id="{21139392-74B8-43B3-BFDF-58CAC133651E}"/>
+              </a:ext>
+              <a:ext uri="{C183D7F6-B498-43B3-948B-1728B52AA6E4}">
+                <adec:decorative xmlns:adec="http://schemas.microsoft.com/office/drawing/2017/decorative" val="1"/>
+              </a:ext>
+            </a:extLst>
+          </p:cNvPr>
+          <p:cNvPicPr>
+            <a:picLocks noGrp="1" noChangeAspect="1"/>
+          </p:cNvPicPr>
+          <p:nvPr>
+            <p:ph type="pic" sz="quarter" idx="16"/>
+          </p:nvPr>
+        </p:nvPicPr>
+        <p:blipFill rotWithShape="1">
+          <a:blip r:embed="rId9" cstate="screen">
+            <a:extLst>
+              <a:ext uri="{28A0092B-C50C-407E-A947-70E740481C1C}">
+                <a14:useLocalDpi xmlns:a14="http://schemas.microsoft.com/office/drawing/2010/main"/>
+              </a:ext>
+              <a:ext uri="{96DAC541-7B7A-43D3-8B79-37D633B846F1}">
+                <asvg:svgBlip xmlns:asvg="http://schemas.microsoft.com/office/drawing/2016/SVG/main" r:embed="rId10"/>
+              </a:ext>
+            </a:extLst>
+          </a:blip>
+          <a:srcRect l="-30855" t="-31015" r="-30855" b="-31015"/>
+          <a:stretch/>
+        </p:blipFill>
+        <p:spPr>
+          <a:xfrm>
+            <a:off x="6687422" y="4913257"/>
+            <a:ext cx="804759" cy="804759"/>
+          </a:xfrm>
+        </p:spPr>
+      </p:pic>
+      <p:sp>
+        <p:nvSpPr>
+          <p:cNvPr id="7" name="Text Placeholder 6">
+            <a:extLst>
+              <a:ext uri="{FF2B5EF4-FFF2-40B4-BE49-F238E27FC236}">
+                <a16:creationId xmlns:a16="http://schemas.microsoft.com/office/drawing/2014/main" id="{87FCC6D1-213C-4A86-A2D0-742E15438C09}"/>
+              </a:ext>
+            </a:extLst>
+          </p:cNvPr>
+          <p:cNvSpPr>
+            <a:spLocks noGrp="1"/>
+          </p:cNvSpPr>
+          <p:nvPr>
+            <p:ph type="body" sz="quarter" idx="17"/>
+          </p:nvPr>
+        </p:nvSpPr>
+        <p:spPr/>
+        <p:txBody>
+          <a:bodyPr>
+            <a:normAutofit/>
+          </a:bodyPr>
+          <a:lstStyle/>
+          <a:p>
+            <a:r>
+              <a:rPr lang="en-US" dirty="0"/>
+              <a:t>Lorem ipsum dolor sit amet, consectetur adipiscing elit. Phasellus auctor efficitur </a:t>
+            </a:r>
+            <a:br>
+              <a:rPr lang="en-US" dirty="0"/>
+            </a:br>
+            <a:r>
+              <a:rPr lang="en-US" dirty="0"/>
+              <a:t>duiet facilisis. </a:t>
+            </a:r>
+          </a:p>
+        </p:txBody>
+      </p:sp>
+      <p:sp>
+        <p:nvSpPr>
+          <p:cNvPr id="20" name="Text Placeholder 19">
+            <a:extLst>
+              <a:ext uri="{FF2B5EF4-FFF2-40B4-BE49-F238E27FC236}">
+                <a16:creationId xmlns:a16="http://schemas.microsoft.com/office/drawing/2014/main" id="{82414D74-66D2-4C65-A48E-39F723FB2B2F}"/>
+              </a:ext>
+            </a:extLst>
+          </p:cNvPr>
+          <p:cNvSpPr>
+            <a:spLocks noGrp="1"/>
+          </p:cNvSpPr>
+          <p:nvPr>
+            <p:ph type="body" sz="quarter" idx="18"/>
+          </p:nvPr>
+        </p:nvSpPr>
+        <p:spPr/>
+        <p:txBody>
+          <a:bodyPr/>
+          <a:lstStyle/>
+          <a:p>
+            <a:r>
+              <a:rPr lang="en-US" dirty="0"/>
+              <a:t>Lorem ipsum dolor sit amet, consectetur adipiscing elit. Phasellus auctor efficitur </a:t>
+            </a:r>
+            <a:br>
+              <a:rPr lang="en-US" dirty="0"/>
+            </a:br>
+            <a:r>
+              <a:rPr lang="en-US" dirty="0"/>
+              <a:t>duiet facilisis. </a:t>
+            </a:r>
+          </a:p>
+        </p:txBody>
+      </p:sp>
+      <p:sp>
+        <p:nvSpPr>
+          <p:cNvPr id="21" name="Text Placeholder 20">
+            <a:extLst>
+              <a:ext uri="{FF2B5EF4-FFF2-40B4-BE49-F238E27FC236}">
+                <a16:creationId xmlns:a16="http://schemas.microsoft.com/office/drawing/2014/main" id="{E4D7EF6E-37B1-4694-B769-3DDEC29D8381}"/>
+              </a:ext>
+            </a:extLst>
+          </p:cNvPr>
+          <p:cNvSpPr>
+            <a:spLocks noGrp="1"/>
+          </p:cNvSpPr>
+          <p:nvPr>
+            <p:ph type="body" sz="quarter" idx="19"/>
+          </p:nvPr>
+        </p:nvSpPr>
+        <p:spPr/>
+        <p:txBody>
+          <a:bodyPr/>
+          <a:lstStyle/>
+          <a:p>
+            <a:r>
+              <a:rPr lang="en-US" dirty="0"/>
+              <a:t>Lorem ipsum dolor sit amet, consectetur adipiscing elit. Phasellus auctor efficitur </a:t>
+            </a:r>
+            <a:br>
+              <a:rPr lang="en-US" dirty="0"/>
+            </a:br>
+            <a:r>
+              <a:rPr lang="en-US" dirty="0"/>
+              <a:t>duiet facilisis. </a:t>
+            </a:r>
+          </a:p>
+        </p:txBody>
+      </p:sp>
+      <p:sp>
+        <p:nvSpPr>
+          <p:cNvPr id="22" name="Text Placeholder 21">
+            <a:extLst>
+              <a:ext uri="{FF2B5EF4-FFF2-40B4-BE49-F238E27FC236}">
+                <a16:creationId xmlns:a16="http://schemas.microsoft.com/office/drawing/2014/main" id="{ABF89FBA-20AC-4FD7-833B-ADA0EEFFCADC}"/>
+              </a:ext>
+            </a:extLst>
+          </p:cNvPr>
+          <p:cNvSpPr>
+            <a:spLocks noGrp="1"/>
+          </p:cNvSpPr>
+          <p:nvPr>
+            <p:ph type="body" sz="quarter" idx="20"/>
+          </p:nvPr>
+        </p:nvSpPr>
+        <p:spPr/>
+        <p:txBody>
+          <a:bodyPr/>
+          <a:lstStyle/>
+          <a:p>
+            <a:r>
+              <a:rPr lang="en-US" dirty="0"/>
+              <a:t>Lorem ipsum dolor sit amet, consectetur adipiscing elit. Phasellus auctor efficitur </a:t>
+            </a:r>
+            <a:br>
+              <a:rPr lang="en-US" dirty="0"/>
+            </a:br>
+            <a:r>
+              <a:rPr lang="en-US" dirty="0"/>
+              <a:t>duiet facilisis. </a:t>
+            </a:r>
+          </a:p>
+        </p:txBody>
+      </p:sp>
+      <p:sp>
+        <p:nvSpPr>
+          <p:cNvPr id="66" name="Text Placeholder 65">
+            <a:extLst>
+              <a:ext uri="{FF2B5EF4-FFF2-40B4-BE49-F238E27FC236}">
+                <a16:creationId xmlns:a16="http://schemas.microsoft.com/office/drawing/2014/main" id="{1AEF3ED8-A75C-4318-877C-139C98C0007D}"/>
+              </a:ext>
+            </a:extLst>
+          </p:cNvPr>
+          <p:cNvSpPr>
+            <a:spLocks noGrp="1"/>
+          </p:cNvSpPr>
+          <p:nvPr>
+            <p:ph type="body" sz="quarter" idx="11"/>
+          </p:nvPr>
+        </p:nvSpPr>
+        <p:spPr/>
+        <p:txBody>
+          <a:bodyPr/>
+          <a:lstStyle/>
+          <a:p>
+            <a:pPr>
+              <a:lnSpc>
+                <a:spcPct val="100000"/>
+              </a:lnSpc>
+            </a:pPr>
+            <a:r>
+              <a:rPr lang="en-US" dirty="0"/>
+              <a:t>Lorem ipsum dolor sit amet, consectetur adipiscing elit. Phasellus auctor efficitur dui et facilisis. Pellentesque habitant morbi tristique senectus et netus et malesuada fames ac turpis egestas. Etiam molestie in quam ac viverra. Cras consequat gravida aliquam. Maecenas cursus eleifend risus, in vulputate velit imperdiet non. Aenean tincidunt euismod ultricies. Fusce tempor dui ipsum, nec ultricies ante eleifend vel curabitur.</a:t>
+            </a:r>
+          </a:p>
+        </p:txBody>
+      </p:sp>
+    </p:spTree>
+    <p:extLst>
+      <p:ext uri="{BB962C8B-B14F-4D97-AF65-F5344CB8AC3E}">
+        <p14:creationId xmlns:p14="http://schemas.microsoft.com/office/powerpoint/2010/main" val="226842063"/>
+      </p:ext>
+    </p:extLst>
+  </p:cSld>
+  <p:clrMapOvr>
+    <a:masterClrMapping/>
+  </p:clrMapOvr>
+</p:sld>
+</file>
+
+<file path=ppt/slides/slide14.xml><?xml version="1.0" encoding="utf-8"?>
+<p:sld xmlns:a="http://schemas.openxmlformats.org/drawingml/2006/main" xmlns:r="http://schemas.openxmlformats.org/officeDocument/2006/relationships" xmlns:p="http://schemas.openxmlformats.org/presentationml/2006/main">
+  <p:cSld>
+    <p:spTree>
+      <p:nvGrpSpPr>
+        <p:cNvPr id="1" name=""/>
+        <p:cNvGrpSpPr/>
+        <p:nvPr/>
+      </p:nvGrpSpPr>
+      <p:grpSpPr>
+        <a:xfrm>
+          <a:off x="0" y="0"/>
+          <a:ext cx="0" cy="0"/>
+          <a:chOff x="0" y="0"/>
+          <a:chExt cx="0" cy="0"/>
+        </a:xfrm>
+      </p:grpSpPr>
+      <p:sp>
+        <p:nvSpPr>
           <p:cNvPr id="12" name="Title 11">
             <a:extLst>
               <a:ext uri="{FF2B5EF4-FFF2-40B4-BE49-F238E27FC236}">
@@ -21420,7 +21648,7 @@
 </p:sld>
 </file>
 
-<file path=ppt/slides/slide14.xml><?xml version="1.0" encoding="utf-8"?>
+<file path=ppt/slides/slide15.xml><?xml version="1.0" encoding="utf-8"?>
 <p:sld xmlns:a="http://schemas.openxmlformats.org/drawingml/2006/main" xmlns:r="http://schemas.openxmlformats.org/officeDocument/2006/relationships" xmlns:p="http://schemas.openxmlformats.org/presentationml/2006/main">
   <p:cSld>
     <p:spTree>
@@ -23169,8 +23397,8 @@
           </a:p>
         </p:txBody>
       </p:sp>
-      <mc:AlternateContent xmlns:mc="http://schemas.openxmlformats.org/markup-compatibility/2006">
-        <mc:Choice xmlns:we="http://schemas.microsoft.com/office/webextensions/webextension/2010/11" xmlns:pca="http://schemas.microsoft.com/office/powerpoint/2013/contentapp" Requires="we pca">
+      <mc:AlternateContent xmlns:mc="http://schemas.openxmlformats.org/markup-compatibility/2006" xmlns:we="http://schemas.microsoft.com/office/webextensions/webextension/2010/11" xmlns:pca="http://schemas.microsoft.com/office/powerpoint/2013/contentapp">
+        <mc:Choice Requires="we pca">
           <p:graphicFrame>
             <p:nvGraphicFramePr>
               <p:cNvPr id="2" name="Add-in 1" title="Web Viewer">
@@ -23202,7 +23430,7 @@
             </a:graphic>
           </p:graphicFrame>
         </mc:Choice>
-        <mc:Fallback>
+        <mc:Fallback xmlns="">
           <p:pic>
             <p:nvPicPr>
               <p:cNvPr id="2" name="Add-in 1" title="Web Viewer">
@@ -23267,64 +23495,10 @@
       </p:grpSpPr>
       <p:sp>
         <p:nvSpPr>
-          <p:cNvPr id="2" name="Picture Placeholder 1">
-            <a:extLst>
-              <a:ext uri="{FF2B5EF4-FFF2-40B4-BE49-F238E27FC236}">
-                <a16:creationId xmlns:a16="http://schemas.microsoft.com/office/drawing/2014/main" id="{F3B36882-9218-4CA3-9948-3210693A1432}"/>
-              </a:ext>
-            </a:extLst>
-          </p:cNvPr>
-          <p:cNvSpPr>
-            <a:spLocks noGrp="1"/>
-          </p:cNvSpPr>
-          <p:nvPr>
-            <p:ph type="pic" sz="quarter" idx="13"/>
-          </p:nvPr>
-        </p:nvSpPr>
-        <p:spPr/>
-      </p:sp>
-      <p:sp>
-        <p:nvSpPr>
-          <p:cNvPr id="3" name="Picture Placeholder 2">
-            <a:extLst>
-              <a:ext uri="{FF2B5EF4-FFF2-40B4-BE49-F238E27FC236}">
-                <a16:creationId xmlns:a16="http://schemas.microsoft.com/office/drawing/2014/main" id="{BC8A54E8-F773-4B3D-91E6-15BAEAC7EFFE}"/>
-              </a:ext>
-            </a:extLst>
-          </p:cNvPr>
-          <p:cNvSpPr>
-            <a:spLocks noGrp="1"/>
-          </p:cNvSpPr>
-          <p:nvPr>
-            <p:ph type="pic" sz="quarter" idx="15"/>
-          </p:nvPr>
-        </p:nvSpPr>
-        <p:spPr/>
-      </p:sp>
-      <p:sp>
-        <p:nvSpPr>
-          <p:cNvPr id="4" name="Picture Placeholder 3">
-            <a:extLst>
-              <a:ext uri="{FF2B5EF4-FFF2-40B4-BE49-F238E27FC236}">
-                <a16:creationId xmlns:a16="http://schemas.microsoft.com/office/drawing/2014/main" id="{4AC005F8-A463-49F2-8969-1E9BEBB293EF}"/>
-              </a:ext>
-            </a:extLst>
-          </p:cNvPr>
-          <p:cNvSpPr>
-            <a:spLocks noGrp="1"/>
-          </p:cNvSpPr>
-          <p:nvPr>
-            <p:ph type="pic" sz="quarter" idx="16"/>
-          </p:nvPr>
-        </p:nvSpPr>
-        <p:spPr/>
-      </p:sp>
-      <p:sp>
-        <p:nvSpPr>
-          <p:cNvPr id="5" name="Title 4">
-            <a:extLst>
-              <a:ext uri="{FF2B5EF4-FFF2-40B4-BE49-F238E27FC236}">
-                <a16:creationId xmlns:a16="http://schemas.microsoft.com/office/drawing/2014/main" id="{E870BB1D-96EA-4078-AEC4-04F59C72F156}"/>
+          <p:cNvPr id="8" name="Title 7">
+            <a:extLst>
+              <a:ext uri="{FF2B5EF4-FFF2-40B4-BE49-F238E27FC236}">
+                <a16:creationId xmlns:a16="http://schemas.microsoft.com/office/drawing/2014/main" id="{AB58A585-52FA-4A45-B2D0-660EC2D22B31}"/>
               </a:ext>
             </a:extLst>
           </p:cNvPr>
@@ -23340,17 +23514,149 @@
           <a:bodyPr/>
           <a:lstStyle/>
           <a:p>
+            <a:pPr algn="ctr"/>
+            <a:r>
+              <a:rPr lang="en-US" sz="4400" dirty="0">
+                <a:solidFill>
+                  <a:srgbClr val="5DAAB0"/>
+                </a:solidFill>
+                <a:latin typeface="+mn-lt"/>
+              </a:rPr>
+              <a:t>2nd Draft  Visualization</a:t>
+            </a:r>
+          </a:p>
+        </p:txBody>
+      </p:sp>
+      <p:sp>
+        <p:nvSpPr>
+          <p:cNvPr id="10" name="Text Placeholder 9">
+            <a:extLst>
+              <a:ext uri="{FF2B5EF4-FFF2-40B4-BE49-F238E27FC236}">
+                <a16:creationId xmlns:a16="http://schemas.microsoft.com/office/drawing/2014/main" id="{76C3E0A7-1C3E-0A40-AC21-1EAD4086CBB7}"/>
+              </a:ext>
+            </a:extLst>
+          </p:cNvPr>
+          <p:cNvSpPr>
+            <a:spLocks noGrp="1"/>
+          </p:cNvSpPr>
+          <p:nvPr>
+            <p:ph type="body" sz="quarter" idx="11"/>
+          </p:nvPr>
+        </p:nvSpPr>
+        <p:spPr/>
+        <p:txBody>
+          <a:bodyPr/>
+          <a:lstStyle/>
+          <a:p>
+            <a:pPr lvl="0"/>
             <a:r>
               <a:rPr lang="en-US" dirty="0"/>
-              <a:t>Backup Slides</a:t>
-            </a:r>
-          </a:p>
-        </p:txBody>
-      </p:sp>
+              <a:t>This visualization summarizes the overall Alaska pollutants by month. </a:t>
+            </a:r>
+          </a:p>
+          <a:p>
+            <a:endParaRPr lang="en-US" dirty="0"/>
+          </a:p>
+        </p:txBody>
+      </p:sp>
+      <p:sp>
+        <p:nvSpPr>
+          <p:cNvPr id="12" name="Text Placeholder 11">
+            <a:extLst>
+              <a:ext uri="{FF2B5EF4-FFF2-40B4-BE49-F238E27FC236}">
+                <a16:creationId xmlns:a16="http://schemas.microsoft.com/office/drawing/2014/main" id="{F82458FA-5D5F-6A41-B047-910858C1E142}"/>
+              </a:ext>
+            </a:extLst>
+          </p:cNvPr>
+          <p:cNvSpPr>
+            <a:spLocks noGrp="1"/>
+          </p:cNvSpPr>
+          <p:nvPr>
+            <p:ph type="body" sz="quarter" idx="12"/>
+          </p:nvPr>
+        </p:nvSpPr>
+        <p:spPr/>
+        <p:txBody>
+          <a:bodyPr/>
+          <a:lstStyle/>
+          <a:p>
+            <a:r>
+              <a:rPr lang="en-US" dirty="0"/>
+              <a:t>USING TABLEAU</a:t>
+            </a:r>
+          </a:p>
+        </p:txBody>
+      </p:sp>
+      <mc:AlternateContent xmlns:mc="http://schemas.openxmlformats.org/markup-compatibility/2006">
+        <mc:Choice xmlns:we="http://schemas.microsoft.com/office/webextensions/webextension/2010/11" xmlns:pca="http://schemas.microsoft.com/office/powerpoint/2013/contentapp" Requires="we pca">
+          <p:graphicFrame>
+            <p:nvGraphicFramePr>
+              <p:cNvPr id="2" name="Add-in 1" title="Web Viewer">
+                <a:extLst>
+                  <a:ext uri="{FF2B5EF4-FFF2-40B4-BE49-F238E27FC236}">
+                    <a16:creationId xmlns:a16="http://schemas.microsoft.com/office/drawing/2014/main" id="{7416791D-D9C9-4A2B-9D07-BE3B723D1B7E}"/>
+                  </a:ext>
+                </a:extLst>
+              </p:cNvPr>
+              <p:cNvGraphicFramePr>
+                <a:graphicFrameLocks noGrp="1"/>
+              </p:cNvGraphicFramePr>
+              <p:nvPr>
+                <p:extLst>
+                  <p:ext uri="{D42A27DB-BD31-4B8C-83A1-F6EECF244321}">
+                    <p14:modId xmlns:p14="http://schemas.microsoft.com/office/powerpoint/2010/main" val="1602148531"/>
+                  </p:ext>
+                </p:extLst>
+              </p:nvPr>
+            </p:nvGraphicFramePr>
+            <p:xfrm>
+              <a:off x="152400" y="1066800"/>
+              <a:ext cx="6477000" cy="5062455"/>
+            </p:xfrm>
+            <a:graphic>
+              <a:graphicData uri="http://schemas.microsoft.com/office/webextensions/webextension/2010/11">
+                <we:webextensionref xmlns:we="http://schemas.microsoft.com/office/webextensions/webextension/2010/11" xmlns:r="http://schemas.openxmlformats.org/officeDocument/2006/relationships" r:id="rId3"/>
+              </a:graphicData>
+            </a:graphic>
+          </p:graphicFrame>
+        </mc:Choice>
+        <mc:Fallback>
+          <p:pic>
+            <p:nvPicPr>
+              <p:cNvPr id="2" name="Add-in 1" title="Web Viewer">
+                <a:extLst>
+                  <a:ext uri="{FF2B5EF4-FFF2-40B4-BE49-F238E27FC236}">
+                    <a16:creationId xmlns:a16="http://schemas.microsoft.com/office/drawing/2014/main" id="{7416791D-D9C9-4A2B-9D07-BE3B723D1B7E}"/>
+                  </a:ext>
+                </a:extLst>
+              </p:cNvPr>
+              <p:cNvPicPr>
+                <a:picLocks noGrp="1" noRot="1" noChangeAspect="1" noMove="1" noResize="1" noEditPoints="1" noAdjustHandles="1" noChangeArrowheads="1" noChangeShapeType="1"/>
+              </p:cNvPicPr>
+              <p:nvPr/>
+            </p:nvPicPr>
+            <p:blipFill>
+              <a:blip r:embed="rId4"/>
+              <a:stretch>
+                <a:fillRect/>
+              </a:stretch>
+            </p:blipFill>
+            <p:spPr>
+              <a:xfrm>
+                <a:off x="152400" y="1066800"/>
+                <a:ext cx="6477000" cy="5062455"/>
+              </a:xfrm>
+              <a:prstGeom prst="rect">
+                <a:avLst/>
+              </a:prstGeom>
+            </p:spPr>
+          </p:pic>
+        </mc:Fallback>
+      </mc:AlternateContent>
     </p:spTree>
     <p:extLst>
       <p:ext uri="{BB962C8B-B14F-4D97-AF65-F5344CB8AC3E}">
-        <p14:creationId xmlns:p14="http://schemas.microsoft.com/office/powerpoint/2010/main" val="3909312436"/>
+        <p14:creationId xmlns:p14="http://schemas.microsoft.com/office/powerpoint/2010/main" val="261165440"/>
       </p:ext>
     </p:extLst>
   </p:cSld>
@@ -24163,4 +24469,18 @@
   <we:bindings/>
   <we:snapshot xmlns:r="http://schemas.openxmlformats.org/officeDocument/2006/relationships" r:embed="rId1"/>
 </we:webextension>
+</file>
+
+<file path=ppt/webextensions/webextension2.xml><?xml version="1.0" encoding="utf-8"?>
+<we:webextension xmlns:we="http://schemas.microsoft.com/office/webextensions/webextension/2010/11" id="{AC0FAECC-0174-4A0B-A7B4-C716969D7076}">
+  <we:reference id="wa104295828" version="1.9.0.0" store="en-US" storeType="OMEX"/>
+  <we:alternateReferences>
+    <we:reference id="wa104295828" version="1.9.0.0" store="wa104295828" storeType="OMEX"/>
+  </we:alternateReferences>
+  <we:properties>
+    <we:property name="__labs__" value="{&quot;configuration&quot;:{&quot;appVersion&quot;:{&quot;major&quot;:1,&quot;minor&quot;:0},&quot;components&quot;:[{&quot;type&quot;:&quot;Labs.Components.ActivityComponent&quot;,&quot;name&quot;:&quot;public.tableau.com/views/Final_Project_Tab3/AKTotalPollutentsbyMonth?:language=en-US&amp;:retry=yes&amp;:display_count=n&amp;:origin=viz_share_link&quot;,&quot;values&quot;:{},&quot;data&quot;:{&quot;uri&quot;:&quot;public.tableau.com/views/Final_Project_Tab3/AKTotalPollutentsbyMonth?:language=en-US&amp;:retry=yes&amp;:display_count=n&amp;:origin=viz_share_link&quot;},&quot;secure&quot;:false}],&quot;name&quot;:&quot;public.tableau.com/views/Final_Project_Tab3/AKTotalPollutentsbyMonth?:language=en-US&amp;:retry=yes&amp;:display_count=n&amp;:origin=viz_share_link&quot;,&quot;timeline&quot;:null,&quot;analytics&quot;:null},&quot;hostVersion&quot;:{&quot;major&quot;:0,&quot;minor&quot;:1}}"/>
+  </we:properties>
+  <we:bindings/>
+  <we:snapshot xmlns:r="http://schemas.openxmlformats.org/officeDocument/2006/relationships" r:embed="rId1"/>
+</we:webextension>
 </file>
</xml_diff>